<commit_message>
Add Presentation Script file and complete presentation
</commit_message>
<xml_diff>
--- a/Presentations/01 - Introduction/01 - What is Vue.js.pptx
+++ b/Presentations/01 - Introduction/01 - What is Vue.js.pptx
@@ -6,6 +6,8 @@
   </p:sldMasterIdLst>
   <p:sldIdLst>
     <p:sldId id="256" r:id="rId2"/>
+    <p:sldId id="258" r:id="rId3"/>
+    <p:sldId id="259" r:id="rId4"/>
   </p:sldIdLst>
   <p:sldSz cx="12192000" cy="6858000"/>
   <p:notesSz cx="6858000" cy="9144000"/>
@@ -3380,7 +3382,7 @@
         </p:nvSpPr>
         <p:spPr>
           <a:xfrm>
-            <a:off x="0" y="147140"/>
+            <a:off x="0" y="-1144"/>
             <a:ext cx="12192000" cy="1014248"/>
           </a:xfrm>
           <a:solidFill>
@@ -3404,111 +3406,21 @@
       </p:sp>
       <p:sp>
         <p:nvSpPr>
-          <p:cNvPr id="3" name="Subtitle 2">
-            <a:extLst>
-              <a:ext uri="{FF2B5EF4-FFF2-40B4-BE49-F238E27FC236}">
-                <a16:creationId xmlns:a16="http://schemas.microsoft.com/office/drawing/2014/main" id="{86EA4A7B-4003-4EFD-93A2-29CB2048D9F3}"/>
-              </a:ext>
-            </a:extLst>
-          </p:cNvPr>
-          <p:cNvSpPr>
-            <a:spLocks noGrp="1"/>
-          </p:cNvSpPr>
-          <p:nvPr>
-            <p:ph type="subTitle" idx="1"/>
-          </p:nvPr>
+          <p:cNvPr id="4" name="Title 1">
+            <a:extLst>
+              <a:ext uri="{FF2B5EF4-FFF2-40B4-BE49-F238E27FC236}">
+                <a16:creationId xmlns:a16="http://schemas.microsoft.com/office/drawing/2014/main" id="{608B8AFC-C2D7-424F-897D-50890123973C}"/>
+              </a:ext>
+            </a:extLst>
+          </p:cNvPr>
+          <p:cNvSpPr txBox="1">
+            <a:spLocks/>
+          </p:cNvSpPr>
+          <p:nvPr/>
         </p:nvSpPr>
         <p:spPr>
           <a:xfrm>
-            <a:off x="174626" y="1887501"/>
-            <a:ext cx="9144000" cy="1655762"/>
-          </a:xfrm>
-        </p:spPr>
-        <p:txBody>
-          <a:bodyPr>
-            <a:normAutofit/>
-          </a:bodyPr>
-          <a:lstStyle/>
-          <a:p>
-            <a:pPr marL="342900" indent="-342900" algn="l">
-              <a:buSzPct val="100000"/>
-              <a:buBlip>
-                <a:blip r:embed="rId2"/>
-              </a:buBlip>
-            </a:pPr>
-            <a:r>
-              <a:rPr lang="en-US">
-                <a:solidFill>
-                  <a:srgbClr val="35495E"/>
-                </a:solidFill>
-              </a:rPr>
-              <a:t>Sdfdf</a:t>
-            </a:r>
-          </a:p>
-          <a:p>
-            <a:pPr marL="342900" indent="-342900" algn="l">
-              <a:buSzPct val="100000"/>
-              <a:buBlip>
-                <a:blip r:embed="rId2"/>
-              </a:buBlip>
-            </a:pPr>
-            <a:r>
-              <a:rPr lang="en-US">
-                <a:solidFill>
-                  <a:srgbClr val="35495E"/>
-                </a:solidFill>
-              </a:rPr>
-              <a:t>Asdf</a:t>
-            </a:r>
-          </a:p>
-          <a:p>
-            <a:pPr marL="342900" indent="-342900" algn="l">
-              <a:buSzPct val="100000"/>
-              <a:buBlip>
-                <a:blip r:embed="rId2"/>
-              </a:buBlip>
-            </a:pPr>
-            <a:r>
-              <a:rPr lang="en-US">
-                <a:solidFill>
-                  <a:srgbClr val="35495E"/>
-                </a:solidFill>
-              </a:rPr>
-              <a:t>Cdsfsd</a:t>
-            </a:r>
-          </a:p>
-          <a:p>
-            <a:pPr marL="342900" indent="-342900" algn="l">
-              <a:buSzPct val="150000"/>
-              <a:buBlip>
-                <a:blip r:embed="rId2"/>
-              </a:buBlip>
-            </a:pPr>
-            <a:endParaRPr lang="en-US">
-              <a:solidFill>
-                <a:srgbClr val="35495E"/>
-              </a:solidFill>
-            </a:endParaRPr>
-          </a:p>
-        </p:txBody>
-      </p:sp>
-      <p:sp>
-        <p:nvSpPr>
-          <p:cNvPr id="4" name="Title 1">
-            <a:extLst>
-              <a:ext uri="{FF2B5EF4-FFF2-40B4-BE49-F238E27FC236}">
-                <a16:creationId xmlns:a16="http://schemas.microsoft.com/office/drawing/2014/main" id="{608B8AFC-C2D7-424F-897D-50890123973C}"/>
-              </a:ext>
-            </a:extLst>
-          </p:cNvPr>
-          <p:cNvSpPr txBox="1">
-            <a:spLocks/>
-          </p:cNvSpPr>
-          <p:nvPr/>
-        </p:nvSpPr>
-        <p:spPr>
-          <a:xfrm>
-            <a:off x="0" y="1153818"/>
+            <a:off x="0" y="1005534"/>
             <a:ext cx="12192000" cy="112919"/>
           </a:xfrm>
           <a:prstGeom prst="rect">
@@ -3550,6 +3462,215 @@
           </a:p>
         </p:txBody>
       </p:sp>
+      <p:sp>
+        <p:nvSpPr>
+          <p:cNvPr id="7" name="Rectangle 6">
+            <a:extLst>
+              <a:ext uri="{FF2B5EF4-FFF2-40B4-BE49-F238E27FC236}">
+                <a16:creationId xmlns:a16="http://schemas.microsoft.com/office/drawing/2014/main" id="{AAAFCDCE-6440-4FA2-A0A7-F9D5566587F5}"/>
+              </a:ext>
+            </a:extLst>
+          </p:cNvPr>
+          <p:cNvSpPr/>
+          <p:nvPr/>
+        </p:nvSpPr>
+        <p:spPr>
+          <a:xfrm>
+            <a:off x="1005014" y="2273415"/>
+            <a:ext cx="10758617" cy="3682226"/>
+          </a:xfrm>
+          <a:prstGeom prst="rect">
+            <a:avLst/>
+          </a:prstGeom>
+        </p:spPr>
+        <p:txBody>
+          <a:bodyPr wrap="square">
+            <a:spAutoFit/>
+          </a:bodyPr>
+          <a:lstStyle/>
+          <a:p>
+            <a:pPr marL="285750" indent="-285750">
+              <a:lnSpc>
+                <a:spcPct val="200000"/>
+              </a:lnSpc>
+              <a:buBlip>
+                <a:blip r:embed="rId2"/>
+              </a:buBlip>
+            </a:pPr>
+            <a:r>
+              <a:rPr lang="en-US" sz="2400">
+                <a:solidFill>
+                  <a:srgbClr val="273849"/>
+                </a:solidFill>
+                <a:latin typeface="Source Sans Pro" panose="020B0503030403020204" pitchFamily="34" charset="0"/>
+              </a:rPr>
+              <a:t>Performant </a:t>
+            </a:r>
+            <a:r>
+              <a:rPr lang="en-US" sz="2400" b="1">
+                <a:solidFill>
+                  <a:srgbClr val="273849"/>
+                </a:solidFill>
+                <a:latin typeface="Source Sans Pro" panose="020B0503030403020204" pitchFamily="34" charset="0"/>
+              </a:rPr>
+              <a:t>progressive javascript framework</a:t>
+            </a:r>
+            <a:r>
+              <a:rPr lang="en-US" sz="2400">
+                <a:solidFill>
+                  <a:srgbClr val="304455"/>
+                </a:solidFill>
+                <a:latin typeface="Source Sans Pro" panose="020B0503030403020204" pitchFamily="34" charset="0"/>
+              </a:rPr>
+              <a:t> for building user interfaces </a:t>
+            </a:r>
+          </a:p>
+          <a:p>
+            <a:pPr marL="285750" indent="-285750">
+              <a:lnSpc>
+                <a:spcPct val="200000"/>
+              </a:lnSpc>
+              <a:buBlip>
+                <a:blip r:embed="rId2"/>
+              </a:buBlip>
+            </a:pPr>
+            <a:r>
+              <a:rPr lang="en-US" sz="2400">
+                <a:solidFill>
+                  <a:srgbClr val="304455"/>
+                </a:solidFill>
+                <a:latin typeface="Source Sans Pro" panose="020B0503030403020204" pitchFamily="34" charset="0"/>
+              </a:rPr>
+              <a:t>Designed to be incrementally </a:t>
+            </a:r>
+            <a:r>
+              <a:rPr lang="en-US" sz="2400" b="1">
+                <a:solidFill>
+                  <a:srgbClr val="304455"/>
+                </a:solidFill>
+                <a:latin typeface="Source Sans Pro" panose="020B0503030403020204" pitchFamily="34" charset="0"/>
+              </a:rPr>
+              <a:t>adoptable</a:t>
+            </a:r>
+          </a:p>
+          <a:p>
+            <a:pPr marL="285750" indent="-285750">
+              <a:lnSpc>
+                <a:spcPct val="200000"/>
+              </a:lnSpc>
+              <a:buBlip>
+                <a:blip r:embed="rId2"/>
+              </a:buBlip>
+            </a:pPr>
+            <a:r>
+              <a:rPr lang="en-US" sz="2400">
+                <a:solidFill>
+                  <a:srgbClr val="304455"/>
+                </a:solidFill>
+                <a:latin typeface="Source Sans Pro" panose="020B0503030403020204" pitchFamily="34" charset="0"/>
+              </a:rPr>
+              <a:t>Easy </a:t>
+            </a:r>
+            <a:r>
+              <a:rPr lang="en-US" sz="2400" b="1">
+                <a:solidFill>
+                  <a:srgbClr val="304455"/>
+                </a:solidFill>
+                <a:latin typeface="Source Sans Pro" panose="020B0503030403020204" pitchFamily="34" charset="0"/>
+              </a:rPr>
+              <a:t>integration</a:t>
+            </a:r>
+            <a:r>
+              <a:rPr lang="en-US" sz="2400">
+                <a:solidFill>
+                  <a:srgbClr val="304455"/>
+                </a:solidFill>
+                <a:latin typeface="Source Sans Pro" panose="020B0503030403020204" pitchFamily="34" charset="0"/>
+              </a:rPr>
+              <a:t> with other libraries or existing projects</a:t>
+            </a:r>
+          </a:p>
+          <a:p>
+            <a:pPr marL="285750" indent="-285750">
+              <a:lnSpc>
+                <a:spcPct val="200000"/>
+              </a:lnSpc>
+              <a:buBlip>
+                <a:blip r:embed="rId2"/>
+              </a:buBlip>
+            </a:pPr>
+            <a:r>
+              <a:rPr lang="en-US" sz="2400">
+                <a:solidFill>
+                  <a:srgbClr val="304455"/>
+                </a:solidFill>
+                <a:latin typeface="Source Sans Pro" panose="020B0503030403020204" pitchFamily="34" charset="0"/>
+              </a:rPr>
+              <a:t>Capable of powering Single-Page Applications </a:t>
+            </a:r>
+            <a:r>
+              <a:rPr lang="en-US" sz="2400"/>
+              <a:t>when used in combination with </a:t>
+            </a:r>
+            <a:r>
+              <a:rPr lang="en-US" sz="2400" b="1"/>
+              <a:t>modern tooling </a:t>
+            </a:r>
+            <a:r>
+              <a:rPr lang="en-US" sz="2400"/>
+              <a:t>and </a:t>
+            </a:r>
+            <a:r>
+              <a:rPr lang="en-US" sz="2400" b="1"/>
+              <a:t>supporting libraries </a:t>
+            </a:r>
+            <a:r>
+              <a:rPr lang="en-US" sz="2400"/>
+              <a:t>(Vuex,Vue-Router, …)</a:t>
+            </a:r>
+          </a:p>
+        </p:txBody>
+      </p:sp>
+      <p:sp>
+        <p:nvSpPr>
+          <p:cNvPr id="8" name="Rectangle 7">
+            <a:extLst>
+              <a:ext uri="{FF2B5EF4-FFF2-40B4-BE49-F238E27FC236}">
+                <a16:creationId xmlns:a16="http://schemas.microsoft.com/office/drawing/2014/main" id="{044CA204-FC35-4E68-8721-CE2A360433DB}"/>
+              </a:ext>
+            </a:extLst>
+          </p:cNvPr>
+          <p:cNvSpPr/>
+          <p:nvPr/>
+        </p:nvSpPr>
+        <p:spPr>
+          <a:xfrm>
+            <a:off x="1005014" y="1644846"/>
+            <a:ext cx="2060179" cy="523220"/>
+          </a:xfrm>
+          <a:prstGeom prst="rect">
+            <a:avLst/>
+          </a:prstGeom>
+        </p:spPr>
+        <p:txBody>
+          <a:bodyPr wrap="none">
+            <a:spAutoFit/>
+          </a:bodyPr>
+          <a:lstStyle/>
+          <a:p>
+            <a:r>
+              <a:rPr lang="en-US" sz="2800" b="1">
+                <a:solidFill>
+                  <a:srgbClr val="304455"/>
+                </a:solidFill>
+                <a:latin typeface="Source Sans Pro" panose="020B0503030403020204" pitchFamily="34" charset="0"/>
+              </a:rPr>
+              <a:t>What is Vue?</a:t>
+            </a:r>
+            <a:endParaRPr lang="fa-IR" sz="2800"/>
+          </a:p>
+        </p:txBody>
+      </p:sp>
     </p:spTree>
     <p:extLst>
       <p:ext uri="{BB962C8B-B14F-4D97-AF65-F5344CB8AC3E}">
@@ -3560,327 +3681,571 @@
   <p:clrMapOvr>
     <a:masterClrMapping/>
   </p:clrMapOvr>
-  <p:timing>
-    <p:tnLst>
-      <p:par>
-        <p:cTn id="1" dur="indefinite" restart="never" nodeType="tmRoot">
-          <p:childTnLst>
-            <p:seq concurrent="1" nextAc="seek">
-              <p:cTn id="2" dur="indefinite" nodeType="mainSeq">
-                <p:childTnLst>
-                  <p:par>
-                    <p:cTn id="3" fill="hold">
-                      <p:stCondLst>
-                        <p:cond delay="indefinite"/>
-                      </p:stCondLst>
-                      <p:childTnLst>
-                        <p:par>
-                          <p:cTn id="4" fill="hold">
-                            <p:stCondLst>
-                              <p:cond delay="0"/>
-                            </p:stCondLst>
-                            <p:childTnLst>
-                              <p:par>
-                                <p:cTn id="5" presetID="2" presetClass="entr" presetSubtype="8" fill="hold" nodeType="clickEffect">
-                                  <p:stCondLst>
-                                    <p:cond delay="0"/>
-                                  </p:stCondLst>
-                                  <p:childTnLst>
-                                    <p:set>
-                                      <p:cBhvr>
-                                        <p:cTn id="6" dur="1" fill="hold">
-                                          <p:stCondLst>
-                                            <p:cond delay="0"/>
-                                          </p:stCondLst>
-                                        </p:cTn>
-                                        <p:tgtEl>
-                                          <p:spTgt spid="3">
-                                            <p:txEl>
-                                              <p:pRg st="0" end="0"/>
-                                            </p:txEl>
-                                          </p:spTgt>
-                                        </p:tgtEl>
-                                        <p:attrNameLst>
-                                          <p:attrName>style.visibility</p:attrName>
-                                        </p:attrNameLst>
-                                      </p:cBhvr>
-                                      <p:to>
-                                        <p:strVal val="visible"/>
-                                      </p:to>
-                                    </p:set>
-                                    <p:anim calcmode="lin" valueType="num">
-                                      <p:cBhvr additive="base">
-                                        <p:cTn id="7" dur="500" fill="hold"/>
-                                        <p:tgtEl>
-                                          <p:spTgt spid="3">
-                                            <p:txEl>
-                                              <p:pRg st="0" end="0"/>
-                                            </p:txEl>
-                                          </p:spTgt>
-                                        </p:tgtEl>
-                                        <p:attrNameLst>
-                                          <p:attrName>ppt_x</p:attrName>
-                                        </p:attrNameLst>
-                                      </p:cBhvr>
-                                      <p:tavLst>
-                                        <p:tav tm="0">
-                                          <p:val>
-                                            <p:strVal val="0-#ppt_w/2"/>
-                                          </p:val>
-                                        </p:tav>
-                                        <p:tav tm="100000">
-                                          <p:val>
-                                            <p:strVal val="#ppt_x"/>
-                                          </p:val>
-                                        </p:tav>
-                                      </p:tavLst>
-                                    </p:anim>
-                                    <p:anim calcmode="lin" valueType="num">
-                                      <p:cBhvr additive="base">
-                                        <p:cTn id="8" dur="500" fill="hold"/>
-                                        <p:tgtEl>
-                                          <p:spTgt spid="3">
-                                            <p:txEl>
-                                              <p:pRg st="0" end="0"/>
-                                            </p:txEl>
-                                          </p:spTgt>
-                                        </p:tgtEl>
-                                        <p:attrNameLst>
-                                          <p:attrName>ppt_y</p:attrName>
-                                        </p:attrNameLst>
-                                      </p:cBhvr>
-                                      <p:tavLst>
-                                        <p:tav tm="0">
-                                          <p:val>
-                                            <p:strVal val="#ppt_y"/>
-                                          </p:val>
-                                        </p:tav>
-                                        <p:tav tm="100000">
-                                          <p:val>
-                                            <p:strVal val="#ppt_y"/>
-                                          </p:val>
-                                        </p:tav>
-                                      </p:tavLst>
-                                    </p:anim>
-                                  </p:childTnLst>
-                                </p:cTn>
-                              </p:par>
-                            </p:childTnLst>
-                          </p:cTn>
-                        </p:par>
-                        <p:par>
-                          <p:cTn id="9" fill="hold">
-                            <p:stCondLst>
-                              <p:cond delay="500"/>
-                            </p:stCondLst>
-                            <p:childTnLst>
-                              <p:par>
-                                <p:cTn id="10" presetID="2" presetClass="entr" presetSubtype="8" fill="hold" nodeType="afterEffect">
-                                  <p:stCondLst>
-                                    <p:cond delay="0"/>
-                                  </p:stCondLst>
-                                  <p:childTnLst>
-                                    <p:set>
-                                      <p:cBhvr>
-                                        <p:cTn id="11" dur="1" fill="hold">
-                                          <p:stCondLst>
-                                            <p:cond delay="0"/>
-                                          </p:stCondLst>
-                                        </p:cTn>
-                                        <p:tgtEl>
-                                          <p:spTgt spid="3">
-                                            <p:txEl>
-                                              <p:pRg st="1" end="1"/>
-                                            </p:txEl>
-                                          </p:spTgt>
-                                        </p:tgtEl>
-                                        <p:attrNameLst>
-                                          <p:attrName>style.visibility</p:attrName>
-                                        </p:attrNameLst>
-                                      </p:cBhvr>
-                                      <p:to>
-                                        <p:strVal val="visible"/>
-                                      </p:to>
-                                    </p:set>
-                                    <p:anim calcmode="lin" valueType="num">
-                                      <p:cBhvr additive="base">
-                                        <p:cTn id="12" dur="500" fill="hold"/>
-                                        <p:tgtEl>
-                                          <p:spTgt spid="3">
-                                            <p:txEl>
-                                              <p:pRg st="1" end="1"/>
-                                            </p:txEl>
-                                          </p:spTgt>
-                                        </p:tgtEl>
-                                        <p:attrNameLst>
-                                          <p:attrName>ppt_x</p:attrName>
-                                        </p:attrNameLst>
-                                      </p:cBhvr>
-                                      <p:tavLst>
-                                        <p:tav tm="0">
-                                          <p:val>
-                                            <p:strVal val="0-#ppt_w/2"/>
-                                          </p:val>
-                                        </p:tav>
-                                        <p:tav tm="100000">
-                                          <p:val>
-                                            <p:strVal val="#ppt_x"/>
-                                          </p:val>
-                                        </p:tav>
-                                      </p:tavLst>
-                                    </p:anim>
-                                    <p:anim calcmode="lin" valueType="num">
-                                      <p:cBhvr additive="base">
-                                        <p:cTn id="13" dur="500" fill="hold"/>
-                                        <p:tgtEl>
-                                          <p:spTgt spid="3">
-                                            <p:txEl>
-                                              <p:pRg st="1" end="1"/>
-                                            </p:txEl>
-                                          </p:spTgt>
-                                        </p:tgtEl>
-                                        <p:attrNameLst>
-                                          <p:attrName>ppt_y</p:attrName>
-                                        </p:attrNameLst>
-                                      </p:cBhvr>
-                                      <p:tavLst>
-                                        <p:tav tm="0">
-                                          <p:val>
-                                            <p:strVal val="#ppt_y"/>
-                                          </p:val>
-                                        </p:tav>
-                                        <p:tav tm="100000">
-                                          <p:val>
-                                            <p:strVal val="#ppt_y"/>
-                                          </p:val>
-                                        </p:tav>
-                                      </p:tavLst>
-                                    </p:anim>
-                                  </p:childTnLst>
-                                </p:cTn>
-                              </p:par>
-                            </p:childTnLst>
-                          </p:cTn>
-                        </p:par>
-                        <p:par>
-                          <p:cTn id="14" fill="hold">
-                            <p:stCondLst>
-                              <p:cond delay="1000"/>
-                            </p:stCondLst>
-                            <p:childTnLst>
-                              <p:par>
-                                <p:cTn id="15" presetID="2" presetClass="entr" presetSubtype="8" fill="hold" nodeType="afterEffect">
-                                  <p:stCondLst>
-                                    <p:cond delay="0"/>
-                                  </p:stCondLst>
-                                  <p:childTnLst>
-                                    <p:set>
-                                      <p:cBhvr>
-                                        <p:cTn id="16" dur="1" fill="hold">
-                                          <p:stCondLst>
-                                            <p:cond delay="0"/>
-                                          </p:stCondLst>
-                                        </p:cTn>
-                                        <p:tgtEl>
-                                          <p:spTgt spid="3">
-                                            <p:txEl>
-                                              <p:pRg st="2" end="2"/>
-                                            </p:txEl>
-                                          </p:spTgt>
-                                        </p:tgtEl>
-                                        <p:attrNameLst>
-                                          <p:attrName>style.visibility</p:attrName>
-                                        </p:attrNameLst>
-                                      </p:cBhvr>
-                                      <p:to>
-                                        <p:strVal val="visible"/>
-                                      </p:to>
-                                    </p:set>
-                                    <p:anim calcmode="lin" valueType="num">
-                                      <p:cBhvr additive="base">
-                                        <p:cTn id="17" dur="500" fill="hold"/>
-                                        <p:tgtEl>
-                                          <p:spTgt spid="3">
-                                            <p:txEl>
-                                              <p:pRg st="2" end="2"/>
-                                            </p:txEl>
-                                          </p:spTgt>
-                                        </p:tgtEl>
-                                        <p:attrNameLst>
-                                          <p:attrName>ppt_x</p:attrName>
-                                        </p:attrNameLst>
-                                      </p:cBhvr>
-                                      <p:tavLst>
-                                        <p:tav tm="0">
-                                          <p:val>
-                                            <p:strVal val="0-#ppt_w/2"/>
-                                          </p:val>
-                                        </p:tav>
-                                        <p:tav tm="100000">
-                                          <p:val>
-                                            <p:strVal val="#ppt_x"/>
-                                          </p:val>
-                                        </p:tav>
-                                      </p:tavLst>
-                                    </p:anim>
-                                    <p:anim calcmode="lin" valueType="num">
-                                      <p:cBhvr additive="base">
-                                        <p:cTn id="18" dur="500" fill="hold"/>
-                                        <p:tgtEl>
-                                          <p:spTgt spid="3">
-                                            <p:txEl>
-                                              <p:pRg st="2" end="2"/>
-                                            </p:txEl>
-                                          </p:spTgt>
-                                        </p:tgtEl>
-                                        <p:attrNameLst>
-                                          <p:attrName>ppt_y</p:attrName>
-                                        </p:attrNameLst>
-                                      </p:cBhvr>
-                                      <p:tavLst>
-                                        <p:tav tm="0">
-                                          <p:val>
-                                            <p:strVal val="#ppt_y"/>
-                                          </p:val>
-                                        </p:tav>
-                                        <p:tav tm="100000">
-                                          <p:val>
-                                            <p:strVal val="#ppt_y"/>
-                                          </p:val>
-                                        </p:tav>
-                                      </p:tavLst>
-                                    </p:anim>
-                                  </p:childTnLst>
-                                </p:cTn>
-                              </p:par>
-                            </p:childTnLst>
-                          </p:cTn>
-                        </p:par>
-                      </p:childTnLst>
-                    </p:cTn>
-                  </p:par>
-                </p:childTnLst>
-              </p:cTn>
-              <p:prevCondLst>
-                <p:cond evt="onPrev" delay="0">
-                  <p:tgtEl>
-                    <p:sldTgt/>
-                  </p:tgtEl>
-                </p:cond>
-              </p:prevCondLst>
-              <p:nextCondLst>
-                <p:cond evt="onNext" delay="0">
-                  <p:tgtEl>
-                    <p:sldTgt/>
-                  </p:tgtEl>
-                </p:cond>
-              </p:nextCondLst>
-            </p:seq>
-          </p:childTnLst>
-        </p:cTn>
-      </p:par>
-    </p:tnLst>
-  </p:timing>
+</p:sld>
+</file>
+
+<file path=ppt/slides/slide2.xml><?xml version="1.0" encoding="utf-8"?>
+<p:sld xmlns:a="http://schemas.openxmlformats.org/drawingml/2006/main" xmlns:r="http://schemas.openxmlformats.org/officeDocument/2006/relationships" xmlns:p="http://schemas.openxmlformats.org/presentationml/2006/main">
+  <p:cSld>
+    <p:spTree>
+      <p:nvGrpSpPr>
+        <p:cNvPr id="1" name=""/>
+        <p:cNvGrpSpPr/>
+        <p:nvPr/>
+      </p:nvGrpSpPr>
+      <p:grpSpPr>
+        <a:xfrm>
+          <a:off x="0" y="0"/>
+          <a:ext cx="0" cy="0"/>
+          <a:chOff x="0" y="0"/>
+          <a:chExt cx="0" cy="0"/>
+        </a:xfrm>
+      </p:grpSpPr>
+      <p:sp>
+        <p:nvSpPr>
+          <p:cNvPr id="2" name="Title 1">
+            <a:extLst>
+              <a:ext uri="{FF2B5EF4-FFF2-40B4-BE49-F238E27FC236}">
+                <a16:creationId xmlns:a16="http://schemas.microsoft.com/office/drawing/2014/main" id="{A7E295F5-7C5C-4AEA-9FFF-37FB3C1E9414}"/>
+              </a:ext>
+            </a:extLst>
+          </p:cNvPr>
+          <p:cNvSpPr>
+            <a:spLocks noGrp="1"/>
+          </p:cNvSpPr>
+          <p:nvPr>
+            <p:ph type="ctrTitle"/>
+          </p:nvPr>
+        </p:nvSpPr>
+        <p:spPr>
+          <a:xfrm>
+            <a:off x="0" y="-1144"/>
+            <a:ext cx="12192000" cy="1014248"/>
+          </a:xfrm>
+          <a:solidFill>
+            <a:srgbClr val="41B883"/>
+          </a:solidFill>
+        </p:spPr>
+        <p:txBody>
+          <a:bodyPr anchor="ctr"/>
+          <a:lstStyle/>
+          <a:p>
+            <a:r>
+              <a:rPr lang="en-US">
+                <a:solidFill>
+                  <a:srgbClr val="35495E"/>
+                </a:solidFill>
+              </a:rPr>
+              <a:t>Vue Pros</a:t>
+            </a:r>
+            <a:endParaRPr lang="en-US" dirty="0">
+              <a:solidFill>
+                <a:srgbClr val="35495E"/>
+              </a:solidFill>
+            </a:endParaRPr>
+          </a:p>
+        </p:txBody>
+      </p:sp>
+      <p:sp>
+        <p:nvSpPr>
+          <p:cNvPr id="4" name="Title 1">
+            <a:extLst>
+              <a:ext uri="{FF2B5EF4-FFF2-40B4-BE49-F238E27FC236}">
+                <a16:creationId xmlns:a16="http://schemas.microsoft.com/office/drawing/2014/main" id="{608B8AFC-C2D7-424F-897D-50890123973C}"/>
+              </a:ext>
+            </a:extLst>
+          </p:cNvPr>
+          <p:cNvSpPr txBox="1">
+            <a:spLocks/>
+          </p:cNvSpPr>
+          <p:nvPr/>
+        </p:nvSpPr>
+        <p:spPr>
+          <a:xfrm>
+            <a:off x="0" y="1005534"/>
+            <a:ext cx="12192000" cy="112919"/>
+          </a:xfrm>
+          <a:prstGeom prst="rect">
+            <a:avLst/>
+          </a:prstGeom>
+          <a:solidFill>
+            <a:srgbClr val="35495E"/>
+          </a:solidFill>
+        </p:spPr>
+        <p:txBody>
+          <a:bodyPr vert="horz" lIns="91440" tIns="45720" rIns="91440" bIns="45720" rtlCol="0" anchor="ctr">
+            <a:normAutofit fontScale="25000" lnSpcReduction="20000"/>
+          </a:bodyPr>
+          <a:lstStyle>
+            <a:lvl1pPr algn="ctr" defTabSz="914400" rtl="0" eaLnBrk="1" latinLnBrk="0" hangingPunct="1">
+              <a:lnSpc>
+                <a:spcPct val="90000"/>
+              </a:lnSpc>
+              <a:spcBef>
+                <a:spcPct val="0"/>
+              </a:spcBef>
+              <a:buNone/>
+              <a:defRPr sz="6000" kern="1200">
+                <a:solidFill>
+                  <a:schemeClr val="tx1"/>
+                </a:solidFill>
+                <a:latin typeface="+mj-lt"/>
+                <a:ea typeface="+mj-ea"/>
+                <a:cs typeface="+mj-cs"/>
+              </a:defRPr>
+            </a:lvl1pPr>
+          </a:lstStyle>
+          <a:p>
+            <a:endParaRPr lang="en-US">
+              <a:solidFill>
+                <a:srgbClr val="35495E"/>
+              </a:solidFill>
+            </a:endParaRPr>
+          </a:p>
+        </p:txBody>
+      </p:sp>
+      <p:sp>
+        <p:nvSpPr>
+          <p:cNvPr id="7" name="Rectangle 6">
+            <a:extLst>
+              <a:ext uri="{FF2B5EF4-FFF2-40B4-BE49-F238E27FC236}">
+                <a16:creationId xmlns:a16="http://schemas.microsoft.com/office/drawing/2014/main" id="{AAAFCDCE-6440-4FA2-A0A7-F9D5566587F5}"/>
+              </a:ext>
+            </a:extLst>
+          </p:cNvPr>
+          <p:cNvSpPr/>
+          <p:nvPr/>
+        </p:nvSpPr>
+        <p:spPr>
+          <a:xfrm>
+            <a:off x="1005014" y="1770813"/>
+            <a:ext cx="10758617" cy="5021055"/>
+          </a:xfrm>
+          <a:prstGeom prst="rect">
+            <a:avLst/>
+          </a:prstGeom>
+        </p:spPr>
+        <p:txBody>
+          <a:bodyPr wrap="square">
+            <a:spAutoFit/>
+          </a:bodyPr>
+          <a:lstStyle/>
+          <a:p>
+            <a:pPr marL="285750" indent="-285750">
+              <a:lnSpc>
+                <a:spcPct val="150000"/>
+              </a:lnSpc>
+              <a:buBlip>
+                <a:blip r:embed="rId2"/>
+              </a:buBlip>
+            </a:pPr>
+            <a:r>
+              <a:rPr lang="en-US" sz="2400">
+                <a:solidFill>
+                  <a:srgbClr val="273849"/>
+                </a:solidFill>
+                <a:latin typeface="Source Sans Pro" panose="020B0503030403020204" pitchFamily="34" charset="0"/>
+              </a:rPr>
+              <a:t>Small Size (</a:t>
+            </a:r>
+            <a:r>
+              <a:rPr lang="en-US" sz="2400" b="1">
+                <a:solidFill>
+                  <a:srgbClr val="273849"/>
+                </a:solidFill>
+                <a:latin typeface="Source Sans Pro" panose="020B0503030403020204" pitchFamily="34" charset="0"/>
+              </a:rPr>
+              <a:t>18 KB after gzipping)</a:t>
+            </a:r>
+          </a:p>
+          <a:p>
+            <a:pPr marL="285750" indent="-285750">
+              <a:lnSpc>
+                <a:spcPct val="150000"/>
+              </a:lnSpc>
+              <a:buBlip>
+                <a:blip r:embed="rId2"/>
+              </a:buBlip>
+            </a:pPr>
+            <a:r>
+              <a:rPr lang="en-US" sz="2400">
+                <a:solidFill>
+                  <a:srgbClr val="304455"/>
+                </a:solidFill>
+                <a:latin typeface="Source Sans Pro" panose="020B0503030403020204" pitchFamily="34" charset="0"/>
+              </a:rPr>
+              <a:t>Ease of understanding and development</a:t>
+            </a:r>
+          </a:p>
+          <a:p>
+            <a:pPr marL="285750" indent="-285750">
+              <a:lnSpc>
+                <a:spcPct val="150000"/>
+              </a:lnSpc>
+              <a:buBlip>
+                <a:blip r:embed="rId2"/>
+              </a:buBlip>
+            </a:pPr>
+            <a:r>
+              <a:rPr lang="en-US" sz="2400">
+                <a:solidFill>
+                  <a:srgbClr val="304455"/>
+                </a:solidFill>
+                <a:latin typeface="Source Sans Pro" panose="020B0503030403020204" pitchFamily="34" charset="0"/>
+              </a:rPr>
+              <a:t>Simple Integration</a:t>
+            </a:r>
+          </a:p>
+          <a:p>
+            <a:pPr marL="285750" indent="-285750">
+              <a:lnSpc>
+                <a:spcPct val="150000"/>
+              </a:lnSpc>
+              <a:buBlip>
+                <a:blip r:embed="rId2"/>
+              </a:buBlip>
+            </a:pPr>
+            <a:r>
+              <a:rPr lang="en-US" sz="2400">
+                <a:solidFill>
+                  <a:srgbClr val="304455"/>
+                </a:solidFill>
+                <a:latin typeface="Source Sans Pro" panose="020B0503030403020204" pitchFamily="34" charset="0"/>
+              </a:rPr>
+              <a:t>Comprehensive documentation</a:t>
+            </a:r>
+          </a:p>
+          <a:p>
+            <a:pPr marL="285750" indent="-285750">
+              <a:lnSpc>
+                <a:spcPct val="150000"/>
+              </a:lnSpc>
+              <a:buBlip>
+                <a:blip r:embed="rId2"/>
+              </a:buBlip>
+            </a:pPr>
+            <a:r>
+              <a:rPr lang="en-US" sz="2400"/>
+              <a:t>Flexibility</a:t>
+            </a:r>
+          </a:p>
+          <a:p>
+            <a:pPr marL="285750" indent="-285750">
+              <a:lnSpc>
+                <a:spcPct val="150000"/>
+              </a:lnSpc>
+              <a:buBlip>
+                <a:blip r:embed="rId2"/>
+              </a:buBlip>
+            </a:pPr>
+            <a:r>
+              <a:rPr lang="en-US" sz="2400"/>
+              <a:t>Reactivity</a:t>
+            </a:r>
+          </a:p>
+          <a:p>
+            <a:pPr marL="285750" indent="-285750">
+              <a:lnSpc>
+                <a:spcPct val="150000"/>
+              </a:lnSpc>
+              <a:buBlip>
+                <a:blip r:embed="rId2"/>
+              </a:buBlip>
+            </a:pPr>
+            <a:r>
+              <a:rPr lang="en-US" sz="2400"/>
+              <a:t>Powerfull CLI</a:t>
+            </a:r>
+          </a:p>
+          <a:p>
+            <a:pPr marL="285750" indent="-285750">
+              <a:lnSpc>
+                <a:spcPct val="150000"/>
+              </a:lnSpc>
+              <a:buBlip>
+                <a:blip r:embed="rId2"/>
+              </a:buBlip>
+            </a:pPr>
+            <a:r>
+              <a:rPr lang="en-US" sz="2400"/>
+              <a:t>TypeScript Support</a:t>
+            </a:r>
+          </a:p>
+          <a:p>
+            <a:pPr marL="285750" indent="-285750">
+              <a:lnSpc>
+                <a:spcPct val="150000"/>
+              </a:lnSpc>
+              <a:buBlip>
+                <a:blip r:embed="rId2"/>
+              </a:buBlip>
+            </a:pPr>
+            <a:r>
+              <a:rPr lang="en-US" sz="2400"/>
+              <a:t>Browser devtools extensions</a:t>
+            </a:r>
+          </a:p>
+        </p:txBody>
+      </p:sp>
+      <p:sp>
+        <p:nvSpPr>
+          <p:cNvPr id="8" name="Rectangle 7">
+            <a:extLst>
+              <a:ext uri="{FF2B5EF4-FFF2-40B4-BE49-F238E27FC236}">
+                <a16:creationId xmlns:a16="http://schemas.microsoft.com/office/drawing/2014/main" id="{044CA204-FC35-4E68-8721-CE2A360433DB}"/>
+              </a:ext>
+            </a:extLst>
+          </p:cNvPr>
+          <p:cNvSpPr/>
+          <p:nvPr/>
+        </p:nvSpPr>
+        <p:spPr>
+          <a:xfrm>
+            <a:off x="1005014" y="1310754"/>
+            <a:ext cx="1491114" cy="523220"/>
+          </a:xfrm>
+          <a:prstGeom prst="rect">
+            <a:avLst/>
+          </a:prstGeom>
+        </p:spPr>
+        <p:txBody>
+          <a:bodyPr wrap="none">
+            <a:spAutoFit/>
+          </a:bodyPr>
+          <a:lstStyle/>
+          <a:p>
+            <a:r>
+              <a:rPr lang="en-US" sz="2800" b="1">
+                <a:solidFill>
+                  <a:srgbClr val="304455"/>
+                </a:solidFill>
+                <a:latin typeface="Source Sans Pro" panose="020B0503030403020204" pitchFamily="34" charset="0"/>
+              </a:rPr>
+              <a:t>Vue Pros</a:t>
+            </a:r>
+            <a:endParaRPr lang="fa-IR" sz="2800"/>
+          </a:p>
+        </p:txBody>
+      </p:sp>
+    </p:spTree>
+    <p:extLst>
+      <p:ext uri="{BB962C8B-B14F-4D97-AF65-F5344CB8AC3E}">
+        <p14:creationId xmlns:p14="http://schemas.microsoft.com/office/powerpoint/2010/main" val="2538989491"/>
+      </p:ext>
+    </p:extLst>
+  </p:cSld>
+  <p:clrMapOvr>
+    <a:masterClrMapping/>
+  </p:clrMapOvr>
+</p:sld>
+</file>
+
+<file path=ppt/slides/slide3.xml><?xml version="1.0" encoding="utf-8"?>
+<p:sld xmlns:a="http://schemas.openxmlformats.org/drawingml/2006/main" xmlns:r="http://schemas.openxmlformats.org/officeDocument/2006/relationships" xmlns:p="http://schemas.openxmlformats.org/presentationml/2006/main">
+  <p:cSld>
+    <p:spTree>
+      <p:nvGrpSpPr>
+        <p:cNvPr id="1" name=""/>
+        <p:cNvGrpSpPr/>
+        <p:nvPr/>
+      </p:nvGrpSpPr>
+      <p:grpSpPr>
+        <a:xfrm>
+          <a:off x="0" y="0"/>
+          <a:ext cx="0" cy="0"/>
+          <a:chOff x="0" y="0"/>
+          <a:chExt cx="0" cy="0"/>
+        </a:xfrm>
+      </p:grpSpPr>
+      <p:pic>
+        <p:nvPicPr>
+          <p:cNvPr id="9" name="Picture 8">
+            <a:extLst>
+              <a:ext uri="{FF2B5EF4-FFF2-40B4-BE49-F238E27FC236}">
+                <a16:creationId xmlns:a16="http://schemas.microsoft.com/office/drawing/2014/main" id="{8675B964-EB8F-44D7-9739-7BDFA76BF09A}"/>
+              </a:ext>
+            </a:extLst>
+          </p:cNvPr>
+          <p:cNvPicPr>
+            <a:picLocks noChangeAspect="1"/>
+          </p:cNvPicPr>
+          <p:nvPr/>
+        </p:nvPicPr>
+        <p:blipFill>
+          <a:blip r:embed="rId2">
+            <a:extLst>
+              <a:ext uri="{28A0092B-C50C-407E-A947-70E740481C1C}">
+                <a14:useLocalDpi xmlns:a14="http://schemas.microsoft.com/office/drawing/2010/main" val="0"/>
+              </a:ext>
+            </a:extLst>
+          </a:blip>
+          <a:stretch>
+            <a:fillRect/>
+          </a:stretch>
+        </p:blipFill>
+        <p:spPr>
+          <a:xfrm>
+            <a:off x="2756180" y="1535972"/>
+            <a:ext cx="6679637" cy="4316494"/>
+          </a:xfrm>
+          <a:prstGeom prst="rect">
+            <a:avLst/>
+          </a:prstGeom>
+        </p:spPr>
+      </p:pic>
+      <p:sp>
+        <p:nvSpPr>
+          <p:cNvPr id="2" name="Title 1">
+            <a:extLst>
+              <a:ext uri="{FF2B5EF4-FFF2-40B4-BE49-F238E27FC236}">
+                <a16:creationId xmlns:a16="http://schemas.microsoft.com/office/drawing/2014/main" id="{A7E295F5-7C5C-4AEA-9FFF-37FB3C1E9414}"/>
+              </a:ext>
+            </a:extLst>
+          </p:cNvPr>
+          <p:cNvSpPr>
+            <a:spLocks noGrp="1"/>
+          </p:cNvSpPr>
+          <p:nvPr>
+            <p:ph type="ctrTitle"/>
+          </p:nvPr>
+        </p:nvSpPr>
+        <p:spPr>
+          <a:xfrm>
+            <a:off x="0" y="-1144"/>
+            <a:ext cx="12192000" cy="1014248"/>
+          </a:xfrm>
+          <a:solidFill>
+            <a:srgbClr val="41B883"/>
+          </a:solidFill>
+        </p:spPr>
+        <p:txBody>
+          <a:bodyPr anchor="ctr"/>
+          <a:lstStyle/>
+          <a:p>
+            <a:r>
+              <a:rPr lang="en-US">
+                <a:solidFill>
+                  <a:srgbClr val="35495E"/>
+                </a:solidFill>
+              </a:rPr>
+              <a:t>Vue Popularity</a:t>
+            </a:r>
+            <a:endParaRPr lang="en-US" dirty="0">
+              <a:solidFill>
+                <a:srgbClr val="35495E"/>
+              </a:solidFill>
+            </a:endParaRPr>
+          </a:p>
+        </p:txBody>
+      </p:sp>
+      <p:sp>
+        <p:nvSpPr>
+          <p:cNvPr id="4" name="Title 1">
+            <a:extLst>
+              <a:ext uri="{FF2B5EF4-FFF2-40B4-BE49-F238E27FC236}">
+                <a16:creationId xmlns:a16="http://schemas.microsoft.com/office/drawing/2014/main" id="{608B8AFC-C2D7-424F-897D-50890123973C}"/>
+              </a:ext>
+            </a:extLst>
+          </p:cNvPr>
+          <p:cNvSpPr txBox="1">
+            <a:spLocks/>
+          </p:cNvSpPr>
+          <p:nvPr/>
+        </p:nvSpPr>
+        <p:spPr>
+          <a:xfrm>
+            <a:off x="0" y="1005534"/>
+            <a:ext cx="12192000" cy="112919"/>
+          </a:xfrm>
+          <a:prstGeom prst="rect">
+            <a:avLst/>
+          </a:prstGeom>
+          <a:solidFill>
+            <a:srgbClr val="35495E"/>
+          </a:solidFill>
+        </p:spPr>
+        <p:txBody>
+          <a:bodyPr vert="horz" lIns="91440" tIns="45720" rIns="91440" bIns="45720" rtlCol="0" anchor="ctr">
+            <a:normAutofit fontScale="25000" lnSpcReduction="20000"/>
+          </a:bodyPr>
+          <a:lstStyle>
+            <a:lvl1pPr algn="ctr" defTabSz="914400" rtl="0" eaLnBrk="1" latinLnBrk="0" hangingPunct="1">
+              <a:lnSpc>
+                <a:spcPct val="90000"/>
+              </a:lnSpc>
+              <a:spcBef>
+                <a:spcPct val="0"/>
+              </a:spcBef>
+              <a:buNone/>
+              <a:defRPr sz="6000" kern="1200">
+                <a:solidFill>
+                  <a:schemeClr val="tx1"/>
+                </a:solidFill>
+                <a:latin typeface="+mj-lt"/>
+                <a:ea typeface="+mj-ea"/>
+                <a:cs typeface="+mj-cs"/>
+              </a:defRPr>
+            </a:lvl1pPr>
+          </a:lstStyle>
+          <a:p>
+            <a:endParaRPr lang="en-US">
+              <a:solidFill>
+                <a:srgbClr val="35495E"/>
+              </a:solidFill>
+            </a:endParaRPr>
+          </a:p>
+        </p:txBody>
+      </p:sp>
+      <p:sp>
+        <p:nvSpPr>
+          <p:cNvPr id="8" name="Rectangle 7">
+            <a:extLst>
+              <a:ext uri="{FF2B5EF4-FFF2-40B4-BE49-F238E27FC236}">
+                <a16:creationId xmlns:a16="http://schemas.microsoft.com/office/drawing/2014/main" id="{044CA204-FC35-4E68-8721-CE2A360433DB}"/>
+              </a:ext>
+            </a:extLst>
+          </p:cNvPr>
+          <p:cNvSpPr/>
+          <p:nvPr/>
+        </p:nvSpPr>
+        <p:spPr>
+          <a:xfrm>
+            <a:off x="3745574" y="6008375"/>
+            <a:ext cx="4700847" cy="523220"/>
+          </a:xfrm>
+          <a:prstGeom prst="rect">
+            <a:avLst/>
+          </a:prstGeom>
+        </p:spPr>
+        <p:txBody>
+          <a:bodyPr wrap="square">
+            <a:spAutoFit/>
+          </a:bodyPr>
+          <a:lstStyle/>
+          <a:p>
+            <a:r>
+              <a:rPr lang="en-US" sz="2800" b="1">
+                <a:solidFill>
+                  <a:srgbClr val="304455"/>
+                </a:solidFill>
+                <a:latin typeface="Source Sans Pro" panose="020B0503030403020204" pitchFamily="34" charset="0"/>
+              </a:rPr>
+              <a:t>Fast Growing Stars On Github</a:t>
+            </a:r>
+            <a:endParaRPr lang="fa-IR" sz="2800"/>
+          </a:p>
+        </p:txBody>
+      </p:sp>
+    </p:spTree>
+    <p:extLst>
+      <p:ext uri="{BB962C8B-B14F-4D97-AF65-F5344CB8AC3E}">
+        <p14:creationId xmlns:p14="http://schemas.microsoft.com/office/powerpoint/2010/main" val="3369786885"/>
+      </p:ext>
+    </p:extLst>
+  </p:cSld>
+  <p:clrMapOvr>
+    <a:masterClrMapping/>
+  </p:clrMapOvr>
 </p:sld>
 </file>
 

</xml_diff>

<commit_message>
Correct some typos in presentation
</commit_message>
<xml_diff>
--- a/Presentations/01 - Introduction/01 - What is Vue.js.pptx
+++ b/Presentations/01 - Introduction/01 - What is Vue.js.pptx
@@ -3626,7 +3626,7 @@
             </a:r>
             <a:r>
               <a:rPr lang="en-US" sz="2400"/>
-              <a:t>(Vuex,Vue-Router, …)</a:t>
+              <a:t>(Vue-Router, Vuex, etc …)</a:t>
             </a:r>
           </a:p>
         </p:txBody>
@@ -3846,7 +3846,7 @@
                 </a:solidFill>
                 <a:latin typeface="Source Sans Pro" panose="020B0503030403020204" pitchFamily="34" charset="0"/>
               </a:rPr>
-              <a:t>Small Size (</a:t>
+              <a:t>Small Size (18 KB after gzipping</a:t>
             </a:r>
             <a:r>
               <a:rPr lang="en-US" sz="2400" b="1">
@@ -3855,7 +3855,7 @@
                 </a:solidFill>
                 <a:latin typeface="Source Sans Pro" panose="020B0503030403020204" pitchFamily="34" charset="0"/>
               </a:rPr>
-              <a:t>18 KB after gzipping)</a:t>
+              <a:t>)</a:t>
             </a:r>
           </a:p>
           <a:p>
@@ -4001,7 +4001,7 @@
         </p:nvSpPr>
         <p:spPr>
           <a:xfrm>
-            <a:off x="1005014" y="1310754"/>
+            <a:off x="1005014" y="1247593"/>
             <a:ext cx="1491114" cy="523220"/>
           </a:xfrm>
           <a:prstGeom prst="rect">
@@ -4085,7 +4085,7 @@
         </p:blipFill>
         <p:spPr>
           <a:xfrm>
-            <a:off x="2756180" y="1535972"/>
+            <a:off x="2756178" y="1405167"/>
             <a:ext cx="6679637" cy="4316494"/>
           </a:xfrm>
           <a:prstGeom prst="rect">

</xml_diff>

<commit_message>
Complete Vue Introduction Presentation
</commit_message>
<xml_diff>
--- a/Presentations/01 - Introduction/01 - What is Vue.js.pptx
+++ b/Presentations/01 - Introduction/01 - What is Vue.js.pptx
@@ -4,6 +4,9 @@
   <p:sldMasterIdLst>
     <p:sldMasterId id="2147483648" r:id="rId1"/>
   </p:sldMasterIdLst>
+  <p:notesMasterIdLst>
+    <p:notesMasterId r:id="rId5"/>
+  </p:notesMasterIdLst>
   <p:sldIdLst>
     <p:sldId id="256" r:id="rId2"/>
     <p:sldId id="258" r:id="rId3"/>
@@ -114,6 +117,440 @@
 </p:presentation>
 </file>
 
+<file path=ppt/notesMasters/notesMaster1.xml><?xml version="1.0" encoding="utf-8"?>
+<p:notesMaster xmlns:a="http://schemas.openxmlformats.org/drawingml/2006/main" xmlns:r="http://schemas.openxmlformats.org/officeDocument/2006/relationships" xmlns:p="http://schemas.openxmlformats.org/presentationml/2006/main">
+  <p:cSld>
+    <p:bg>
+      <p:bgRef idx="1001">
+        <a:schemeClr val="bg1"/>
+      </p:bgRef>
+    </p:bg>
+    <p:spTree>
+      <p:nvGrpSpPr>
+        <p:cNvPr id="1" name=""/>
+        <p:cNvGrpSpPr/>
+        <p:nvPr/>
+      </p:nvGrpSpPr>
+      <p:grpSpPr>
+        <a:xfrm>
+          <a:off x="0" y="0"/>
+          <a:ext cx="0" cy="0"/>
+          <a:chOff x="0" y="0"/>
+          <a:chExt cx="0" cy="0"/>
+        </a:xfrm>
+      </p:grpSpPr>
+      <p:sp>
+        <p:nvSpPr>
+          <p:cNvPr id="2" name="Header Placeholder 1"/>
+          <p:cNvSpPr>
+            <a:spLocks noGrp="1"/>
+          </p:cNvSpPr>
+          <p:nvPr>
+            <p:ph type="hdr" sz="quarter"/>
+          </p:nvPr>
+        </p:nvSpPr>
+        <p:spPr>
+          <a:xfrm>
+            <a:off x="0" y="0"/>
+            <a:ext cx="2971800" cy="458788"/>
+          </a:xfrm>
+          <a:prstGeom prst="rect">
+            <a:avLst/>
+          </a:prstGeom>
+        </p:spPr>
+        <p:txBody>
+          <a:bodyPr vert="horz" lIns="91440" tIns="45720" rIns="91440" bIns="45720" rtlCol="0"/>
+          <a:lstStyle>
+            <a:lvl1pPr algn="r">
+              <a:defRPr sz="1200"/>
+            </a:lvl1pPr>
+          </a:lstStyle>
+          <a:p>
+            <a:endParaRPr lang="fa-IR"/>
+          </a:p>
+        </p:txBody>
+      </p:sp>
+      <p:sp>
+        <p:nvSpPr>
+          <p:cNvPr id="3" name="Date Placeholder 2"/>
+          <p:cNvSpPr>
+            <a:spLocks noGrp="1"/>
+          </p:cNvSpPr>
+          <p:nvPr>
+            <p:ph type="dt" idx="1"/>
+          </p:nvPr>
+        </p:nvSpPr>
+        <p:spPr>
+          <a:xfrm>
+            <a:off x="3884613" y="0"/>
+            <a:ext cx="2971800" cy="458788"/>
+          </a:xfrm>
+          <a:prstGeom prst="rect">
+            <a:avLst/>
+          </a:prstGeom>
+        </p:spPr>
+        <p:txBody>
+          <a:bodyPr vert="horz" lIns="91440" tIns="45720" rIns="91440" bIns="45720" rtlCol="0"/>
+          <a:lstStyle>
+            <a:lvl1pPr algn="l">
+              <a:defRPr sz="1200"/>
+            </a:lvl1pPr>
+          </a:lstStyle>
+          <a:p>
+            <a:fld id="{0C79E95C-CCDF-4035-B6E4-E5E4DED86327}" type="datetimeFigureOut">
+              <a:rPr lang="fa-IR" smtClean="0"/>
+              <a:t>07/02/1441</a:t>
+            </a:fld>
+            <a:endParaRPr lang="fa-IR"/>
+          </a:p>
+        </p:txBody>
+      </p:sp>
+      <p:sp>
+        <p:nvSpPr>
+          <p:cNvPr id="4" name="Slide Image Placeholder 3"/>
+          <p:cNvSpPr>
+            <a:spLocks noGrp="1" noRot="1" noChangeAspect="1"/>
+          </p:cNvSpPr>
+          <p:nvPr>
+            <p:ph type="sldImg" idx="2"/>
+          </p:nvPr>
+        </p:nvSpPr>
+        <p:spPr>
+          <a:xfrm>
+            <a:off x="685800" y="1143000"/>
+            <a:ext cx="5486400" cy="3086100"/>
+          </a:xfrm>
+          <a:prstGeom prst="rect">
+            <a:avLst/>
+          </a:prstGeom>
+          <a:noFill/>
+          <a:ln w="12700">
+            <a:solidFill>
+              <a:prstClr val="black"/>
+            </a:solidFill>
+          </a:ln>
+        </p:spPr>
+        <p:txBody>
+          <a:bodyPr vert="horz" lIns="91440" tIns="45720" rIns="91440" bIns="45720" rtlCol="0" anchor="ctr"/>
+          <a:lstStyle/>
+          <a:p>
+            <a:endParaRPr lang="fa-IR"/>
+          </a:p>
+        </p:txBody>
+      </p:sp>
+      <p:sp>
+        <p:nvSpPr>
+          <p:cNvPr id="5" name="Notes Placeholder 4"/>
+          <p:cNvSpPr>
+            <a:spLocks noGrp="1"/>
+          </p:cNvSpPr>
+          <p:nvPr>
+            <p:ph type="body" sz="quarter" idx="3"/>
+          </p:nvPr>
+        </p:nvSpPr>
+        <p:spPr>
+          <a:xfrm>
+            <a:off x="685800" y="4400550"/>
+            <a:ext cx="5486400" cy="3600450"/>
+          </a:xfrm>
+          <a:prstGeom prst="rect">
+            <a:avLst/>
+          </a:prstGeom>
+        </p:spPr>
+        <p:txBody>
+          <a:bodyPr vert="horz" lIns="91440" tIns="45720" rIns="91440" bIns="45720" rtlCol="0"/>
+          <a:lstStyle/>
+          <a:p>
+            <a:pPr lvl="0"/>
+            <a:r>
+              <a:rPr lang="en-US"/>
+              <a:t>Edit Master text styles</a:t>
+            </a:r>
+          </a:p>
+          <a:p>
+            <a:pPr lvl="1"/>
+            <a:r>
+              <a:rPr lang="en-US"/>
+              <a:t>Second level</a:t>
+            </a:r>
+          </a:p>
+          <a:p>
+            <a:pPr lvl="2"/>
+            <a:r>
+              <a:rPr lang="en-US"/>
+              <a:t>Third level</a:t>
+            </a:r>
+          </a:p>
+          <a:p>
+            <a:pPr lvl="3"/>
+            <a:r>
+              <a:rPr lang="en-US"/>
+              <a:t>Fourth level</a:t>
+            </a:r>
+          </a:p>
+          <a:p>
+            <a:pPr lvl="4"/>
+            <a:r>
+              <a:rPr lang="en-US"/>
+              <a:t>Fifth level</a:t>
+            </a:r>
+            <a:endParaRPr lang="fa-IR"/>
+          </a:p>
+        </p:txBody>
+      </p:sp>
+      <p:sp>
+        <p:nvSpPr>
+          <p:cNvPr id="6" name="Footer Placeholder 5"/>
+          <p:cNvSpPr>
+            <a:spLocks noGrp="1"/>
+          </p:cNvSpPr>
+          <p:nvPr>
+            <p:ph type="ftr" sz="quarter" idx="4"/>
+          </p:nvPr>
+        </p:nvSpPr>
+        <p:spPr>
+          <a:xfrm>
+            <a:off x="0" y="8685213"/>
+            <a:ext cx="2971800" cy="458787"/>
+          </a:xfrm>
+          <a:prstGeom prst="rect">
+            <a:avLst/>
+          </a:prstGeom>
+        </p:spPr>
+        <p:txBody>
+          <a:bodyPr vert="horz" lIns="91440" tIns="45720" rIns="91440" bIns="45720" rtlCol="0" anchor="b"/>
+          <a:lstStyle>
+            <a:lvl1pPr algn="r">
+              <a:defRPr sz="1200"/>
+            </a:lvl1pPr>
+          </a:lstStyle>
+          <a:p>
+            <a:endParaRPr lang="fa-IR"/>
+          </a:p>
+        </p:txBody>
+      </p:sp>
+      <p:sp>
+        <p:nvSpPr>
+          <p:cNvPr id="7" name="Slide Number Placeholder 6"/>
+          <p:cNvSpPr>
+            <a:spLocks noGrp="1"/>
+          </p:cNvSpPr>
+          <p:nvPr>
+            <p:ph type="sldNum" sz="quarter" idx="5"/>
+          </p:nvPr>
+        </p:nvSpPr>
+        <p:spPr>
+          <a:xfrm>
+            <a:off x="3884613" y="8685213"/>
+            <a:ext cx="2971800" cy="458787"/>
+          </a:xfrm>
+          <a:prstGeom prst="rect">
+            <a:avLst/>
+          </a:prstGeom>
+        </p:spPr>
+        <p:txBody>
+          <a:bodyPr vert="horz" lIns="91440" tIns="45720" rIns="91440" bIns="45720" rtlCol="0" anchor="b"/>
+          <a:lstStyle>
+            <a:lvl1pPr algn="l">
+              <a:defRPr sz="1200"/>
+            </a:lvl1pPr>
+          </a:lstStyle>
+          <a:p>
+            <a:fld id="{5E31C02D-7412-4DF3-9CE2-51B70D2BC3B4}" type="slidenum">
+              <a:rPr lang="fa-IR" smtClean="0"/>
+              <a:t>‹#›</a:t>
+            </a:fld>
+            <a:endParaRPr lang="fa-IR"/>
+          </a:p>
+        </p:txBody>
+      </p:sp>
+    </p:spTree>
+    <p:extLst>
+      <p:ext uri="{BB962C8B-B14F-4D97-AF65-F5344CB8AC3E}">
+        <p14:creationId xmlns:p14="http://schemas.microsoft.com/office/powerpoint/2010/main" val="2782492267"/>
+      </p:ext>
+    </p:extLst>
+  </p:cSld>
+  <p:clrMap bg1="lt1" tx1="dk1" bg2="lt2" tx2="dk2" accent1="accent1" accent2="accent2" accent3="accent3" accent4="accent4" accent5="accent5" accent6="accent6" hlink="hlink" folHlink="folHlink"/>
+  <p:notesStyle>
+    <a:lvl1pPr marL="0" algn="l" defTabSz="914400" rtl="0" eaLnBrk="1" latinLnBrk="0" hangingPunct="1">
+      <a:defRPr sz="1200" kern="1200">
+        <a:solidFill>
+          <a:schemeClr val="tx1"/>
+        </a:solidFill>
+        <a:latin typeface="+mn-lt"/>
+        <a:ea typeface="+mn-ea"/>
+        <a:cs typeface="+mn-cs"/>
+      </a:defRPr>
+    </a:lvl1pPr>
+    <a:lvl2pPr marL="457200" algn="l" defTabSz="914400" rtl="0" eaLnBrk="1" latinLnBrk="0" hangingPunct="1">
+      <a:defRPr sz="1200" kern="1200">
+        <a:solidFill>
+          <a:schemeClr val="tx1"/>
+        </a:solidFill>
+        <a:latin typeface="+mn-lt"/>
+        <a:ea typeface="+mn-ea"/>
+        <a:cs typeface="+mn-cs"/>
+      </a:defRPr>
+    </a:lvl2pPr>
+    <a:lvl3pPr marL="914400" algn="l" defTabSz="914400" rtl="0" eaLnBrk="1" latinLnBrk="0" hangingPunct="1">
+      <a:defRPr sz="1200" kern="1200">
+        <a:solidFill>
+          <a:schemeClr val="tx1"/>
+        </a:solidFill>
+        <a:latin typeface="+mn-lt"/>
+        <a:ea typeface="+mn-ea"/>
+        <a:cs typeface="+mn-cs"/>
+      </a:defRPr>
+    </a:lvl3pPr>
+    <a:lvl4pPr marL="1371600" algn="l" defTabSz="914400" rtl="0" eaLnBrk="1" latinLnBrk="0" hangingPunct="1">
+      <a:defRPr sz="1200" kern="1200">
+        <a:solidFill>
+          <a:schemeClr val="tx1"/>
+        </a:solidFill>
+        <a:latin typeface="+mn-lt"/>
+        <a:ea typeface="+mn-ea"/>
+        <a:cs typeface="+mn-cs"/>
+      </a:defRPr>
+    </a:lvl4pPr>
+    <a:lvl5pPr marL="1828800" algn="l" defTabSz="914400" rtl="0" eaLnBrk="1" latinLnBrk="0" hangingPunct="1">
+      <a:defRPr sz="1200" kern="1200">
+        <a:solidFill>
+          <a:schemeClr val="tx1"/>
+        </a:solidFill>
+        <a:latin typeface="+mn-lt"/>
+        <a:ea typeface="+mn-ea"/>
+        <a:cs typeface="+mn-cs"/>
+      </a:defRPr>
+    </a:lvl5pPr>
+    <a:lvl6pPr marL="2286000" algn="l" defTabSz="914400" rtl="0" eaLnBrk="1" latinLnBrk="0" hangingPunct="1">
+      <a:defRPr sz="1200" kern="1200">
+        <a:solidFill>
+          <a:schemeClr val="tx1"/>
+        </a:solidFill>
+        <a:latin typeface="+mn-lt"/>
+        <a:ea typeface="+mn-ea"/>
+        <a:cs typeface="+mn-cs"/>
+      </a:defRPr>
+    </a:lvl6pPr>
+    <a:lvl7pPr marL="2743200" algn="l" defTabSz="914400" rtl="0" eaLnBrk="1" latinLnBrk="0" hangingPunct="1">
+      <a:defRPr sz="1200" kern="1200">
+        <a:solidFill>
+          <a:schemeClr val="tx1"/>
+        </a:solidFill>
+        <a:latin typeface="+mn-lt"/>
+        <a:ea typeface="+mn-ea"/>
+        <a:cs typeface="+mn-cs"/>
+      </a:defRPr>
+    </a:lvl7pPr>
+    <a:lvl8pPr marL="3200400" algn="l" defTabSz="914400" rtl="0" eaLnBrk="1" latinLnBrk="0" hangingPunct="1">
+      <a:defRPr sz="1200" kern="1200">
+        <a:solidFill>
+          <a:schemeClr val="tx1"/>
+        </a:solidFill>
+        <a:latin typeface="+mn-lt"/>
+        <a:ea typeface="+mn-ea"/>
+        <a:cs typeface="+mn-cs"/>
+      </a:defRPr>
+    </a:lvl8pPr>
+    <a:lvl9pPr marL="3657600" algn="l" defTabSz="914400" rtl="0" eaLnBrk="1" latinLnBrk="0" hangingPunct="1">
+      <a:defRPr sz="1200" kern="1200">
+        <a:solidFill>
+          <a:schemeClr val="tx1"/>
+        </a:solidFill>
+        <a:latin typeface="+mn-lt"/>
+        <a:ea typeface="+mn-ea"/>
+        <a:cs typeface="+mn-cs"/>
+      </a:defRPr>
+    </a:lvl9pPr>
+  </p:notesStyle>
+</p:notesMaster>
+</file>
+
+<file path=ppt/notesSlides/notesSlide1.xml><?xml version="1.0" encoding="utf-8"?>
+<p:notes xmlns:a="http://schemas.openxmlformats.org/drawingml/2006/main" xmlns:r="http://schemas.openxmlformats.org/officeDocument/2006/relationships" xmlns:p="http://schemas.openxmlformats.org/presentationml/2006/main">
+  <p:cSld>
+    <p:spTree>
+      <p:nvGrpSpPr>
+        <p:cNvPr id="1" name=""/>
+        <p:cNvGrpSpPr/>
+        <p:nvPr/>
+      </p:nvGrpSpPr>
+      <p:grpSpPr>
+        <a:xfrm>
+          <a:off x="0" y="0"/>
+          <a:ext cx="0" cy="0"/>
+          <a:chOff x="0" y="0"/>
+          <a:chExt cx="0" cy="0"/>
+        </a:xfrm>
+      </p:grpSpPr>
+      <p:sp>
+        <p:nvSpPr>
+          <p:cNvPr id="2" name="Slide Image Placeholder 1"/>
+          <p:cNvSpPr>
+            <a:spLocks noGrp="1" noRot="1" noChangeAspect="1"/>
+          </p:cNvSpPr>
+          <p:nvPr>
+            <p:ph type="sldImg"/>
+          </p:nvPr>
+        </p:nvSpPr>
+        <p:spPr/>
+      </p:sp>
+      <p:sp>
+        <p:nvSpPr>
+          <p:cNvPr id="3" name="Notes Placeholder 2"/>
+          <p:cNvSpPr>
+            <a:spLocks noGrp="1"/>
+          </p:cNvSpPr>
+          <p:nvPr>
+            <p:ph type="body" idx="1"/>
+          </p:nvPr>
+        </p:nvSpPr>
+        <p:spPr/>
+        <p:txBody>
+          <a:bodyPr/>
+          <a:lstStyle/>
+          <a:p>
+            <a:endParaRPr lang="fa-IR"/>
+          </a:p>
+        </p:txBody>
+      </p:sp>
+      <p:sp>
+        <p:nvSpPr>
+          <p:cNvPr id="4" name="Slide Number Placeholder 3"/>
+          <p:cNvSpPr>
+            <a:spLocks noGrp="1"/>
+          </p:cNvSpPr>
+          <p:nvPr>
+            <p:ph type="sldNum" sz="quarter" idx="5"/>
+          </p:nvPr>
+        </p:nvSpPr>
+        <p:spPr/>
+        <p:txBody>
+          <a:bodyPr/>
+          <a:lstStyle/>
+          <a:p>
+            <a:fld id="{5E31C02D-7412-4DF3-9CE2-51B70D2BC3B4}" type="slidenum">
+              <a:rPr lang="fa-IR" smtClean="0"/>
+              <a:t>1</a:t>
+            </a:fld>
+            <a:endParaRPr lang="fa-IR"/>
+          </a:p>
+        </p:txBody>
+      </p:sp>
+    </p:spTree>
+    <p:extLst>
+      <p:ext uri="{BB962C8B-B14F-4D97-AF65-F5344CB8AC3E}">
+        <p14:creationId xmlns:p14="http://schemas.microsoft.com/office/powerpoint/2010/main" val="2654764853"/>
+      </p:ext>
+    </p:extLst>
+  </p:cSld>
+  <p:clrMapOvr>
+    <a:masterClrMapping/>
+  </p:clrMapOvr>
+</p:notes>
+</file>
+
 <file path=ppt/slideLayouts/slideLayout1.xml><?xml version="1.0" encoding="utf-8"?>
 <p:sldLayout xmlns:a="http://schemas.openxmlformats.org/drawingml/2006/main" xmlns:r="http://schemas.openxmlformats.org/officeDocument/2006/relationships" xmlns:p="http://schemas.openxmlformats.org/presentationml/2006/main" type="title" preserve="1">
   <p:cSld name="Title Slide">
@@ -261,7 +698,7 @@
           <a:p>
             <a:fld id="{51C3B6AB-4F42-441D-BDE8-4C7181B99EA9}" type="datetimeFigureOut">
               <a:rPr lang="en-US" smtClean="0"/>
-              <a:t>10/5/2019</a:t>
+              <a:t>10/6/2019</a:t>
             </a:fld>
             <a:endParaRPr lang="en-US"/>
           </a:p>
@@ -495,7 +932,7 @@
           <a:p>
             <a:fld id="{51C3B6AB-4F42-441D-BDE8-4C7181B99EA9}" type="datetimeFigureOut">
               <a:rPr lang="en-US" smtClean="0"/>
-              <a:t>10/5/2019</a:t>
+              <a:t>10/6/2019</a:t>
             </a:fld>
             <a:endParaRPr lang="en-US"/>
           </a:p>
@@ -703,7 +1140,7 @@
           <a:p>
             <a:fld id="{51C3B6AB-4F42-441D-BDE8-4C7181B99EA9}" type="datetimeFigureOut">
               <a:rPr lang="en-US" smtClean="0"/>
-              <a:t>10/5/2019</a:t>
+              <a:t>10/6/2019</a:t>
             </a:fld>
             <a:endParaRPr lang="en-US"/>
           </a:p>
@@ -901,7 +1338,7 @@
           <a:p>
             <a:fld id="{51C3B6AB-4F42-441D-BDE8-4C7181B99EA9}" type="datetimeFigureOut">
               <a:rPr lang="en-US" smtClean="0"/>
-              <a:t>10/5/2019</a:t>
+              <a:t>10/6/2019</a:t>
             </a:fld>
             <a:endParaRPr lang="en-US"/>
           </a:p>
@@ -1176,7 +1613,7 @@
           <a:p>
             <a:fld id="{51C3B6AB-4F42-441D-BDE8-4C7181B99EA9}" type="datetimeFigureOut">
               <a:rPr lang="en-US" smtClean="0"/>
-              <a:t>10/5/2019</a:t>
+              <a:t>10/6/2019</a:t>
             </a:fld>
             <a:endParaRPr lang="en-US"/>
           </a:p>
@@ -1441,7 +1878,7 @@
           <a:p>
             <a:fld id="{51C3B6AB-4F42-441D-BDE8-4C7181B99EA9}" type="datetimeFigureOut">
               <a:rPr lang="en-US" smtClean="0"/>
-              <a:t>10/5/2019</a:t>
+              <a:t>10/6/2019</a:t>
             </a:fld>
             <a:endParaRPr lang="en-US"/>
           </a:p>
@@ -1853,7 +2290,7 @@
           <a:p>
             <a:fld id="{51C3B6AB-4F42-441D-BDE8-4C7181B99EA9}" type="datetimeFigureOut">
               <a:rPr lang="en-US" smtClean="0"/>
-              <a:t>10/5/2019</a:t>
+              <a:t>10/6/2019</a:t>
             </a:fld>
             <a:endParaRPr lang="en-US"/>
           </a:p>
@@ -1994,7 +2431,7 @@
           <a:p>
             <a:fld id="{51C3B6AB-4F42-441D-BDE8-4C7181B99EA9}" type="datetimeFigureOut">
               <a:rPr lang="en-US" smtClean="0"/>
-              <a:t>10/5/2019</a:t>
+              <a:t>10/6/2019</a:t>
             </a:fld>
             <a:endParaRPr lang="en-US"/>
           </a:p>
@@ -2107,7 +2544,7 @@
           <a:p>
             <a:fld id="{51C3B6AB-4F42-441D-BDE8-4C7181B99EA9}" type="datetimeFigureOut">
               <a:rPr lang="en-US" smtClean="0"/>
-              <a:t>10/5/2019</a:t>
+              <a:t>10/6/2019</a:t>
             </a:fld>
             <a:endParaRPr lang="en-US"/>
           </a:p>
@@ -2418,7 +2855,7 @@
           <a:p>
             <a:fld id="{51C3B6AB-4F42-441D-BDE8-4C7181B99EA9}" type="datetimeFigureOut">
               <a:rPr lang="en-US" smtClean="0"/>
-              <a:t>10/5/2019</a:t>
+              <a:t>10/6/2019</a:t>
             </a:fld>
             <a:endParaRPr lang="en-US"/>
           </a:p>
@@ -2706,7 +3143,7 @@
           <a:p>
             <a:fld id="{51C3B6AB-4F42-441D-BDE8-4C7181B99EA9}" type="datetimeFigureOut">
               <a:rPr lang="en-US" smtClean="0"/>
-              <a:t>10/5/2019</a:t>
+              <a:t>10/6/2019</a:t>
             </a:fld>
             <a:endParaRPr lang="en-US"/>
           </a:p>
@@ -2947,7 +3384,7 @@
           <a:p>
             <a:fld id="{51C3B6AB-4F42-441D-BDE8-4C7181B99EA9}" type="datetimeFigureOut">
               <a:rPr lang="en-US" smtClean="0"/>
-              <a:t>10/5/2019</a:t>
+              <a:t>10/6/2019</a:t>
             </a:fld>
             <a:endParaRPr lang="en-US"/>
           </a:p>
@@ -3366,6 +3803,338 @@
       </p:grpSpPr>
       <p:sp>
         <p:nvSpPr>
+          <p:cNvPr id="7" name="Rectangle 6">
+            <a:extLst>
+              <a:ext uri="{FF2B5EF4-FFF2-40B4-BE49-F238E27FC236}">
+                <a16:creationId xmlns:a16="http://schemas.microsoft.com/office/drawing/2014/main" id="{AAAFCDCE-6440-4FA2-A0A7-F9D5566587F5}"/>
+              </a:ext>
+            </a:extLst>
+          </p:cNvPr>
+          <p:cNvSpPr/>
+          <p:nvPr/>
+        </p:nvSpPr>
+        <p:spPr>
+          <a:xfrm>
+            <a:off x="1005014" y="2273415"/>
+            <a:ext cx="10758617" cy="4420890"/>
+          </a:xfrm>
+          <a:prstGeom prst="rect">
+            <a:avLst/>
+          </a:prstGeom>
+        </p:spPr>
+        <p:txBody>
+          <a:bodyPr wrap="square">
+            <a:spAutoFit/>
+          </a:bodyPr>
+          <a:lstStyle/>
+          <a:p>
+            <a:pPr marL="285750" indent="-285750">
+              <a:lnSpc>
+                <a:spcPct val="200000"/>
+              </a:lnSpc>
+              <a:buBlip>
+                <a:blip r:embed="rId3"/>
+              </a:buBlip>
+            </a:pPr>
+            <a:r>
+              <a:rPr lang="en-US" sz="2400">
+                <a:solidFill>
+                  <a:srgbClr val="273849"/>
+                </a:solidFill>
+                <a:latin typeface="Source Sans Pro" panose="020B0503030403020204" pitchFamily="34" charset="0"/>
+              </a:rPr>
+              <a:t>Performant </a:t>
+            </a:r>
+            <a:r>
+              <a:rPr lang="en-US" sz="2400" b="1">
+                <a:solidFill>
+                  <a:srgbClr val="273849"/>
+                </a:solidFill>
+                <a:latin typeface="Source Sans Pro" panose="020B0503030403020204" pitchFamily="34" charset="0"/>
+              </a:rPr>
+              <a:t>progressive javascript framework</a:t>
+            </a:r>
+            <a:r>
+              <a:rPr lang="en-US" sz="2400">
+                <a:solidFill>
+                  <a:srgbClr val="304455"/>
+                </a:solidFill>
+                <a:latin typeface="Source Sans Pro" panose="020B0503030403020204" pitchFamily="34" charset="0"/>
+              </a:rPr>
+              <a:t> for building user interface</a:t>
+            </a:r>
+          </a:p>
+          <a:p>
+            <a:pPr marL="285750" indent="-285750">
+              <a:lnSpc>
+                <a:spcPct val="200000"/>
+              </a:lnSpc>
+              <a:buBlip>
+                <a:blip r:embed="rId3"/>
+              </a:buBlip>
+            </a:pPr>
+            <a:r>
+              <a:rPr lang="en-US" sz="2400">
+                <a:solidFill>
+                  <a:srgbClr val="304455"/>
+                </a:solidFill>
+                <a:latin typeface="Source Sans Pro" panose="020B0503030403020204" pitchFamily="34" charset="0"/>
+              </a:rPr>
+              <a:t>Helps you create a more maintainable and testable codebase </a:t>
+            </a:r>
+          </a:p>
+          <a:p>
+            <a:pPr marL="285750" indent="-285750">
+              <a:lnSpc>
+                <a:spcPct val="200000"/>
+              </a:lnSpc>
+              <a:buBlip>
+                <a:blip r:embed="rId3"/>
+              </a:buBlip>
+            </a:pPr>
+            <a:r>
+              <a:rPr lang="en-US" sz="2400">
+                <a:solidFill>
+                  <a:srgbClr val="304455"/>
+                </a:solidFill>
+                <a:latin typeface="Source Sans Pro" panose="020B0503030403020204" pitchFamily="34" charset="0"/>
+              </a:rPr>
+              <a:t>Designed to be incrementally </a:t>
+            </a:r>
+            <a:r>
+              <a:rPr lang="en-US" sz="2400" b="1">
+                <a:solidFill>
+                  <a:srgbClr val="304455"/>
+                </a:solidFill>
+                <a:latin typeface="Source Sans Pro" panose="020B0503030403020204" pitchFamily="34" charset="0"/>
+              </a:rPr>
+              <a:t>adoptable</a:t>
+            </a:r>
+          </a:p>
+          <a:p>
+            <a:pPr marL="285750" indent="-285750">
+              <a:lnSpc>
+                <a:spcPct val="200000"/>
+              </a:lnSpc>
+              <a:buBlip>
+                <a:blip r:embed="rId3"/>
+              </a:buBlip>
+            </a:pPr>
+            <a:r>
+              <a:rPr lang="en-US" sz="2400">
+                <a:solidFill>
+                  <a:srgbClr val="304455"/>
+                </a:solidFill>
+                <a:latin typeface="Source Sans Pro" panose="020B0503030403020204" pitchFamily="34" charset="0"/>
+              </a:rPr>
+              <a:t>Easy </a:t>
+            </a:r>
+            <a:r>
+              <a:rPr lang="en-US" sz="2400" b="1">
+                <a:solidFill>
+                  <a:srgbClr val="304455"/>
+                </a:solidFill>
+                <a:latin typeface="Source Sans Pro" panose="020B0503030403020204" pitchFamily="34" charset="0"/>
+              </a:rPr>
+              <a:t>integration</a:t>
+            </a:r>
+            <a:r>
+              <a:rPr lang="en-US" sz="2400">
+                <a:solidFill>
+                  <a:srgbClr val="304455"/>
+                </a:solidFill>
+                <a:latin typeface="Source Sans Pro" panose="020B0503030403020204" pitchFamily="34" charset="0"/>
+              </a:rPr>
+              <a:t> with other libraries or existing projects</a:t>
+            </a:r>
+          </a:p>
+          <a:p>
+            <a:pPr marL="285750" indent="-285750">
+              <a:lnSpc>
+                <a:spcPct val="200000"/>
+              </a:lnSpc>
+              <a:buBlip>
+                <a:blip r:embed="rId3"/>
+              </a:buBlip>
+            </a:pPr>
+            <a:r>
+              <a:rPr lang="en-US" sz="2400">
+                <a:solidFill>
+                  <a:srgbClr val="304455"/>
+                </a:solidFill>
+                <a:latin typeface="Source Sans Pro" panose="020B0503030403020204" pitchFamily="34" charset="0"/>
+              </a:rPr>
+              <a:t>Capable of powering Single-Page Applications </a:t>
+            </a:r>
+            <a:r>
+              <a:rPr lang="en-US" sz="2400"/>
+              <a:t>when used in combination with </a:t>
+            </a:r>
+            <a:r>
+              <a:rPr lang="en-US" sz="2400" b="1"/>
+              <a:t>modern tooling </a:t>
+            </a:r>
+            <a:r>
+              <a:rPr lang="en-US" sz="2400"/>
+              <a:t>and </a:t>
+            </a:r>
+            <a:r>
+              <a:rPr lang="en-US" sz="2400" b="1"/>
+              <a:t>supporting libraries </a:t>
+            </a:r>
+            <a:r>
+              <a:rPr lang="en-US" sz="2400"/>
+              <a:t>(Vue-Router, Vuex, …)</a:t>
+            </a:r>
+          </a:p>
+        </p:txBody>
+      </p:sp>
+      <p:pic>
+        <p:nvPicPr>
+          <p:cNvPr id="6" name="Picture 5">
+            <a:extLst>
+              <a:ext uri="{FF2B5EF4-FFF2-40B4-BE49-F238E27FC236}">
+                <a16:creationId xmlns:a16="http://schemas.microsoft.com/office/drawing/2014/main" id="{E68E1D6D-5499-4933-998E-9EED1ED3E755}"/>
+              </a:ext>
+            </a:extLst>
+          </p:cNvPr>
+          <p:cNvPicPr>
+            <a:picLocks noChangeAspect="1"/>
+          </p:cNvPicPr>
+          <p:nvPr/>
+        </p:nvPicPr>
+        <p:blipFill>
+          <a:blip r:embed="rId4">
+            <a:extLst>
+              <a:ext uri="{28A0092B-C50C-407E-A947-70E740481C1C}">
+                <a14:useLocalDpi xmlns:a14="http://schemas.microsoft.com/office/drawing/2010/main" val="0"/>
+              </a:ext>
+            </a:extLst>
+          </a:blip>
+          <a:stretch>
+            <a:fillRect/>
+          </a:stretch>
+        </p:blipFill>
+        <p:spPr>
+          <a:xfrm>
+            <a:off x="3299563" y="628910"/>
+            <a:ext cx="5600178" cy="5600178"/>
+          </a:xfrm>
+          <a:prstGeom prst="rect">
+            <a:avLst/>
+          </a:prstGeom>
+        </p:spPr>
+      </p:pic>
+      <p:pic>
+        <p:nvPicPr>
+          <p:cNvPr id="13" name="Picture 12">
+            <a:extLst>
+              <a:ext uri="{FF2B5EF4-FFF2-40B4-BE49-F238E27FC236}">
+                <a16:creationId xmlns:a16="http://schemas.microsoft.com/office/drawing/2014/main" id="{D59032ED-20D8-4A71-BCA9-69E00443A6B6}"/>
+              </a:ext>
+            </a:extLst>
+          </p:cNvPr>
+          <p:cNvPicPr>
+            <a:picLocks noChangeAspect="1"/>
+          </p:cNvPicPr>
+          <p:nvPr/>
+        </p:nvPicPr>
+        <p:blipFill>
+          <a:blip r:embed="rId5">
+            <a:extLst>
+              <a:ext uri="{28A0092B-C50C-407E-A947-70E740481C1C}">
+                <a14:useLocalDpi xmlns:a14="http://schemas.microsoft.com/office/drawing/2010/main" val="0"/>
+              </a:ext>
+            </a:extLst>
+          </a:blip>
+          <a:stretch>
+            <a:fillRect/>
+          </a:stretch>
+        </p:blipFill>
+        <p:spPr>
+          <a:xfrm>
+            <a:off x="4004187" y="902359"/>
+            <a:ext cx="4208678" cy="4876800"/>
+          </a:xfrm>
+          <a:prstGeom prst="rect">
+            <a:avLst/>
+          </a:prstGeom>
+        </p:spPr>
+      </p:pic>
+      <p:pic>
+        <p:nvPicPr>
+          <p:cNvPr id="11" name="Picture 10">
+            <a:extLst>
+              <a:ext uri="{FF2B5EF4-FFF2-40B4-BE49-F238E27FC236}">
+                <a16:creationId xmlns:a16="http://schemas.microsoft.com/office/drawing/2014/main" id="{BB8535B6-D249-46FB-ABDB-756E49A3EB9C}"/>
+              </a:ext>
+            </a:extLst>
+          </p:cNvPr>
+          <p:cNvPicPr>
+            <a:picLocks noChangeAspect="1"/>
+          </p:cNvPicPr>
+          <p:nvPr/>
+        </p:nvPicPr>
+        <p:blipFill>
+          <a:blip r:embed="rId6">
+            <a:extLst>
+              <a:ext uri="{28A0092B-C50C-407E-A947-70E740481C1C}">
+                <a14:useLocalDpi xmlns:a14="http://schemas.microsoft.com/office/drawing/2010/main" val="0"/>
+              </a:ext>
+            </a:extLst>
+          </a:blip>
+          <a:stretch>
+            <a:fillRect/>
+          </a:stretch>
+        </p:blipFill>
+        <p:spPr>
+          <a:xfrm>
+            <a:off x="4114743" y="1324427"/>
+            <a:ext cx="3962514" cy="4209143"/>
+          </a:xfrm>
+          <a:prstGeom prst="rect">
+            <a:avLst/>
+          </a:prstGeom>
+        </p:spPr>
+      </p:pic>
+      <p:pic>
+        <p:nvPicPr>
+          <p:cNvPr id="15" name="Picture 14">
+            <a:extLst>
+              <a:ext uri="{FF2B5EF4-FFF2-40B4-BE49-F238E27FC236}">
+                <a16:creationId xmlns:a16="http://schemas.microsoft.com/office/drawing/2014/main" id="{7E747217-A670-4A2A-9D93-821356854050}"/>
+              </a:ext>
+            </a:extLst>
+          </p:cNvPr>
+          <p:cNvPicPr>
+            <a:picLocks noChangeAspect="1"/>
+          </p:cNvPicPr>
+          <p:nvPr/>
+        </p:nvPicPr>
+        <p:blipFill>
+          <a:blip r:embed="rId7">
+            <a:extLst>
+              <a:ext uri="{28A0092B-C50C-407E-A947-70E740481C1C}">
+                <a14:useLocalDpi xmlns:a14="http://schemas.microsoft.com/office/drawing/2010/main" val="0"/>
+              </a:ext>
+            </a:extLst>
+          </a:blip>
+          <a:stretch>
+            <a:fillRect/>
+          </a:stretch>
+        </p:blipFill>
+        <p:spPr>
+          <a:xfrm>
+            <a:off x="3753859" y="132652"/>
+            <a:ext cx="4709334" cy="4709334"/>
+          </a:xfrm>
+          <a:prstGeom prst="rect">
+            <a:avLst/>
+          </a:prstGeom>
+        </p:spPr>
+      </p:pic>
+      <p:sp>
+        <p:nvSpPr>
           <p:cNvPr id="2" name="Title 1">
             <a:extLst>
               <a:ext uri="{FF2B5EF4-FFF2-40B4-BE49-F238E27FC236}">
@@ -3377,13 +4146,13 @@
             <a:spLocks noGrp="1"/>
           </p:cNvSpPr>
           <p:nvPr>
-            <p:ph type="ctrTitle"/>
+            <p:ph type="ctrTitle" idx="4294967295"/>
           </p:nvPr>
         </p:nvSpPr>
         <p:spPr>
           <a:xfrm>
-            <a:off x="0" y="-1144"/>
-            <a:ext cx="12192000" cy="1014248"/>
+            <a:off x="0" y="-1588"/>
+            <a:ext cx="12192000" cy="1014413"/>
           </a:xfrm>
           <a:solidFill>
             <a:srgbClr val="41B883"/>
@@ -3393,8 +4162,9 @@
           <a:bodyPr anchor="ctr"/>
           <a:lstStyle/>
           <a:p>
-            <a:r>
-              <a:rPr lang="en-US" dirty="0">
+            <a:pPr algn="ctr"/>
+            <a:r>
+              <a:rPr lang="en-US" b="1" dirty="0">
                 <a:solidFill>
                   <a:srgbClr val="35495E"/>
                 </a:solidFill>
@@ -3464,175 +4234,6 @@
       </p:sp>
       <p:sp>
         <p:nvSpPr>
-          <p:cNvPr id="7" name="Rectangle 6">
-            <a:extLst>
-              <a:ext uri="{FF2B5EF4-FFF2-40B4-BE49-F238E27FC236}">
-                <a16:creationId xmlns:a16="http://schemas.microsoft.com/office/drawing/2014/main" id="{AAAFCDCE-6440-4FA2-A0A7-F9D5566587F5}"/>
-              </a:ext>
-            </a:extLst>
-          </p:cNvPr>
-          <p:cNvSpPr/>
-          <p:nvPr/>
-        </p:nvSpPr>
-        <p:spPr>
-          <a:xfrm>
-            <a:off x="1005014" y="2273415"/>
-            <a:ext cx="10758617" cy="3682226"/>
-          </a:xfrm>
-          <a:prstGeom prst="rect">
-            <a:avLst/>
-          </a:prstGeom>
-        </p:spPr>
-        <p:txBody>
-          <a:bodyPr wrap="square">
-            <a:spAutoFit/>
-          </a:bodyPr>
-          <a:lstStyle/>
-          <a:p>
-            <a:pPr marL="285750" indent="-285750">
-              <a:lnSpc>
-                <a:spcPct val="200000"/>
-              </a:lnSpc>
-              <a:buBlip>
-                <a:blip r:embed="rId2"/>
-              </a:buBlip>
-            </a:pPr>
-            <a:r>
-              <a:rPr lang="en-US" sz="2400">
-                <a:solidFill>
-                  <a:srgbClr val="273849"/>
-                </a:solidFill>
-                <a:latin typeface="Source Sans Pro" panose="020B0503030403020204" pitchFamily="34" charset="0"/>
-              </a:rPr>
-              <a:t>Performant </a:t>
-            </a:r>
-            <a:r>
-              <a:rPr lang="en-US" sz="2400" b="1">
-                <a:solidFill>
-                  <a:srgbClr val="273849"/>
-                </a:solidFill>
-                <a:latin typeface="Source Sans Pro" panose="020B0503030403020204" pitchFamily="34" charset="0"/>
-              </a:rPr>
-              <a:t>progressive javascript framework</a:t>
-            </a:r>
-            <a:r>
-              <a:rPr lang="en-US" sz="2400">
-                <a:solidFill>
-                  <a:srgbClr val="304455"/>
-                </a:solidFill>
-                <a:latin typeface="Source Sans Pro" panose="020B0503030403020204" pitchFamily="34" charset="0"/>
-              </a:rPr>
-              <a:t> for building user interfaces </a:t>
-            </a:r>
-          </a:p>
-          <a:p>
-            <a:pPr marL="285750" indent="-285750">
-              <a:lnSpc>
-                <a:spcPct val="200000"/>
-              </a:lnSpc>
-              <a:buBlip>
-                <a:blip r:embed="rId2"/>
-              </a:buBlip>
-            </a:pPr>
-            <a:r>
-              <a:rPr lang="en-US" sz="2400">
-                <a:solidFill>
-                  <a:srgbClr val="304455"/>
-                </a:solidFill>
-                <a:latin typeface="Source Sans Pro" panose="020B0503030403020204" pitchFamily="34" charset="0"/>
-              </a:rPr>
-              <a:t>Designed to be incrementally </a:t>
-            </a:r>
-            <a:r>
-              <a:rPr lang="en-US" sz="2400" b="1">
-                <a:solidFill>
-                  <a:srgbClr val="304455"/>
-                </a:solidFill>
-                <a:latin typeface="Source Sans Pro" panose="020B0503030403020204" pitchFamily="34" charset="0"/>
-              </a:rPr>
-              <a:t>adoptable</a:t>
-            </a:r>
-          </a:p>
-          <a:p>
-            <a:pPr marL="285750" indent="-285750">
-              <a:lnSpc>
-                <a:spcPct val="200000"/>
-              </a:lnSpc>
-              <a:buBlip>
-                <a:blip r:embed="rId2"/>
-              </a:buBlip>
-            </a:pPr>
-            <a:r>
-              <a:rPr lang="en-US" sz="2400">
-                <a:solidFill>
-                  <a:srgbClr val="304455"/>
-                </a:solidFill>
-                <a:latin typeface="Source Sans Pro" panose="020B0503030403020204" pitchFamily="34" charset="0"/>
-              </a:rPr>
-              <a:t>Easy </a:t>
-            </a:r>
-            <a:r>
-              <a:rPr lang="en-US" sz="2400" b="1">
-                <a:solidFill>
-                  <a:srgbClr val="304455"/>
-                </a:solidFill>
-                <a:latin typeface="Source Sans Pro" panose="020B0503030403020204" pitchFamily="34" charset="0"/>
-              </a:rPr>
-              <a:t>integration</a:t>
-            </a:r>
-            <a:r>
-              <a:rPr lang="en-US" sz="2400">
-                <a:solidFill>
-                  <a:srgbClr val="304455"/>
-                </a:solidFill>
-                <a:latin typeface="Source Sans Pro" panose="020B0503030403020204" pitchFamily="34" charset="0"/>
-              </a:rPr>
-              <a:t> with other libraries or existing projects</a:t>
-            </a:r>
-          </a:p>
-          <a:p>
-            <a:pPr marL="285750" indent="-285750">
-              <a:lnSpc>
-                <a:spcPct val="200000"/>
-              </a:lnSpc>
-              <a:buBlip>
-                <a:blip r:embed="rId2"/>
-              </a:buBlip>
-            </a:pPr>
-            <a:r>
-              <a:rPr lang="en-US" sz="2400">
-                <a:solidFill>
-                  <a:srgbClr val="304455"/>
-                </a:solidFill>
-                <a:latin typeface="Source Sans Pro" panose="020B0503030403020204" pitchFamily="34" charset="0"/>
-              </a:rPr>
-              <a:t>Capable of powering Single-Page Applications </a:t>
-            </a:r>
-            <a:r>
-              <a:rPr lang="en-US" sz="2400"/>
-              <a:t>when used in combination with </a:t>
-            </a:r>
-            <a:r>
-              <a:rPr lang="en-US" sz="2400" b="1"/>
-              <a:t>modern tooling </a:t>
-            </a:r>
-            <a:r>
-              <a:rPr lang="en-US" sz="2400"/>
-              <a:t>and </a:t>
-            </a:r>
-            <a:r>
-              <a:rPr lang="en-US" sz="2400" b="1"/>
-              <a:t>supporting libraries </a:t>
-            </a:r>
-            <a:r>
-              <a:rPr lang="en-US" sz="2400"/>
-              <a:t>(Vue-Router, Vuex, etc …)</a:t>
-            </a:r>
-          </a:p>
-        </p:txBody>
-      </p:sp>
-      <p:sp>
-        <p:nvSpPr>
           <p:cNvPr id="8" name="Rectangle 7">
             <a:extLst>
               <a:ext uri="{FF2B5EF4-FFF2-40B4-BE49-F238E27FC236}">
@@ -3646,7 +4247,7 @@
         <p:spPr>
           <a:xfrm>
             <a:off x="1005014" y="1644846"/>
-            <a:ext cx="2060179" cy="523220"/>
+            <a:ext cx="1144865" cy="523220"/>
           </a:xfrm>
           <a:prstGeom prst="rect">
             <a:avLst/>
@@ -3665,9 +4266,87 @@
                 </a:solidFill>
                 <a:latin typeface="Source Sans Pro" panose="020B0503030403020204" pitchFamily="34" charset="0"/>
               </a:rPr>
-              <a:t>What is Vue?</a:t>
+              <a:t>Vue is:</a:t>
             </a:r>
             <a:endParaRPr lang="fa-IR" sz="2800"/>
+          </a:p>
+        </p:txBody>
+      </p:sp>
+      <p:sp>
+        <p:nvSpPr>
+          <p:cNvPr id="16" name="Rectangle 15">
+            <a:extLst>
+              <a:ext uri="{FF2B5EF4-FFF2-40B4-BE49-F238E27FC236}">
+                <a16:creationId xmlns:a16="http://schemas.microsoft.com/office/drawing/2014/main" id="{AC155869-DA1D-4620-BF54-146072766A8E}"/>
+              </a:ext>
+            </a:extLst>
+          </p:cNvPr>
+          <p:cNvSpPr/>
+          <p:nvPr/>
+        </p:nvSpPr>
+        <p:spPr>
+          <a:xfrm>
+            <a:off x="4217591" y="4924318"/>
+            <a:ext cx="3781869" cy="707886"/>
+          </a:xfrm>
+          <a:prstGeom prst="rect">
+            <a:avLst/>
+          </a:prstGeom>
+        </p:spPr>
+        <p:txBody>
+          <a:bodyPr wrap="none">
+            <a:spAutoFit/>
+          </a:bodyPr>
+          <a:lstStyle/>
+          <a:p>
+            <a:r>
+              <a:rPr lang="en-US" sz="4000" b="1">
+                <a:solidFill>
+                  <a:srgbClr val="35495E"/>
+                </a:solidFill>
+              </a:rPr>
+              <a:t>Vue Introduction</a:t>
+            </a:r>
+            <a:endParaRPr lang="fa-IR" sz="4000"/>
+          </a:p>
+        </p:txBody>
+      </p:sp>
+      <p:sp>
+        <p:nvSpPr>
+          <p:cNvPr id="17" name="Rectangle 16">
+            <a:extLst>
+              <a:ext uri="{FF2B5EF4-FFF2-40B4-BE49-F238E27FC236}">
+                <a16:creationId xmlns:a16="http://schemas.microsoft.com/office/drawing/2014/main" id="{AC4EC242-03AA-429D-A72A-FD5007F0B56F}"/>
+              </a:ext>
+            </a:extLst>
+          </p:cNvPr>
+          <p:cNvSpPr/>
+          <p:nvPr/>
+        </p:nvSpPr>
+        <p:spPr>
+          <a:xfrm>
+            <a:off x="3689978" y="3075055"/>
+            <a:ext cx="4837093" cy="707886"/>
+          </a:xfrm>
+          <a:prstGeom prst="rect">
+            <a:avLst/>
+          </a:prstGeom>
+        </p:spPr>
+        <p:txBody>
+          <a:bodyPr wrap="none">
+            <a:spAutoFit/>
+          </a:bodyPr>
+          <a:lstStyle/>
+          <a:p>
+            <a:r>
+              <a:rPr lang="en-US" sz="4000" b="1">
+                <a:solidFill>
+                  <a:srgbClr val="35495E"/>
+                </a:solidFill>
+              </a:rPr>
+              <a:t>JavaScript Framework</a:t>
+            </a:r>
+            <a:endParaRPr lang="fa-IR" sz="4000"/>
           </a:p>
         </p:txBody>
       </p:sp>
@@ -3681,6 +4360,1100 @@
   <p:clrMapOvr>
     <a:masterClrMapping/>
   </p:clrMapOvr>
+  <mc:AlternateContent xmlns:mc="http://schemas.openxmlformats.org/markup-compatibility/2006">
+    <mc:Choice xmlns:p159="http://schemas.microsoft.com/office/powerpoint/2015/09/main" Requires="p159">
+      <p:transition xmlns:p14="http://schemas.microsoft.com/office/powerpoint/2010/main" spd="slow" p14:dur="2000">
+        <p159:morph option="byObject"/>
+      </p:transition>
+    </mc:Choice>
+    <mc:Fallback>
+      <p:transition spd="slow">
+        <p:fade/>
+      </p:transition>
+    </mc:Fallback>
+  </mc:AlternateContent>
+  <p:timing>
+    <p:tnLst>
+      <p:par>
+        <p:cTn id="1" dur="indefinite" restart="never" nodeType="tmRoot">
+          <p:childTnLst>
+            <p:seq concurrent="1" nextAc="seek">
+              <p:cTn id="2" dur="indefinite" nodeType="mainSeq">
+                <p:childTnLst>
+                  <p:par>
+                    <p:cTn id="3" fill="hold">
+                      <p:stCondLst>
+                        <p:cond delay="indefinite"/>
+                      </p:stCondLst>
+                      <p:childTnLst>
+                        <p:par>
+                          <p:cTn id="4" fill="hold">
+                            <p:stCondLst>
+                              <p:cond delay="0"/>
+                            </p:stCondLst>
+                            <p:childTnLst>
+                              <p:par>
+                                <p:cTn id="5" presetID="42" presetClass="entr" presetSubtype="0" fill="hold" nodeType="clickEffect">
+                                  <p:stCondLst>
+                                    <p:cond delay="0"/>
+                                  </p:stCondLst>
+                                  <p:childTnLst>
+                                    <p:set>
+                                      <p:cBhvr>
+                                        <p:cTn id="6" dur="1" fill="hold">
+                                          <p:stCondLst>
+                                            <p:cond delay="0"/>
+                                          </p:stCondLst>
+                                        </p:cTn>
+                                        <p:tgtEl>
+                                          <p:spTgt spid="15"/>
+                                        </p:tgtEl>
+                                        <p:attrNameLst>
+                                          <p:attrName>style.visibility</p:attrName>
+                                        </p:attrNameLst>
+                                      </p:cBhvr>
+                                      <p:to>
+                                        <p:strVal val="visible"/>
+                                      </p:to>
+                                    </p:set>
+                                    <p:animEffect transition="in" filter="fade">
+                                      <p:cBhvr>
+                                        <p:cTn id="7" dur="750"/>
+                                        <p:tgtEl>
+                                          <p:spTgt spid="15"/>
+                                        </p:tgtEl>
+                                      </p:cBhvr>
+                                    </p:animEffect>
+                                    <p:anim calcmode="lin" valueType="num">
+                                      <p:cBhvr>
+                                        <p:cTn id="8" dur="750" fill="hold"/>
+                                        <p:tgtEl>
+                                          <p:spTgt spid="15"/>
+                                        </p:tgtEl>
+                                        <p:attrNameLst>
+                                          <p:attrName>ppt_x</p:attrName>
+                                        </p:attrNameLst>
+                                      </p:cBhvr>
+                                      <p:tavLst>
+                                        <p:tav tm="0">
+                                          <p:val>
+                                            <p:strVal val="#ppt_x"/>
+                                          </p:val>
+                                        </p:tav>
+                                        <p:tav tm="100000">
+                                          <p:val>
+                                            <p:strVal val="#ppt_x"/>
+                                          </p:val>
+                                        </p:tav>
+                                      </p:tavLst>
+                                    </p:anim>
+                                    <p:anim calcmode="lin" valueType="num">
+                                      <p:cBhvr>
+                                        <p:cTn id="9" dur="750" fill="hold"/>
+                                        <p:tgtEl>
+                                          <p:spTgt spid="15"/>
+                                        </p:tgtEl>
+                                        <p:attrNameLst>
+                                          <p:attrName>ppt_y</p:attrName>
+                                        </p:attrNameLst>
+                                      </p:cBhvr>
+                                      <p:tavLst>
+                                        <p:tav tm="0">
+                                          <p:val>
+                                            <p:strVal val="#ppt_y+.1"/>
+                                          </p:val>
+                                        </p:tav>
+                                        <p:tav tm="100000">
+                                          <p:val>
+                                            <p:strVal val="#ppt_y"/>
+                                          </p:val>
+                                        </p:tav>
+                                      </p:tavLst>
+                                    </p:anim>
+                                  </p:childTnLst>
+                                </p:cTn>
+                              </p:par>
+                            </p:childTnLst>
+                          </p:cTn>
+                        </p:par>
+                        <p:par>
+                          <p:cTn id="10" fill="hold">
+                            <p:stCondLst>
+                              <p:cond delay="750"/>
+                            </p:stCondLst>
+                            <p:childTnLst>
+                              <p:par>
+                                <p:cTn id="11" presetID="9" presetClass="entr" presetSubtype="0" fill="hold" grpId="0" nodeType="afterEffect">
+                                  <p:stCondLst>
+                                    <p:cond delay="0"/>
+                                  </p:stCondLst>
+                                  <p:childTnLst>
+                                    <p:set>
+                                      <p:cBhvr>
+                                        <p:cTn id="12" dur="1" fill="hold">
+                                          <p:stCondLst>
+                                            <p:cond delay="0"/>
+                                          </p:stCondLst>
+                                        </p:cTn>
+                                        <p:tgtEl>
+                                          <p:spTgt spid="16"/>
+                                        </p:tgtEl>
+                                        <p:attrNameLst>
+                                          <p:attrName>style.visibility</p:attrName>
+                                        </p:attrNameLst>
+                                      </p:cBhvr>
+                                      <p:to>
+                                        <p:strVal val="visible"/>
+                                      </p:to>
+                                    </p:set>
+                                    <p:animEffect transition="in" filter="dissolve">
+                                      <p:cBhvr>
+                                        <p:cTn id="13" dur="500"/>
+                                        <p:tgtEl>
+                                          <p:spTgt spid="16"/>
+                                        </p:tgtEl>
+                                      </p:cBhvr>
+                                    </p:animEffect>
+                                  </p:childTnLst>
+                                </p:cTn>
+                              </p:par>
+                            </p:childTnLst>
+                          </p:cTn>
+                        </p:par>
+                      </p:childTnLst>
+                    </p:cTn>
+                  </p:par>
+                  <p:par>
+                    <p:cTn id="14" fill="hold">
+                      <p:stCondLst>
+                        <p:cond delay="indefinite"/>
+                      </p:stCondLst>
+                      <p:childTnLst>
+                        <p:par>
+                          <p:cTn id="15" fill="hold">
+                            <p:stCondLst>
+                              <p:cond delay="0"/>
+                            </p:stCondLst>
+                            <p:childTnLst>
+                              <p:par>
+                                <p:cTn id="16" presetID="9" presetClass="exit" presetSubtype="0" fill="hold" nodeType="clickEffect">
+                                  <p:stCondLst>
+                                    <p:cond delay="0"/>
+                                  </p:stCondLst>
+                                  <p:childTnLst>
+                                    <p:animEffect transition="out" filter="dissolve">
+                                      <p:cBhvr>
+                                        <p:cTn id="17" dur="500"/>
+                                        <p:tgtEl>
+                                          <p:spTgt spid="15"/>
+                                        </p:tgtEl>
+                                      </p:cBhvr>
+                                    </p:animEffect>
+                                    <p:set>
+                                      <p:cBhvr>
+                                        <p:cTn id="18" dur="1" fill="hold">
+                                          <p:stCondLst>
+                                            <p:cond delay="499"/>
+                                          </p:stCondLst>
+                                        </p:cTn>
+                                        <p:tgtEl>
+                                          <p:spTgt spid="15"/>
+                                        </p:tgtEl>
+                                        <p:attrNameLst>
+                                          <p:attrName>style.visibility</p:attrName>
+                                        </p:attrNameLst>
+                                      </p:cBhvr>
+                                      <p:to>
+                                        <p:strVal val="hidden"/>
+                                      </p:to>
+                                    </p:set>
+                                  </p:childTnLst>
+                                </p:cTn>
+                              </p:par>
+                              <p:par>
+                                <p:cTn id="19" presetID="9" presetClass="exit" presetSubtype="0" fill="hold" grpId="1" nodeType="withEffect">
+                                  <p:stCondLst>
+                                    <p:cond delay="0"/>
+                                  </p:stCondLst>
+                                  <p:childTnLst>
+                                    <p:animEffect transition="out" filter="dissolve">
+                                      <p:cBhvr>
+                                        <p:cTn id="20" dur="500"/>
+                                        <p:tgtEl>
+                                          <p:spTgt spid="16"/>
+                                        </p:tgtEl>
+                                      </p:cBhvr>
+                                    </p:animEffect>
+                                    <p:set>
+                                      <p:cBhvr>
+                                        <p:cTn id="21" dur="1" fill="hold">
+                                          <p:stCondLst>
+                                            <p:cond delay="499"/>
+                                          </p:stCondLst>
+                                        </p:cTn>
+                                        <p:tgtEl>
+                                          <p:spTgt spid="16"/>
+                                        </p:tgtEl>
+                                        <p:attrNameLst>
+                                          <p:attrName>style.visibility</p:attrName>
+                                        </p:attrNameLst>
+                                      </p:cBhvr>
+                                      <p:to>
+                                        <p:strVal val="hidden"/>
+                                      </p:to>
+                                    </p:set>
+                                  </p:childTnLst>
+                                </p:cTn>
+                              </p:par>
+                            </p:childTnLst>
+                          </p:cTn>
+                        </p:par>
+                        <p:par>
+                          <p:cTn id="22" fill="hold">
+                            <p:stCondLst>
+                              <p:cond delay="500"/>
+                            </p:stCondLst>
+                            <p:childTnLst>
+                              <p:par>
+                                <p:cTn id="23" presetID="9" presetClass="entr" presetSubtype="0" fill="hold" grpId="0" nodeType="afterEffect">
+                                  <p:stCondLst>
+                                    <p:cond delay="0"/>
+                                  </p:stCondLst>
+                                  <p:childTnLst>
+                                    <p:set>
+                                      <p:cBhvr>
+                                        <p:cTn id="24" dur="1" fill="hold">
+                                          <p:stCondLst>
+                                            <p:cond delay="0"/>
+                                          </p:stCondLst>
+                                        </p:cTn>
+                                        <p:tgtEl>
+                                          <p:spTgt spid="17"/>
+                                        </p:tgtEl>
+                                        <p:attrNameLst>
+                                          <p:attrName>style.visibility</p:attrName>
+                                        </p:attrNameLst>
+                                      </p:cBhvr>
+                                      <p:to>
+                                        <p:strVal val="visible"/>
+                                      </p:to>
+                                    </p:set>
+                                    <p:animEffect transition="in" filter="dissolve">
+                                      <p:cBhvr>
+                                        <p:cTn id="25" dur="500"/>
+                                        <p:tgtEl>
+                                          <p:spTgt spid="17"/>
+                                        </p:tgtEl>
+                                      </p:cBhvr>
+                                    </p:animEffect>
+                                  </p:childTnLst>
+                                </p:cTn>
+                              </p:par>
+                            </p:childTnLst>
+                          </p:cTn>
+                        </p:par>
+                      </p:childTnLst>
+                    </p:cTn>
+                  </p:par>
+                  <p:par>
+                    <p:cTn id="26" fill="hold">
+                      <p:stCondLst>
+                        <p:cond delay="indefinite"/>
+                      </p:stCondLst>
+                      <p:childTnLst>
+                        <p:par>
+                          <p:cTn id="27" fill="hold">
+                            <p:stCondLst>
+                              <p:cond delay="0"/>
+                            </p:stCondLst>
+                            <p:childTnLst>
+                              <p:par>
+                                <p:cTn id="28" presetID="9" presetClass="exit" presetSubtype="0" fill="hold" grpId="1" nodeType="clickEffect">
+                                  <p:stCondLst>
+                                    <p:cond delay="0"/>
+                                  </p:stCondLst>
+                                  <p:childTnLst>
+                                    <p:animEffect transition="out" filter="dissolve">
+                                      <p:cBhvr>
+                                        <p:cTn id="29" dur="500"/>
+                                        <p:tgtEl>
+                                          <p:spTgt spid="17"/>
+                                        </p:tgtEl>
+                                      </p:cBhvr>
+                                    </p:animEffect>
+                                    <p:set>
+                                      <p:cBhvr>
+                                        <p:cTn id="30" dur="1" fill="hold">
+                                          <p:stCondLst>
+                                            <p:cond delay="499"/>
+                                          </p:stCondLst>
+                                        </p:cTn>
+                                        <p:tgtEl>
+                                          <p:spTgt spid="17"/>
+                                        </p:tgtEl>
+                                        <p:attrNameLst>
+                                          <p:attrName>style.visibility</p:attrName>
+                                        </p:attrNameLst>
+                                      </p:cBhvr>
+                                      <p:to>
+                                        <p:strVal val="hidden"/>
+                                      </p:to>
+                                    </p:set>
+                                  </p:childTnLst>
+                                </p:cTn>
+                              </p:par>
+                            </p:childTnLst>
+                          </p:cTn>
+                        </p:par>
+                        <p:par>
+                          <p:cTn id="31" fill="hold">
+                            <p:stCondLst>
+                              <p:cond delay="500"/>
+                            </p:stCondLst>
+                            <p:childTnLst>
+                              <p:par>
+                                <p:cTn id="32" presetID="10" presetClass="entr" presetSubtype="0" fill="hold" nodeType="afterEffect">
+                                  <p:stCondLst>
+                                    <p:cond delay="0"/>
+                                  </p:stCondLst>
+                                  <p:childTnLst>
+                                    <p:set>
+                                      <p:cBhvr>
+                                        <p:cTn id="33" dur="1" fill="hold">
+                                          <p:stCondLst>
+                                            <p:cond delay="0"/>
+                                          </p:stCondLst>
+                                        </p:cTn>
+                                        <p:tgtEl>
+                                          <p:spTgt spid="11"/>
+                                        </p:tgtEl>
+                                        <p:attrNameLst>
+                                          <p:attrName>style.visibility</p:attrName>
+                                        </p:attrNameLst>
+                                      </p:cBhvr>
+                                      <p:to>
+                                        <p:strVal val="visible"/>
+                                      </p:to>
+                                    </p:set>
+                                    <p:animEffect transition="in" filter="fade">
+                                      <p:cBhvr>
+                                        <p:cTn id="34" dur="500"/>
+                                        <p:tgtEl>
+                                          <p:spTgt spid="11"/>
+                                        </p:tgtEl>
+                                      </p:cBhvr>
+                                    </p:animEffect>
+                                  </p:childTnLst>
+                                </p:cTn>
+                              </p:par>
+                            </p:childTnLst>
+                          </p:cTn>
+                        </p:par>
+                      </p:childTnLst>
+                    </p:cTn>
+                  </p:par>
+                  <p:par>
+                    <p:cTn id="35" fill="hold">
+                      <p:stCondLst>
+                        <p:cond delay="indefinite"/>
+                      </p:stCondLst>
+                      <p:childTnLst>
+                        <p:par>
+                          <p:cTn id="36" fill="hold">
+                            <p:stCondLst>
+                              <p:cond delay="0"/>
+                            </p:stCondLst>
+                            <p:childTnLst>
+                              <p:par>
+                                <p:cTn id="37" presetID="10" presetClass="exit" presetSubtype="0" fill="hold" nodeType="clickEffect">
+                                  <p:stCondLst>
+                                    <p:cond delay="0"/>
+                                  </p:stCondLst>
+                                  <p:childTnLst>
+                                    <p:animEffect transition="out" filter="fade">
+                                      <p:cBhvr>
+                                        <p:cTn id="38" dur="500"/>
+                                        <p:tgtEl>
+                                          <p:spTgt spid="11"/>
+                                        </p:tgtEl>
+                                      </p:cBhvr>
+                                    </p:animEffect>
+                                    <p:set>
+                                      <p:cBhvr>
+                                        <p:cTn id="39" dur="1" fill="hold">
+                                          <p:stCondLst>
+                                            <p:cond delay="499"/>
+                                          </p:stCondLst>
+                                        </p:cTn>
+                                        <p:tgtEl>
+                                          <p:spTgt spid="11"/>
+                                        </p:tgtEl>
+                                        <p:attrNameLst>
+                                          <p:attrName>style.visibility</p:attrName>
+                                        </p:attrNameLst>
+                                      </p:cBhvr>
+                                      <p:to>
+                                        <p:strVal val="hidden"/>
+                                      </p:to>
+                                    </p:set>
+                                  </p:childTnLst>
+                                </p:cTn>
+                              </p:par>
+                            </p:childTnLst>
+                          </p:cTn>
+                        </p:par>
+                        <p:par>
+                          <p:cTn id="40" fill="hold">
+                            <p:stCondLst>
+                              <p:cond delay="500"/>
+                            </p:stCondLst>
+                            <p:childTnLst>
+                              <p:par>
+                                <p:cTn id="41" presetID="10" presetClass="entr" presetSubtype="0" fill="hold" nodeType="afterEffect">
+                                  <p:stCondLst>
+                                    <p:cond delay="0"/>
+                                  </p:stCondLst>
+                                  <p:childTnLst>
+                                    <p:set>
+                                      <p:cBhvr>
+                                        <p:cTn id="42" dur="1" fill="hold">
+                                          <p:stCondLst>
+                                            <p:cond delay="0"/>
+                                          </p:stCondLst>
+                                        </p:cTn>
+                                        <p:tgtEl>
+                                          <p:spTgt spid="13"/>
+                                        </p:tgtEl>
+                                        <p:attrNameLst>
+                                          <p:attrName>style.visibility</p:attrName>
+                                        </p:attrNameLst>
+                                      </p:cBhvr>
+                                      <p:to>
+                                        <p:strVal val="visible"/>
+                                      </p:to>
+                                    </p:set>
+                                    <p:animEffect transition="in" filter="fade">
+                                      <p:cBhvr>
+                                        <p:cTn id="43" dur="500"/>
+                                        <p:tgtEl>
+                                          <p:spTgt spid="13"/>
+                                        </p:tgtEl>
+                                      </p:cBhvr>
+                                    </p:animEffect>
+                                  </p:childTnLst>
+                                </p:cTn>
+                              </p:par>
+                            </p:childTnLst>
+                          </p:cTn>
+                        </p:par>
+                      </p:childTnLst>
+                    </p:cTn>
+                  </p:par>
+                  <p:par>
+                    <p:cTn id="44" fill="hold">
+                      <p:stCondLst>
+                        <p:cond delay="indefinite"/>
+                      </p:stCondLst>
+                      <p:childTnLst>
+                        <p:par>
+                          <p:cTn id="45" fill="hold">
+                            <p:stCondLst>
+                              <p:cond delay="0"/>
+                            </p:stCondLst>
+                            <p:childTnLst>
+                              <p:par>
+                                <p:cTn id="46" presetID="10" presetClass="exit" presetSubtype="0" fill="hold" nodeType="clickEffect">
+                                  <p:stCondLst>
+                                    <p:cond delay="0"/>
+                                  </p:stCondLst>
+                                  <p:childTnLst>
+                                    <p:animEffect transition="out" filter="fade">
+                                      <p:cBhvr>
+                                        <p:cTn id="47" dur="500"/>
+                                        <p:tgtEl>
+                                          <p:spTgt spid="13"/>
+                                        </p:tgtEl>
+                                      </p:cBhvr>
+                                    </p:animEffect>
+                                    <p:set>
+                                      <p:cBhvr>
+                                        <p:cTn id="48" dur="1" fill="hold">
+                                          <p:stCondLst>
+                                            <p:cond delay="499"/>
+                                          </p:stCondLst>
+                                        </p:cTn>
+                                        <p:tgtEl>
+                                          <p:spTgt spid="13"/>
+                                        </p:tgtEl>
+                                        <p:attrNameLst>
+                                          <p:attrName>style.visibility</p:attrName>
+                                        </p:attrNameLst>
+                                      </p:cBhvr>
+                                      <p:to>
+                                        <p:strVal val="hidden"/>
+                                      </p:to>
+                                    </p:set>
+                                  </p:childTnLst>
+                                </p:cTn>
+                              </p:par>
+                            </p:childTnLst>
+                          </p:cTn>
+                        </p:par>
+                        <p:par>
+                          <p:cTn id="49" fill="hold">
+                            <p:stCondLst>
+                              <p:cond delay="500"/>
+                            </p:stCondLst>
+                            <p:childTnLst>
+                              <p:par>
+                                <p:cTn id="50" presetID="10" presetClass="entr" presetSubtype="0" fill="hold" nodeType="afterEffect">
+                                  <p:stCondLst>
+                                    <p:cond delay="0"/>
+                                  </p:stCondLst>
+                                  <p:childTnLst>
+                                    <p:set>
+                                      <p:cBhvr>
+                                        <p:cTn id="51" dur="1" fill="hold">
+                                          <p:stCondLst>
+                                            <p:cond delay="0"/>
+                                          </p:stCondLst>
+                                        </p:cTn>
+                                        <p:tgtEl>
+                                          <p:spTgt spid="6"/>
+                                        </p:tgtEl>
+                                        <p:attrNameLst>
+                                          <p:attrName>style.visibility</p:attrName>
+                                        </p:attrNameLst>
+                                      </p:cBhvr>
+                                      <p:to>
+                                        <p:strVal val="visible"/>
+                                      </p:to>
+                                    </p:set>
+                                    <p:animEffect transition="in" filter="fade">
+                                      <p:cBhvr>
+                                        <p:cTn id="52" dur="2000"/>
+                                        <p:tgtEl>
+                                          <p:spTgt spid="6"/>
+                                        </p:tgtEl>
+                                      </p:cBhvr>
+                                    </p:animEffect>
+                                  </p:childTnLst>
+                                </p:cTn>
+                              </p:par>
+                            </p:childTnLst>
+                          </p:cTn>
+                        </p:par>
+                      </p:childTnLst>
+                    </p:cTn>
+                  </p:par>
+                  <p:par>
+                    <p:cTn id="53" fill="hold">
+                      <p:stCondLst>
+                        <p:cond delay="indefinite"/>
+                      </p:stCondLst>
+                      <p:childTnLst>
+                        <p:par>
+                          <p:cTn id="54" fill="hold">
+                            <p:stCondLst>
+                              <p:cond delay="0"/>
+                            </p:stCondLst>
+                            <p:childTnLst>
+                              <p:par>
+                                <p:cTn id="55" presetID="6" presetClass="emph" presetSubtype="0" fill="hold" nodeType="clickEffect">
+                                  <p:stCondLst>
+                                    <p:cond delay="0"/>
+                                  </p:stCondLst>
+                                  <p:childTnLst>
+                                    <p:animScale>
+                                      <p:cBhvr>
+                                        <p:cTn id="56" dur="1000" fill="hold"/>
+                                        <p:tgtEl>
+                                          <p:spTgt spid="6"/>
+                                        </p:tgtEl>
+                                      </p:cBhvr>
+                                      <p:by x="10000" y="10000"/>
+                                    </p:animScale>
+                                  </p:childTnLst>
+                                </p:cTn>
+                              </p:par>
+                              <p:par>
+                                <p:cTn id="57" presetID="42" presetClass="path" presetSubtype="0" accel="50000" decel="50000" fill="hold" nodeType="withEffect">
+                                  <p:stCondLst>
+                                    <p:cond delay="0"/>
+                                  </p:stCondLst>
+                                  <p:childTnLst>
+                                    <p:animMotion origin="layout" path="M -4.16667E-7 0.0037 L 0.46484 0.44074 " pathEditMode="relative" rAng="0" ptsTypes="AA">
+                                      <p:cBhvr>
+                                        <p:cTn id="58" dur="2000" fill="hold"/>
+                                        <p:tgtEl>
+                                          <p:spTgt spid="6"/>
+                                        </p:tgtEl>
+                                        <p:attrNameLst>
+                                          <p:attrName>ppt_x</p:attrName>
+                                          <p:attrName>ppt_y</p:attrName>
+                                        </p:attrNameLst>
+                                      </p:cBhvr>
+                                      <p:rCtr x="23242" y="21852"/>
+                                    </p:animMotion>
+                                  </p:childTnLst>
+                                </p:cTn>
+                              </p:par>
+                            </p:childTnLst>
+                          </p:cTn>
+                        </p:par>
+                        <p:par>
+                          <p:cTn id="59" fill="hold">
+                            <p:stCondLst>
+                              <p:cond delay="2000"/>
+                            </p:stCondLst>
+                            <p:childTnLst>
+                              <p:par>
+                                <p:cTn id="60" presetID="10" presetClass="entr" presetSubtype="0" fill="hold" grpId="0" nodeType="afterEffect">
+                                  <p:stCondLst>
+                                    <p:cond delay="0"/>
+                                  </p:stCondLst>
+                                  <p:childTnLst>
+                                    <p:set>
+                                      <p:cBhvr>
+                                        <p:cTn id="61" dur="1" fill="hold">
+                                          <p:stCondLst>
+                                            <p:cond delay="0"/>
+                                          </p:stCondLst>
+                                        </p:cTn>
+                                        <p:tgtEl>
+                                          <p:spTgt spid="2"/>
+                                        </p:tgtEl>
+                                        <p:attrNameLst>
+                                          <p:attrName>style.visibility</p:attrName>
+                                        </p:attrNameLst>
+                                      </p:cBhvr>
+                                      <p:to>
+                                        <p:strVal val="visible"/>
+                                      </p:to>
+                                    </p:set>
+                                    <p:animEffect transition="in" filter="fade">
+                                      <p:cBhvr>
+                                        <p:cTn id="62" dur="500"/>
+                                        <p:tgtEl>
+                                          <p:spTgt spid="2"/>
+                                        </p:tgtEl>
+                                      </p:cBhvr>
+                                    </p:animEffect>
+                                  </p:childTnLst>
+                                </p:cTn>
+                              </p:par>
+                              <p:par>
+                                <p:cTn id="63" presetID="10" presetClass="entr" presetSubtype="0" fill="hold" grpId="0" nodeType="withEffect">
+                                  <p:stCondLst>
+                                    <p:cond delay="0"/>
+                                  </p:stCondLst>
+                                  <p:childTnLst>
+                                    <p:set>
+                                      <p:cBhvr>
+                                        <p:cTn id="64" dur="1" fill="hold">
+                                          <p:stCondLst>
+                                            <p:cond delay="0"/>
+                                          </p:stCondLst>
+                                        </p:cTn>
+                                        <p:tgtEl>
+                                          <p:spTgt spid="4"/>
+                                        </p:tgtEl>
+                                        <p:attrNameLst>
+                                          <p:attrName>style.visibility</p:attrName>
+                                        </p:attrNameLst>
+                                      </p:cBhvr>
+                                      <p:to>
+                                        <p:strVal val="visible"/>
+                                      </p:to>
+                                    </p:set>
+                                    <p:animEffect transition="in" filter="fade">
+                                      <p:cBhvr>
+                                        <p:cTn id="65" dur="500"/>
+                                        <p:tgtEl>
+                                          <p:spTgt spid="4"/>
+                                        </p:tgtEl>
+                                      </p:cBhvr>
+                                    </p:animEffect>
+                                  </p:childTnLst>
+                                </p:cTn>
+                              </p:par>
+                              <p:par>
+                                <p:cTn id="66" presetID="9" presetClass="entr" presetSubtype="0" fill="hold" grpId="0" nodeType="withEffect">
+                                  <p:stCondLst>
+                                    <p:cond delay="0"/>
+                                  </p:stCondLst>
+                                  <p:childTnLst>
+                                    <p:set>
+                                      <p:cBhvr>
+                                        <p:cTn id="67" dur="1" fill="hold">
+                                          <p:stCondLst>
+                                            <p:cond delay="0"/>
+                                          </p:stCondLst>
+                                        </p:cTn>
+                                        <p:tgtEl>
+                                          <p:spTgt spid="8"/>
+                                        </p:tgtEl>
+                                        <p:attrNameLst>
+                                          <p:attrName>style.visibility</p:attrName>
+                                        </p:attrNameLst>
+                                      </p:cBhvr>
+                                      <p:to>
+                                        <p:strVal val="visible"/>
+                                      </p:to>
+                                    </p:set>
+                                    <p:animEffect transition="in" filter="dissolve">
+                                      <p:cBhvr>
+                                        <p:cTn id="68" dur="500"/>
+                                        <p:tgtEl>
+                                          <p:spTgt spid="8"/>
+                                        </p:tgtEl>
+                                      </p:cBhvr>
+                                    </p:animEffect>
+                                  </p:childTnLst>
+                                </p:cTn>
+                              </p:par>
+                            </p:childTnLst>
+                          </p:cTn>
+                        </p:par>
+                      </p:childTnLst>
+                    </p:cTn>
+                  </p:par>
+                  <p:par>
+                    <p:cTn id="69" fill="hold">
+                      <p:stCondLst>
+                        <p:cond delay="indefinite"/>
+                      </p:stCondLst>
+                      <p:childTnLst>
+                        <p:par>
+                          <p:cTn id="70" fill="hold">
+                            <p:stCondLst>
+                              <p:cond delay="0"/>
+                            </p:stCondLst>
+                            <p:childTnLst>
+                              <p:par>
+                                <p:cTn id="71" presetID="9" presetClass="entr" presetSubtype="0" fill="hold" nodeType="clickEffect">
+                                  <p:stCondLst>
+                                    <p:cond delay="0"/>
+                                  </p:stCondLst>
+                                  <p:childTnLst>
+                                    <p:set>
+                                      <p:cBhvr>
+                                        <p:cTn id="72" dur="1" fill="hold">
+                                          <p:stCondLst>
+                                            <p:cond delay="0"/>
+                                          </p:stCondLst>
+                                        </p:cTn>
+                                        <p:tgtEl>
+                                          <p:spTgt spid="7">
+                                            <p:txEl>
+                                              <p:pRg st="0" end="0"/>
+                                            </p:txEl>
+                                          </p:spTgt>
+                                        </p:tgtEl>
+                                        <p:attrNameLst>
+                                          <p:attrName>style.visibility</p:attrName>
+                                        </p:attrNameLst>
+                                      </p:cBhvr>
+                                      <p:to>
+                                        <p:strVal val="visible"/>
+                                      </p:to>
+                                    </p:set>
+                                    <p:animEffect transition="in" filter="dissolve">
+                                      <p:cBhvr>
+                                        <p:cTn id="73" dur="500"/>
+                                        <p:tgtEl>
+                                          <p:spTgt spid="7">
+                                            <p:txEl>
+                                              <p:pRg st="0" end="0"/>
+                                            </p:txEl>
+                                          </p:spTgt>
+                                        </p:tgtEl>
+                                      </p:cBhvr>
+                                    </p:animEffect>
+                                  </p:childTnLst>
+                                </p:cTn>
+                              </p:par>
+                            </p:childTnLst>
+                          </p:cTn>
+                        </p:par>
+                      </p:childTnLst>
+                    </p:cTn>
+                  </p:par>
+                  <p:par>
+                    <p:cTn id="74" fill="hold">
+                      <p:stCondLst>
+                        <p:cond delay="indefinite"/>
+                      </p:stCondLst>
+                      <p:childTnLst>
+                        <p:par>
+                          <p:cTn id="75" fill="hold">
+                            <p:stCondLst>
+                              <p:cond delay="0"/>
+                            </p:stCondLst>
+                            <p:childTnLst>
+                              <p:par>
+                                <p:cTn id="76" presetID="9" presetClass="entr" presetSubtype="0" fill="hold" nodeType="clickEffect">
+                                  <p:stCondLst>
+                                    <p:cond delay="0"/>
+                                  </p:stCondLst>
+                                  <p:childTnLst>
+                                    <p:set>
+                                      <p:cBhvr>
+                                        <p:cTn id="77" dur="1" fill="hold">
+                                          <p:stCondLst>
+                                            <p:cond delay="0"/>
+                                          </p:stCondLst>
+                                        </p:cTn>
+                                        <p:tgtEl>
+                                          <p:spTgt spid="7">
+                                            <p:txEl>
+                                              <p:pRg st="1" end="1"/>
+                                            </p:txEl>
+                                          </p:spTgt>
+                                        </p:tgtEl>
+                                        <p:attrNameLst>
+                                          <p:attrName>style.visibility</p:attrName>
+                                        </p:attrNameLst>
+                                      </p:cBhvr>
+                                      <p:to>
+                                        <p:strVal val="visible"/>
+                                      </p:to>
+                                    </p:set>
+                                    <p:animEffect transition="in" filter="dissolve">
+                                      <p:cBhvr>
+                                        <p:cTn id="78" dur="500"/>
+                                        <p:tgtEl>
+                                          <p:spTgt spid="7">
+                                            <p:txEl>
+                                              <p:pRg st="1" end="1"/>
+                                            </p:txEl>
+                                          </p:spTgt>
+                                        </p:tgtEl>
+                                      </p:cBhvr>
+                                    </p:animEffect>
+                                  </p:childTnLst>
+                                </p:cTn>
+                              </p:par>
+                            </p:childTnLst>
+                          </p:cTn>
+                        </p:par>
+                      </p:childTnLst>
+                    </p:cTn>
+                  </p:par>
+                  <p:par>
+                    <p:cTn id="79" fill="hold">
+                      <p:stCondLst>
+                        <p:cond delay="indefinite"/>
+                      </p:stCondLst>
+                      <p:childTnLst>
+                        <p:par>
+                          <p:cTn id="80" fill="hold">
+                            <p:stCondLst>
+                              <p:cond delay="0"/>
+                            </p:stCondLst>
+                            <p:childTnLst>
+                              <p:par>
+                                <p:cTn id="81" presetID="9" presetClass="entr" presetSubtype="0" fill="hold" nodeType="clickEffect">
+                                  <p:stCondLst>
+                                    <p:cond delay="0"/>
+                                  </p:stCondLst>
+                                  <p:childTnLst>
+                                    <p:set>
+                                      <p:cBhvr>
+                                        <p:cTn id="82" dur="1" fill="hold">
+                                          <p:stCondLst>
+                                            <p:cond delay="0"/>
+                                          </p:stCondLst>
+                                        </p:cTn>
+                                        <p:tgtEl>
+                                          <p:spTgt spid="7">
+                                            <p:txEl>
+                                              <p:pRg st="2" end="2"/>
+                                            </p:txEl>
+                                          </p:spTgt>
+                                        </p:tgtEl>
+                                        <p:attrNameLst>
+                                          <p:attrName>style.visibility</p:attrName>
+                                        </p:attrNameLst>
+                                      </p:cBhvr>
+                                      <p:to>
+                                        <p:strVal val="visible"/>
+                                      </p:to>
+                                    </p:set>
+                                    <p:animEffect transition="in" filter="dissolve">
+                                      <p:cBhvr>
+                                        <p:cTn id="83" dur="500"/>
+                                        <p:tgtEl>
+                                          <p:spTgt spid="7">
+                                            <p:txEl>
+                                              <p:pRg st="2" end="2"/>
+                                            </p:txEl>
+                                          </p:spTgt>
+                                        </p:tgtEl>
+                                      </p:cBhvr>
+                                    </p:animEffect>
+                                  </p:childTnLst>
+                                </p:cTn>
+                              </p:par>
+                            </p:childTnLst>
+                          </p:cTn>
+                        </p:par>
+                      </p:childTnLst>
+                    </p:cTn>
+                  </p:par>
+                  <p:par>
+                    <p:cTn id="84" fill="hold">
+                      <p:stCondLst>
+                        <p:cond delay="indefinite"/>
+                      </p:stCondLst>
+                      <p:childTnLst>
+                        <p:par>
+                          <p:cTn id="85" fill="hold">
+                            <p:stCondLst>
+                              <p:cond delay="0"/>
+                            </p:stCondLst>
+                            <p:childTnLst>
+                              <p:par>
+                                <p:cTn id="86" presetID="9" presetClass="entr" presetSubtype="0" fill="hold" nodeType="clickEffect">
+                                  <p:stCondLst>
+                                    <p:cond delay="0"/>
+                                  </p:stCondLst>
+                                  <p:childTnLst>
+                                    <p:set>
+                                      <p:cBhvr>
+                                        <p:cTn id="87" dur="1" fill="hold">
+                                          <p:stCondLst>
+                                            <p:cond delay="0"/>
+                                          </p:stCondLst>
+                                        </p:cTn>
+                                        <p:tgtEl>
+                                          <p:spTgt spid="7">
+                                            <p:txEl>
+                                              <p:pRg st="3" end="3"/>
+                                            </p:txEl>
+                                          </p:spTgt>
+                                        </p:tgtEl>
+                                        <p:attrNameLst>
+                                          <p:attrName>style.visibility</p:attrName>
+                                        </p:attrNameLst>
+                                      </p:cBhvr>
+                                      <p:to>
+                                        <p:strVal val="visible"/>
+                                      </p:to>
+                                    </p:set>
+                                    <p:animEffect transition="in" filter="dissolve">
+                                      <p:cBhvr>
+                                        <p:cTn id="88" dur="500"/>
+                                        <p:tgtEl>
+                                          <p:spTgt spid="7">
+                                            <p:txEl>
+                                              <p:pRg st="3" end="3"/>
+                                            </p:txEl>
+                                          </p:spTgt>
+                                        </p:tgtEl>
+                                      </p:cBhvr>
+                                    </p:animEffect>
+                                  </p:childTnLst>
+                                </p:cTn>
+                              </p:par>
+                            </p:childTnLst>
+                          </p:cTn>
+                        </p:par>
+                      </p:childTnLst>
+                    </p:cTn>
+                  </p:par>
+                  <p:par>
+                    <p:cTn id="89" fill="hold">
+                      <p:stCondLst>
+                        <p:cond delay="indefinite"/>
+                      </p:stCondLst>
+                      <p:childTnLst>
+                        <p:par>
+                          <p:cTn id="90" fill="hold">
+                            <p:stCondLst>
+                              <p:cond delay="0"/>
+                            </p:stCondLst>
+                            <p:childTnLst>
+                              <p:par>
+                                <p:cTn id="91" presetID="9" presetClass="entr" presetSubtype="0" fill="hold" nodeType="clickEffect">
+                                  <p:stCondLst>
+                                    <p:cond delay="0"/>
+                                  </p:stCondLst>
+                                  <p:childTnLst>
+                                    <p:set>
+                                      <p:cBhvr>
+                                        <p:cTn id="92" dur="1" fill="hold">
+                                          <p:stCondLst>
+                                            <p:cond delay="0"/>
+                                          </p:stCondLst>
+                                        </p:cTn>
+                                        <p:tgtEl>
+                                          <p:spTgt spid="7">
+                                            <p:txEl>
+                                              <p:pRg st="4" end="4"/>
+                                            </p:txEl>
+                                          </p:spTgt>
+                                        </p:tgtEl>
+                                        <p:attrNameLst>
+                                          <p:attrName>style.visibility</p:attrName>
+                                        </p:attrNameLst>
+                                      </p:cBhvr>
+                                      <p:to>
+                                        <p:strVal val="visible"/>
+                                      </p:to>
+                                    </p:set>
+                                    <p:animEffect transition="in" filter="dissolve">
+                                      <p:cBhvr>
+                                        <p:cTn id="93" dur="500"/>
+                                        <p:tgtEl>
+                                          <p:spTgt spid="7">
+                                            <p:txEl>
+                                              <p:pRg st="4" end="4"/>
+                                            </p:txEl>
+                                          </p:spTgt>
+                                        </p:tgtEl>
+                                      </p:cBhvr>
+                                    </p:animEffect>
+                                  </p:childTnLst>
+                                </p:cTn>
+                              </p:par>
+                            </p:childTnLst>
+                          </p:cTn>
+                        </p:par>
+                      </p:childTnLst>
+                    </p:cTn>
+                  </p:par>
+                </p:childTnLst>
+              </p:cTn>
+              <p:prevCondLst>
+                <p:cond evt="onPrev" delay="0">
+                  <p:tgtEl>
+                    <p:sldTgt/>
+                  </p:tgtEl>
+                </p:cond>
+              </p:prevCondLst>
+              <p:nextCondLst>
+                <p:cond evt="onNext" delay="0">
+                  <p:tgtEl>
+                    <p:sldTgt/>
+                  </p:tgtEl>
+                </p:cond>
+              </p:nextCondLst>
+            </p:seq>
+          </p:childTnLst>
+        </p:cTn>
+      </p:par>
+    </p:tnLst>
+    <p:bldLst>
+      <p:bldP spid="2" grpId="0" animBg="1"/>
+      <p:bldP spid="4" grpId="0" animBg="1"/>
+      <p:bldP spid="8" grpId="0"/>
+      <p:bldP spid="16" grpId="0"/>
+      <p:bldP spid="16" grpId="1"/>
+      <p:bldP spid="17" grpId="0"/>
+      <p:bldP spid="17" grpId="1"/>
+    </p:bldLst>
+  </p:timing>
 </p:sld>
 </file>
 
@@ -3731,14 +5504,14 @@
           <a:lstStyle/>
           <a:p>
             <a:r>
-              <a:rPr lang="en-US">
+              <a:rPr lang="en-US" b="1">
                 <a:solidFill>
                   <a:srgbClr val="35495E"/>
                 </a:solidFill>
               </a:rPr>
               <a:t>Vue Pros</a:t>
             </a:r>
-            <a:endParaRPr lang="en-US" dirty="0">
+            <a:endParaRPr lang="en-US" b="1" dirty="0">
               <a:solidFill>
                 <a:srgbClr val="35495E"/>
               </a:solidFill>
@@ -4037,6 +5810,719 @@
   <p:clrMapOvr>
     <a:masterClrMapping/>
   </p:clrMapOvr>
+  <mc:AlternateContent xmlns:mc="http://schemas.openxmlformats.org/markup-compatibility/2006">
+    <mc:Choice xmlns:p14="http://schemas.microsoft.com/office/powerpoint/2010/main" Requires="p14">
+      <p:transition spd="med" p14:dur="700">
+        <p:fade/>
+      </p:transition>
+    </mc:Choice>
+    <mc:Fallback>
+      <p:transition spd="med">
+        <p:fade/>
+      </p:transition>
+    </mc:Fallback>
+  </mc:AlternateContent>
+  <p:timing>
+    <p:tnLst>
+      <p:par>
+        <p:cTn id="1" dur="indefinite" restart="never" nodeType="tmRoot">
+          <p:childTnLst>
+            <p:seq concurrent="1" nextAc="seek">
+              <p:cTn id="2" dur="indefinite" nodeType="mainSeq">
+                <p:childTnLst>
+                  <p:par>
+                    <p:cTn id="3" fill="hold">
+                      <p:stCondLst>
+                        <p:cond delay="indefinite"/>
+                        <p:cond evt="onBegin" delay="0">
+                          <p:tn val="2"/>
+                        </p:cond>
+                      </p:stCondLst>
+                      <p:childTnLst>
+                        <p:par>
+                          <p:cTn id="4" fill="hold">
+                            <p:stCondLst>
+                              <p:cond delay="0"/>
+                            </p:stCondLst>
+                            <p:childTnLst>
+                              <p:par>
+                                <p:cTn id="5" presetID="10" presetClass="entr" presetSubtype="0" fill="hold" grpId="0" nodeType="withEffect">
+                                  <p:stCondLst>
+                                    <p:cond delay="0"/>
+                                  </p:stCondLst>
+                                  <p:childTnLst>
+                                    <p:set>
+                                      <p:cBhvr>
+                                        <p:cTn id="6" dur="1" fill="hold">
+                                          <p:stCondLst>
+                                            <p:cond delay="0"/>
+                                          </p:stCondLst>
+                                        </p:cTn>
+                                        <p:tgtEl>
+                                          <p:spTgt spid="2"/>
+                                        </p:tgtEl>
+                                        <p:attrNameLst>
+                                          <p:attrName>style.visibility</p:attrName>
+                                        </p:attrNameLst>
+                                      </p:cBhvr>
+                                      <p:to>
+                                        <p:strVal val="visible"/>
+                                      </p:to>
+                                    </p:set>
+                                    <p:animEffect transition="in" filter="fade">
+                                      <p:cBhvr>
+                                        <p:cTn id="7" dur="500"/>
+                                        <p:tgtEl>
+                                          <p:spTgt spid="2"/>
+                                        </p:tgtEl>
+                                      </p:cBhvr>
+                                    </p:animEffect>
+                                  </p:childTnLst>
+                                </p:cTn>
+                              </p:par>
+                              <p:par>
+                                <p:cTn id="8" presetID="10" presetClass="entr" presetSubtype="0" fill="hold" grpId="0" nodeType="withEffect">
+                                  <p:stCondLst>
+                                    <p:cond delay="0"/>
+                                  </p:stCondLst>
+                                  <p:childTnLst>
+                                    <p:set>
+                                      <p:cBhvr>
+                                        <p:cTn id="9" dur="1" fill="hold">
+                                          <p:stCondLst>
+                                            <p:cond delay="0"/>
+                                          </p:stCondLst>
+                                        </p:cTn>
+                                        <p:tgtEl>
+                                          <p:spTgt spid="4"/>
+                                        </p:tgtEl>
+                                        <p:attrNameLst>
+                                          <p:attrName>style.visibility</p:attrName>
+                                        </p:attrNameLst>
+                                      </p:cBhvr>
+                                      <p:to>
+                                        <p:strVal val="visible"/>
+                                      </p:to>
+                                    </p:set>
+                                    <p:animEffect transition="in" filter="fade">
+                                      <p:cBhvr>
+                                        <p:cTn id="10" dur="500"/>
+                                        <p:tgtEl>
+                                          <p:spTgt spid="4"/>
+                                        </p:tgtEl>
+                                      </p:cBhvr>
+                                    </p:animEffect>
+                                  </p:childTnLst>
+                                </p:cTn>
+                              </p:par>
+                              <p:par>
+                                <p:cTn id="11" presetID="9" presetClass="entr" presetSubtype="0" fill="hold" grpId="0" nodeType="withEffect">
+                                  <p:stCondLst>
+                                    <p:cond delay="0"/>
+                                  </p:stCondLst>
+                                  <p:childTnLst>
+                                    <p:set>
+                                      <p:cBhvr>
+                                        <p:cTn id="12" dur="1" fill="hold">
+                                          <p:stCondLst>
+                                            <p:cond delay="0"/>
+                                          </p:stCondLst>
+                                        </p:cTn>
+                                        <p:tgtEl>
+                                          <p:spTgt spid="8"/>
+                                        </p:tgtEl>
+                                        <p:attrNameLst>
+                                          <p:attrName>style.visibility</p:attrName>
+                                        </p:attrNameLst>
+                                      </p:cBhvr>
+                                      <p:to>
+                                        <p:strVal val="visible"/>
+                                      </p:to>
+                                    </p:set>
+                                    <p:animEffect transition="in" filter="dissolve">
+                                      <p:cBhvr>
+                                        <p:cTn id="13" dur="500"/>
+                                        <p:tgtEl>
+                                          <p:spTgt spid="8"/>
+                                        </p:tgtEl>
+                                      </p:cBhvr>
+                                    </p:animEffect>
+                                  </p:childTnLst>
+                                </p:cTn>
+                              </p:par>
+                            </p:childTnLst>
+                          </p:cTn>
+                        </p:par>
+                        <p:par>
+                          <p:cTn id="14" fill="hold">
+                            <p:stCondLst>
+                              <p:cond delay="500"/>
+                            </p:stCondLst>
+                            <p:childTnLst>
+                              <p:par>
+                                <p:cTn id="15" presetID="9" presetClass="entr" presetSubtype="0" fill="hold" nodeType="afterEffect">
+                                  <p:stCondLst>
+                                    <p:cond delay="0"/>
+                                  </p:stCondLst>
+                                  <p:childTnLst>
+                                    <p:set>
+                                      <p:cBhvr>
+                                        <p:cTn id="16" dur="1" fill="hold">
+                                          <p:stCondLst>
+                                            <p:cond delay="0"/>
+                                          </p:stCondLst>
+                                        </p:cTn>
+                                        <p:tgtEl>
+                                          <p:spTgt spid="7">
+                                            <p:txEl>
+                                              <p:pRg st="0" end="0"/>
+                                            </p:txEl>
+                                          </p:spTgt>
+                                        </p:tgtEl>
+                                        <p:attrNameLst>
+                                          <p:attrName>style.visibility</p:attrName>
+                                        </p:attrNameLst>
+                                      </p:cBhvr>
+                                      <p:to>
+                                        <p:strVal val="visible"/>
+                                      </p:to>
+                                    </p:set>
+                                    <p:animEffect transition="in" filter="dissolve">
+                                      <p:cBhvr>
+                                        <p:cTn id="17" dur="500"/>
+                                        <p:tgtEl>
+                                          <p:spTgt spid="7">
+                                            <p:txEl>
+                                              <p:pRg st="0" end="0"/>
+                                            </p:txEl>
+                                          </p:spTgt>
+                                        </p:tgtEl>
+                                      </p:cBhvr>
+                                    </p:animEffect>
+                                  </p:childTnLst>
+                                </p:cTn>
+                              </p:par>
+                            </p:childTnLst>
+                          </p:cTn>
+                        </p:par>
+                      </p:childTnLst>
+                    </p:cTn>
+                  </p:par>
+                  <p:par>
+                    <p:cTn id="18" fill="hold">
+                      <p:stCondLst>
+                        <p:cond delay="indefinite"/>
+                      </p:stCondLst>
+                      <p:childTnLst>
+                        <p:par>
+                          <p:cTn id="19" fill="hold">
+                            <p:stCondLst>
+                              <p:cond delay="0"/>
+                            </p:stCondLst>
+                            <p:childTnLst>
+                              <p:par>
+                                <p:cTn id="20" presetID="9" presetClass="entr" presetSubtype="0" fill="hold" nodeType="clickEffect">
+                                  <p:stCondLst>
+                                    <p:cond delay="0"/>
+                                  </p:stCondLst>
+                                  <p:childTnLst>
+                                    <p:set>
+                                      <p:cBhvr>
+                                        <p:cTn id="21" dur="1" fill="hold">
+                                          <p:stCondLst>
+                                            <p:cond delay="0"/>
+                                          </p:stCondLst>
+                                        </p:cTn>
+                                        <p:tgtEl>
+                                          <p:spTgt spid="7">
+                                            <p:txEl>
+                                              <p:pRg st="1" end="1"/>
+                                            </p:txEl>
+                                          </p:spTgt>
+                                        </p:tgtEl>
+                                        <p:attrNameLst>
+                                          <p:attrName>style.visibility</p:attrName>
+                                        </p:attrNameLst>
+                                      </p:cBhvr>
+                                      <p:to>
+                                        <p:strVal val="visible"/>
+                                      </p:to>
+                                    </p:set>
+                                    <p:animEffect transition="in" filter="dissolve">
+                                      <p:cBhvr>
+                                        <p:cTn id="22" dur="500"/>
+                                        <p:tgtEl>
+                                          <p:spTgt spid="7">
+                                            <p:txEl>
+                                              <p:pRg st="1" end="1"/>
+                                            </p:txEl>
+                                          </p:spTgt>
+                                        </p:tgtEl>
+                                      </p:cBhvr>
+                                    </p:animEffect>
+                                  </p:childTnLst>
+                                </p:cTn>
+                              </p:par>
+                            </p:childTnLst>
+                          </p:cTn>
+                        </p:par>
+                      </p:childTnLst>
+                    </p:cTn>
+                  </p:par>
+                  <p:par>
+                    <p:cTn id="23" fill="hold">
+                      <p:stCondLst>
+                        <p:cond delay="indefinite"/>
+                      </p:stCondLst>
+                      <p:childTnLst>
+                        <p:par>
+                          <p:cTn id="24" fill="hold">
+                            <p:stCondLst>
+                              <p:cond delay="0"/>
+                            </p:stCondLst>
+                            <p:childTnLst>
+                              <p:par>
+                                <p:cTn id="25" presetID="9" presetClass="entr" presetSubtype="0" fill="hold" nodeType="clickEffect">
+                                  <p:stCondLst>
+                                    <p:cond delay="0"/>
+                                  </p:stCondLst>
+                                  <p:childTnLst>
+                                    <p:set>
+                                      <p:cBhvr>
+                                        <p:cTn id="26" dur="1" fill="hold">
+                                          <p:stCondLst>
+                                            <p:cond delay="0"/>
+                                          </p:stCondLst>
+                                        </p:cTn>
+                                        <p:tgtEl>
+                                          <p:spTgt spid="7">
+                                            <p:txEl>
+                                              <p:pRg st="2" end="2"/>
+                                            </p:txEl>
+                                          </p:spTgt>
+                                        </p:tgtEl>
+                                        <p:attrNameLst>
+                                          <p:attrName>style.visibility</p:attrName>
+                                        </p:attrNameLst>
+                                      </p:cBhvr>
+                                      <p:to>
+                                        <p:strVal val="visible"/>
+                                      </p:to>
+                                    </p:set>
+                                    <p:animEffect transition="in" filter="dissolve">
+                                      <p:cBhvr>
+                                        <p:cTn id="27" dur="500"/>
+                                        <p:tgtEl>
+                                          <p:spTgt spid="7">
+                                            <p:txEl>
+                                              <p:pRg st="2" end="2"/>
+                                            </p:txEl>
+                                          </p:spTgt>
+                                        </p:tgtEl>
+                                      </p:cBhvr>
+                                    </p:animEffect>
+                                  </p:childTnLst>
+                                </p:cTn>
+                              </p:par>
+                            </p:childTnLst>
+                          </p:cTn>
+                        </p:par>
+                      </p:childTnLst>
+                    </p:cTn>
+                  </p:par>
+                  <p:par>
+                    <p:cTn id="28" fill="hold">
+                      <p:stCondLst>
+                        <p:cond delay="indefinite"/>
+                      </p:stCondLst>
+                      <p:childTnLst>
+                        <p:par>
+                          <p:cTn id="29" fill="hold">
+                            <p:stCondLst>
+                              <p:cond delay="0"/>
+                            </p:stCondLst>
+                            <p:childTnLst>
+                              <p:par>
+                                <p:cTn id="30" presetID="9" presetClass="entr" presetSubtype="0" fill="hold" nodeType="clickEffect">
+                                  <p:stCondLst>
+                                    <p:cond delay="0"/>
+                                  </p:stCondLst>
+                                  <p:childTnLst>
+                                    <p:set>
+                                      <p:cBhvr>
+                                        <p:cTn id="31" dur="1" fill="hold">
+                                          <p:stCondLst>
+                                            <p:cond delay="0"/>
+                                          </p:stCondLst>
+                                        </p:cTn>
+                                        <p:tgtEl>
+                                          <p:spTgt spid="7">
+                                            <p:txEl>
+                                              <p:pRg st="3" end="3"/>
+                                            </p:txEl>
+                                          </p:spTgt>
+                                        </p:tgtEl>
+                                        <p:attrNameLst>
+                                          <p:attrName>style.visibility</p:attrName>
+                                        </p:attrNameLst>
+                                      </p:cBhvr>
+                                      <p:to>
+                                        <p:strVal val="visible"/>
+                                      </p:to>
+                                    </p:set>
+                                    <p:animEffect transition="in" filter="dissolve">
+                                      <p:cBhvr>
+                                        <p:cTn id="32" dur="500"/>
+                                        <p:tgtEl>
+                                          <p:spTgt spid="7">
+                                            <p:txEl>
+                                              <p:pRg st="3" end="3"/>
+                                            </p:txEl>
+                                          </p:spTgt>
+                                        </p:tgtEl>
+                                      </p:cBhvr>
+                                    </p:animEffect>
+                                  </p:childTnLst>
+                                </p:cTn>
+                              </p:par>
+                            </p:childTnLst>
+                          </p:cTn>
+                        </p:par>
+                      </p:childTnLst>
+                    </p:cTn>
+                  </p:par>
+                  <p:par>
+                    <p:cTn id="33" fill="hold">
+                      <p:stCondLst>
+                        <p:cond delay="indefinite"/>
+                      </p:stCondLst>
+                      <p:childTnLst>
+                        <p:par>
+                          <p:cTn id="34" fill="hold">
+                            <p:stCondLst>
+                              <p:cond delay="0"/>
+                            </p:stCondLst>
+                            <p:childTnLst>
+                              <p:par>
+                                <p:cTn id="35" presetID="9" presetClass="entr" presetSubtype="0" fill="hold" nodeType="clickEffect">
+                                  <p:stCondLst>
+                                    <p:cond delay="0"/>
+                                  </p:stCondLst>
+                                  <p:childTnLst>
+                                    <p:set>
+                                      <p:cBhvr>
+                                        <p:cTn id="36" dur="1" fill="hold">
+                                          <p:stCondLst>
+                                            <p:cond delay="0"/>
+                                          </p:stCondLst>
+                                        </p:cTn>
+                                        <p:tgtEl>
+                                          <p:spTgt spid="7">
+                                            <p:txEl>
+                                              <p:pRg st="4" end="4"/>
+                                            </p:txEl>
+                                          </p:spTgt>
+                                        </p:tgtEl>
+                                        <p:attrNameLst>
+                                          <p:attrName>style.visibility</p:attrName>
+                                        </p:attrNameLst>
+                                      </p:cBhvr>
+                                      <p:to>
+                                        <p:strVal val="visible"/>
+                                      </p:to>
+                                    </p:set>
+                                    <p:animEffect transition="in" filter="dissolve">
+                                      <p:cBhvr>
+                                        <p:cTn id="37" dur="500"/>
+                                        <p:tgtEl>
+                                          <p:spTgt spid="7">
+                                            <p:txEl>
+                                              <p:pRg st="4" end="4"/>
+                                            </p:txEl>
+                                          </p:spTgt>
+                                        </p:tgtEl>
+                                      </p:cBhvr>
+                                    </p:animEffect>
+                                  </p:childTnLst>
+                                </p:cTn>
+                              </p:par>
+                            </p:childTnLst>
+                          </p:cTn>
+                        </p:par>
+                      </p:childTnLst>
+                    </p:cTn>
+                  </p:par>
+                  <p:par>
+                    <p:cTn id="38" fill="hold">
+                      <p:stCondLst>
+                        <p:cond delay="indefinite"/>
+                      </p:stCondLst>
+                      <p:childTnLst>
+                        <p:par>
+                          <p:cTn id="39" fill="hold">
+                            <p:stCondLst>
+                              <p:cond delay="0"/>
+                            </p:stCondLst>
+                            <p:childTnLst>
+                              <p:par>
+                                <p:cTn id="40" presetID="9" presetClass="entr" presetSubtype="0" fill="hold" nodeType="clickEffect">
+                                  <p:stCondLst>
+                                    <p:cond delay="0"/>
+                                  </p:stCondLst>
+                                  <p:childTnLst>
+                                    <p:set>
+                                      <p:cBhvr>
+                                        <p:cTn id="41" dur="1" fill="hold">
+                                          <p:stCondLst>
+                                            <p:cond delay="0"/>
+                                          </p:stCondLst>
+                                        </p:cTn>
+                                        <p:tgtEl>
+                                          <p:spTgt spid="7">
+                                            <p:txEl>
+                                              <p:pRg st="5" end="5"/>
+                                            </p:txEl>
+                                          </p:spTgt>
+                                        </p:tgtEl>
+                                        <p:attrNameLst>
+                                          <p:attrName>style.visibility</p:attrName>
+                                        </p:attrNameLst>
+                                      </p:cBhvr>
+                                      <p:to>
+                                        <p:strVal val="visible"/>
+                                      </p:to>
+                                    </p:set>
+                                    <p:animEffect transition="in" filter="dissolve">
+                                      <p:cBhvr>
+                                        <p:cTn id="42" dur="500"/>
+                                        <p:tgtEl>
+                                          <p:spTgt spid="7">
+                                            <p:txEl>
+                                              <p:pRg st="5" end="5"/>
+                                            </p:txEl>
+                                          </p:spTgt>
+                                        </p:tgtEl>
+                                      </p:cBhvr>
+                                    </p:animEffect>
+                                  </p:childTnLst>
+                                </p:cTn>
+                              </p:par>
+                            </p:childTnLst>
+                          </p:cTn>
+                        </p:par>
+                      </p:childTnLst>
+                    </p:cTn>
+                  </p:par>
+                  <p:par>
+                    <p:cTn id="43" fill="hold">
+                      <p:stCondLst>
+                        <p:cond delay="indefinite"/>
+                      </p:stCondLst>
+                      <p:childTnLst>
+                        <p:par>
+                          <p:cTn id="44" fill="hold">
+                            <p:stCondLst>
+                              <p:cond delay="0"/>
+                            </p:stCondLst>
+                            <p:childTnLst>
+                              <p:par>
+                                <p:cTn id="45" presetID="9" presetClass="entr" presetSubtype="0" fill="hold" nodeType="clickEffect">
+                                  <p:stCondLst>
+                                    <p:cond delay="0"/>
+                                  </p:stCondLst>
+                                  <p:childTnLst>
+                                    <p:set>
+                                      <p:cBhvr>
+                                        <p:cTn id="46" dur="1" fill="hold">
+                                          <p:stCondLst>
+                                            <p:cond delay="0"/>
+                                          </p:stCondLst>
+                                        </p:cTn>
+                                        <p:tgtEl>
+                                          <p:spTgt spid="7">
+                                            <p:txEl>
+                                              <p:pRg st="6" end="6"/>
+                                            </p:txEl>
+                                          </p:spTgt>
+                                        </p:tgtEl>
+                                        <p:attrNameLst>
+                                          <p:attrName>style.visibility</p:attrName>
+                                        </p:attrNameLst>
+                                      </p:cBhvr>
+                                      <p:to>
+                                        <p:strVal val="visible"/>
+                                      </p:to>
+                                    </p:set>
+                                    <p:animEffect transition="in" filter="dissolve">
+                                      <p:cBhvr>
+                                        <p:cTn id="47" dur="500"/>
+                                        <p:tgtEl>
+                                          <p:spTgt spid="7">
+                                            <p:txEl>
+                                              <p:pRg st="6" end="6"/>
+                                            </p:txEl>
+                                          </p:spTgt>
+                                        </p:tgtEl>
+                                      </p:cBhvr>
+                                    </p:animEffect>
+                                  </p:childTnLst>
+                                </p:cTn>
+                              </p:par>
+                            </p:childTnLst>
+                          </p:cTn>
+                        </p:par>
+                      </p:childTnLst>
+                    </p:cTn>
+                  </p:par>
+                  <p:par>
+                    <p:cTn id="48" fill="hold">
+                      <p:stCondLst>
+                        <p:cond delay="indefinite"/>
+                      </p:stCondLst>
+                      <p:childTnLst>
+                        <p:par>
+                          <p:cTn id="49" fill="hold">
+                            <p:stCondLst>
+                              <p:cond delay="0"/>
+                            </p:stCondLst>
+                            <p:childTnLst>
+                              <p:par>
+                                <p:cTn id="50" presetID="9" presetClass="entr" presetSubtype="0" fill="hold" nodeType="clickEffect">
+                                  <p:stCondLst>
+                                    <p:cond delay="0"/>
+                                  </p:stCondLst>
+                                  <p:childTnLst>
+                                    <p:set>
+                                      <p:cBhvr>
+                                        <p:cTn id="51" dur="1" fill="hold">
+                                          <p:stCondLst>
+                                            <p:cond delay="0"/>
+                                          </p:stCondLst>
+                                        </p:cTn>
+                                        <p:tgtEl>
+                                          <p:spTgt spid="7">
+                                            <p:txEl>
+                                              <p:pRg st="7" end="7"/>
+                                            </p:txEl>
+                                          </p:spTgt>
+                                        </p:tgtEl>
+                                        <p:attrNameLst>
+                                          <p:attrName>style.visibility</p:attrName>
+                                        </p:attrNameLst>
+                                      </p:cBhvr>
+                                      <p:to>
+                                        <p:strVal val="visible"/>
+                                      </p:to>
+                                    </p:set>
+                                    <p:animEffect transition="in" filter="dissolve">
+                                      <p:cBhvr>
+                                        <p:cTn id="52" dur="500"/>
+                                        <p:tgtEl>
+                                          <p:spTgt spid="7">
+                                            <p:txEl>
+                                              <p:pRg st="7" end="7"/>
+                                            </p:txEl>
+                                          </p:spTgt>
+                                        </p:tgtEl>
+                                      </p:cBhvr>
+                                    </p:animEffect>
+                                  </p:childTnLst>
+                                </p:cTn>
+                              </p:par>
+                            </p:childTnLst>
+                          </p:cTn>
+                        </p:par>
+                      </p:childTnLst>
+                    </p:cTn>
+                  </p:par>
+                  <p:par>
+                    <p:cTn id="53" fill="hold">
+                      <p:stCondLst>
+                        <p:cond delay="indefinite"/>
+                      </p:stCondLst>
+                      <p:childTnLst>
+                        <p:par>
+                          <p:cTn id="54" fill="hold">
+                            <p:stCondLst>
+                              <p:cond delay="0"/>
+                            </p:stCondLst>
+                            <p:childTnLst>
+                              <p:par>
+                                <p:cTn id="55" presetID="9" presetClass="entr" presetSubtype="0" fill="hold" nodeType="clickEffect">
+                                  <p:stCondLst>
+                                    <p:cond delay="0"/>
+                                  </p:stCondLst>
+                                  <p:childTnLst>
+                                    <p:set>
+                                      <p:cBhvr>
+                                        <p:cTn id="56" dur="1" fill="hold">
+                                          <p:stCondLst>
+                                            <p:cond delay="0"/>
+                                          </p:stCondLst>
+                                        </p:cTn>
+                                        <p:tgtEl>
+                                          <p:spTgt spid="7">
+                                            <p:txEl>
+                                              <p:pRg st="8" end="8"/>
+                                            </p:txEl>
+                                          </p:spTgt>
+                                        </p:tgtEl>
+                                        <p:attrNameLst>
+                                          <p:attrName>style.visibility</p:attrName>
+                                        </p:attrNameLst>
+                                      </p:cBhvr>
+                                      <p:to>
+                                        <p:strVal val="visible"/>
+                                      </p:to>
+                                    </p:set>
+                                    <p:animEffect transition="in" filter="dissolve">
+                                      <p:cBhvr>
+                                        <p:cTn id="57" dur="500"/>
+                                        <p:tgtEl>
+                                          <p:spTgt spid="7">
+                                            <p:txEl>
+                                              <p:pRg st="8" end="8"/>
+                                            </p:txEl>
+                                          </p:spTgt>
+                                        </p:tgtEl>
+                                      </p:cBhvr>
+                                    </p:animEffect>
+                                  </p:childTnLst>
+                                </p:cTn>
+                              </p:par>
+                            </p:childTnLst>
+                          </p:cTn>
+                        </p:par>
+                      </p:childTnLst>
+                    </p:cTn>
+                  </p:par>
+                </p:childTnLst>
+              </p:cTn>
+              <p:prevCondLst>
+                <p:cond evt="onPrev" delay="0">
+                  <p:tgtEl>
+                    <p:sldTgt/>
+                  </p:tgtEl>
+                </p:cond>
+              </p:prevCondLst>
+              <p:nextCondLst>
+                <p:cond evt="onNext" delay="0">
+                  <p:tgtEl>
+                    <p:sldTgt/>
+                  </p:tgtEl>
+                </p:cond>
+              </p:nextCondLst>
+            </p:seq>
+          </p:childTnLst>
+        </p:cTn>
+      </p:par>
+    </p:tnLst>
+    <p:bldLst>
+      <p:bldP spid="2" grpId="0" animBg="1"/>
+      <p:bldP spid="4" grpId="0" animBg="1"/>
+      <p:bldP spid="8" grpId="0"/>
+    </p:bldLst>
+  </p:timing>
 </p:sld>
 </file>
 
@@ -4123,14 +6609,14 @@
           <a:lstStyle/>
           <a:p>
             <a:r>
-              <a:rPr lang="en-US">
+              <a:rPr lang="en-US" b="1">
                 <a:solidFill>
                   <a:srgbClr val="35495E"/>
                 </a:solidFill>
               </a:rPr>
               <a:t>Vue Popularity</a:t>
             </a:r>
-            <a:endParaRPr lang="en-US" dirty="0">
+            <a:endParaRPr lang="en-US" b="1" dirty="0">
               <a:solidFill>
                 <a:srgbClr val="35495E"/>
               </a:solidFill>
@@ -4210,8 +6696,8 @@
         </p:nvSpPr>
         <p:spPr>
           <a:xfrm>
-            <a:off x="3745574" y="6008375"/>
-            <a:ext cx="4700847" cy="523220"/>
+            <a:off x="4016821" y="6008375"/>
+            <a:ext cx="4158349" cy="523220"/>
           </a:xfrm>
           <a:prstGeom prst="rect">
             <a:avLst/>
@@ -4230,7 +6716,7 @@
                 </a:solidFill>
                 <a:latin typeface="Source Sans Pro" panose="020B0503030403020204" pitchFamily="34" charset="0"/>
               </a:rPr>
-              <a:t>Fast Growing Stars On Github</a:t>
+              <a:t>Fast Growing Github Stars</a:t>
             </a:r>
             <a:endParaRPr lang="fa-IR" sz="2800"/>
           </a:p>
@@ -4246,6 +6732,312 @@
   <p:clrMapOvr>
     <a:masterClrMapping/>
   </p:clrMapOvr>
+  <mc:AlternateContent xmlns:mc="http://schemas.openxmlformats.org/markup-compatibility/2006">
+    <mc:Choice xmlns:p14="http://schemas.microsoft.com/office/powerpoint/2010/main" Requires="p14">
+      <p:transition spd="med" p14:dur="700">
+        <p:fade/>
+      </p:transition>
+    </mc:Choice>
+    <mc:Fallback>
+      <p:transition spd="med">
+        <p:fade/>
+      </p:transition>
+    </mc:Fallback>
+  </mc:AlternateContent>
+  <p:timing>
+    <p:tnLst>
+      <p:par>
+        <p:cTn id="1" dur="indefinite" restart="never" nodeType="tmRoot">
+          <p:childTnLst>
+            <p:seq concurrent="1" nextAc="seek">
+              <p:cTn id="2" dur="indefinite" nodeType="mainSeq">
+                <p:childTnLst>
+                  <p:par>
+                    <p:cTn id="3" fill="hold">
+                      <p:stCondLst>
+                        <p:cond delay="indefinite"/>
+                        <p:cond evt="onBegin" delay="0">
+                          <p:tn val="2"/>
+                        </p:cond>
+                      </p:stCondLst>
+                      <p:childTnLst>
+                        <p:par>
+                          <p:cTn id="4" fill="hold">
+                            <p:stCondLst>
+                              <p:cond delay="0"/>
+                            </p:stCondLst>
+                            <p:childTnLst>
+                              <p:par>
+                                <p:cTn id="5" presetID="10" presetClass="entr" presetSubtype="0" fill="hold" nodeType="afterEffect">
+                                  <p:stCondLst>
+                                    <p:cond delay="0"/>
+                                  </p:stCondLst>
+                                  <p:childTnLst>
+                                    <p:set>
+                                      <p:cBhvr>
+                                        <p:cTn id="6" dur="1" fill="hold">
+                                          <p:stCondLst>
+                                            <p:cond delay="0"/>
+                                          </p:stCondLst>
+                                        </p:cTn>
+                                        <p:tgtEl>
+                                          <p:spTgt spid="9"/>
+                                        </p:tgtEl>
+                                        <p:attrNameLst>
+                                          <p:attrName>style.visibility</p:attrName>
+                                        </p:attrNameLst>
+                                      </p:cBhvr>
+                                      <p:to>
+                                        <p:strVal val="visible"/>
+                                      </p:to>
+                                    </p:set>
+                                    <p:animEffect transition="in" filter="fade">
+                                      <p:cBhvr>
+                                        <p:cTn id="7" dur="500"/>
+                                        <p:tgtEl>
+                                          <p:spTgt spid="9"/>
+                                        </p:tgtEl>
+                                      </p:cBhvr>
+                                    </p:animEffect>
+                                  </p:childTnLst>
+                                </p:cTn>
+                              </p:par>
+                            </p:childTnLst>
+                          </p:cTn>
+                        </p:par>
+                        <p:par>
+                          <p:cTn id="8" fill="hold">
+                            <p:stCondLst>
+                              <p:cond delay="500"/>
+                            </p:stCondLst>
+                            <p:childTnLst>
+                              <p:par>
+                                <p:cTn id="9" presetID="16" presetClass="entr" presetSubtype="37" fill="hold" grpId="0" nodeType="afterEffect">
+                                  <p:stCondLst>
+                                    <p:cond delay="0"/>
+                                  </p:stCondLst>
+                                  <p:childTnLst>
+                                    <p:set>
+                                      <p:cBhvr>
+                                        <p:cTn id="10" dur="1" fill="hold">
+                                          <p:stCondLst>
+                                            <p:cond delay="0"/>
+                                          </p:stCondLst>
+                                        </p:cTn>
+                                        <p:tgtEl>
+                                          <p:spTgt spid="8"/>
+                                        </p:tgtEl>
+                                        <p:attrNameLst>
+                                          <p:attrName>style.visibility</p:attrName>
+                                        </p:attrNameLst>
+                                      </p:cBhvr>
+                                      <p:to>
+                                        <p:strVal val="visible"/>
+                                      </p:to>
+                                    </p:set>
+                                    <p:animEffect transition="in" filter="barn(outVertical)">
+                                      <p:cBhvr>
+                                        <p:cTn id="11" dur="500"/>
+                                        <p:tgtEl>
+                                          <p:spTgt spid="8"/>
+                                        </p:tgtEl>
+                                      </p:cBhvr>
+                                    </p:animEffect>
+                                  </p:childTnLst>
+                                </p:cTn>
+                              </p:par>
+                            </p:childTnLst>
+                          </p:cTn>
+                        </p:par>
+                      </p:childTnLst>
+                    </p:cTn>
+                  </p:par>
+                  <p:par>
+                    <p:cTn id="12" fill="hold">
+                      <p:stCondLst>
+                        <p:cond delay="indefinite"/>
+                      </p:stCondLst>
+                      <p:childTnLst>
+                        <p:par>
+                          <p:cTn id="13" fill="hold">
+                            <p:stCondLst>
+                              <p:cond delay="0"/>
+                            </p:stCondLst>
+                            <p:childTnLst>
+                              <p:par>
+                                <p:cTn id="14" presetID="10" presetClass="exit" presetSubtype="0" fill="hold" nodeType="clickEffect">
+                                  <p:stCondLst>
+                                    <p:cond delay="0"/>
+                                  </p:stCondLst>
+                                  <p:childTnLst>
+                                    <p:animEffect transition="out" filter="fade">
+                                      <p:cBhvr>
+                                        <p:cTn id="15" dur="500"/>
+                                        <p:tgtEl>
+                                          <p:spTgt spid="9"/>
+                                        </p:tgtEl>
+                                      </p:cBhvr>
+                                    </p:animEffect>
+                                    <p:set>
+                                      <p:cBhvr>
+                                        <p:cTn id="16" dur="1" fill="hold">
+                                          <p:stCondLst>
+                                            <p:cond delay="499"/>
+                                          </p:stCondLst>
+                                        </p:cTn>
+                                        <p:tgtEl>
+                                          <p:spTgt spid="9"/>
+                                        </p:tgtEl>
+                                        <p:attrNameLst>
+                                          <p:attrName>style.visibility</p:attrName>
+                                        </p:attrNameLst>
+                                      </p:cBhvr>
+                                      <p:to>
+                                        <p:strVal val="hidden"/>
+                                      </p:to>
+                                    </p:set>
+                                  </p:childTnLst>
+                                </p:cTn>
+                              </p:par>
+                              <p:par>
+                                <p:cTn id="17" presetID="10" presetClass="exit" presetSubtype="0" fill="hold" grpId="1" nodeType="withEffect">
+                                  <p:stCondLst>
+                                    <p:cond delay="0"/>
+                                  </p:stCondLst>
+                                  <p:childTnLst>
+                                    <p:animEffect transition="out" filter="fade">
+                                      <p:cBhvr>
+                                        <p:cTn id="18" dur="500"/>
+                                        <p:tgtEl>
+                                          <p:spTgt spid="8"/>
+                                        </p:tgtEl>
+                                      </p:cBhvr>
+                                    </p:animEffect>
+                                    <p:set>
+                                      <p:cBhvr>
+                                        <p:cTn id="19" dur="1" fill="hold">
+                                          <p:stCondLst>
+                                            <p:cond delay="499"/>
+                                          </p:stCondLst>
+                                        </p:cTn>
+                                        <p:tgtEl>
+                                          <p:spTgt spid="8"/>
+                                        </p:tgtEl>
+                                        <p:attrNameLst>
+                                          <p:attrName>style.visibility</p:attrName>
+                                        </p:attrNameLst>
+                                      </p:cBhvr>
+                                      <p:to>
+                                        <p:strVal val="hidden"/>
+                                      </p:to>
+                                    </p:set>
+                                  </p:childTnLst>
+                                </p:cTn>
+                              </p:par>
+                              <p:par>
+                                <p:cTn id="20" presetID="10" presetClass="exit" presetSubtype="0" fill="hold" grpId="0" nodeType="withEffect">
+                                  <p:stCondLst>
+                                    <p:cond delay="0"/>
+                                  </p:stCondLst>
+                                  <p:childTnLst>
+                                    <p:animEffect transition="out" filter="fade">
+                                      <p:cBhvr>
+                                        <p:cTn id="21" dur="500"/>
+                                        <p:tgtEl>
+                                          <p:spTgt spid="2"/>
+                                        </p:tgtEl>
+                                      </p:cBhvr>
+                                    </p:animEffect>
+                                    <p:set>
+                                      <p:cBhvr>
+                                        <p:cTn id="22" dur="1" fill="hold">
+                                          <p:stCondLst>
+                                            <p:cond delay="499"/>
+                                          </p:stCondLst>
+                                        </p:cTn>
+                                        <p:tgtEl>
+                                          <p:spTgt spid="2"/>
+                                        </p:tgtEl>
+                                        <p:attrNameLst>
+                                          <p:attrName>style.visibility</p:attrName>
+                                        </p:attrNameLst>
+                                      </p:cBhvr>
+                                      <p:to>
+                                        <p:strVal val="hidden"/>
+                                      </p:to>
+                                    </p:set>
+                                  </p:childTnLst>
+                                </p:cTn>
+                              </p:par>
+                              <p:par>
+                                <p:cTn id="23" presetID="10" presetClass="exit" presetSubtype="0" fill="hold" grpId="0" nodeType="withEffect">
+                                  <p:stCondLst>
+                                    <p:cond delay="0"/>
+                                  </p:stCondLst>
+                                  <p:childTnLst>
+                                    <p:animEffect transition="out" filter="fade">
+                                      <p:cBhvr>
+                                        <p:cTn id="24" dur="500"/>
+                                        <p:tgtEl>
+                                          <p:spTgt spid="4"/>
+                                        </p:tgtEl>
+                                      </p:cBhvr>
+                                    </p:animEffect>
+                                    <p:set>
+                                      <p:cBhvr>
+                                        <p:cTn id="25" dur="1" fill="hold">
+                                          <p:stCondLst>
+                                            <p:cond delay="499"/>
+                                          </p:stCondLst>
+                                        </p:cTn>
+                                        <p:tgtEl>
+                                          <p:spTgt spid="4"/>
+                                        </p:tgtEl>
+                                        <p:attrNameLst>
+                                          <p:attrName>style.visibility</p:attrName>
+                                        </p:attrNameLst>
+                                      </p:cBhvr>
+                                      <p:to>
+                                        <p:strVal val="hidden"/>
+                                      </p:to>
+                                    </p:set>
+                                  </p:childTnLst>
+                                </p:cTn>
+                              </p:par>
+                            </p:childTnLst>
+                          </p:cTn>
+                        </p:par>
+                      </p:childTnLst>
+                    </p:cTn>
+                  </p:par>
+                </p:childTnLst>
+              </p:cTn>
+              <p:prevCondLst>
+                <p:cond evt="onPrev" delay="0">
+                  <p:tgtEl>
+                    <p:sldTgt/>
+                  </p:tgtEl>
+                </p:cond>
+              </p:prevCondLst>
+              <p:nextCondLst>
+                <p:cond evt="onNext" delay="0">
+                  <p:tgtEl>
+                    <p:sldTgt/>
+                  </p:tgtEl>
+                </p:cond>
+              </p:nextCondLst>
+            </p:seq>
+          </p:childTnLst>
+        </p:cTn>
+      </p:par>
+    </p:tnLst>
+    <p:bldLst>
+      <p:bldP spid="2" grpId="0" animBg="1"/>
+      <p:bldP spid="4" grpId="0" animBg="1"/>
+      <p:bldP spid="8" grpId="0"/>
+      <p:bldP spid="8" grpId="1"/>
+    </p:bldLst>
+  </p:timing>
 </p:sld>
 </file>
 
@@ -4542,4 +7334,299 @@
     </a:ext>
   </a:extLst>
 </a:theme>
+</file>
+
+<file path=ppt/theme/theme2.xml><?xml version="1.0" encoding="utf-8"?>
+<a:theme xmlns:a="http://schemas.openxmlformats.org/drawingml/2006/main" name="Office Theme">
+  <a:themeElements>
+    <a:clrScheme name="Office">
+      <a:dk1>
+        <a:sysClr val="windowText" lastClr="000000"/>
+      </a:dk1>
+      <a:lt1>
+        <a:sysClr val="window" lastClr="FFFFFF"/>
+      </a:lt1>
+      <a:dk2>
+        <a:srgbClr val="44546A"/>
+      </a:dk2>
+      <a:lt2>
+        <a:srgbClr val="E7E6E6"/>
+      </a:lt2>
+      <a:accent1>
+        <a:srgbClr val="4472C4"/>
+      </a:accent1>
+      <a:accent2>
+        <a:srgbClr val="ED7D31"/>
+      </a:accent2>
+      <a:accent3>
+        <a:srgbClr val="A5A5A5"/>
+      </a:accent3>
+      <a:accent4>
+        <a:srgbClr val="FFC000"/>
+      </a:accent4>
+      <a:accent5>
+        <a:srgbClr val="5B9BD5"/>
+      </a:accent5>
+      <a:accent6>
+        <a:srgbClr val="70AD47"/>
+      </a:accent6>
+      <a:hlink>
+        <a:srgbClr val="0563C1"/>
+      </a:hlink>
+      <a:folHlink>
+        <a:srgbClr val="954F72"/>
+      </a:folHlink>
+    </a:clrScheme>
+    <a:fontScheme name="Office">
+      <a:majorFont>
+        <a:latin typeface="Calibri Light" panose="020F0302020204030204"/>
+        <a:ea typeface=""/>
+        <a:cs typeface=""/>
+        <a:font script="Jpan" typeface="游ゴシック Light"/>
+        <a:font script="Hang" typeface="맑은 고딕"/>
+        <a:font script="Hans" typeface="等线 Light"/>
+        <a:font script="Hant" typeface="新細明體"/>
+        <a:font script="Arab" typeface="Times New Roman"/>
+        <a:font script="Hebr" typeface="Times New Roman"/>
+        <a:font script="Thai" typeface="Angsana New"/>
+        <a:font script="Ethi" typeface="Nyala"/>
+        <a:font script="Beng" typeface="Vrinda"/>
+        <a:font script="Gujr" typeface="Shruti"/>
+        <a:font script="Khmr" typeface="MoolBoran"/>
+        <a:font script="Knda" typeface="Tunga"/>
+        <a:font script="Guru" typeface="Raavi"/>
+        <a:font script="Cans" typeface="Euphemia"/>
+        <a:font script="Cher" typeface="Plantagenet Cherokee"/>
+        <a:font script="Yiii" typeface="Microsoft Yi Baiti"/>
+        <a:font script="Tibt" typeface="Microsoft Himalaya"/>
+        <a:font script="Thaa" typeface="MV Boli"/>
+        <a:font script="Deva" typeface="Mangal"/>
+        <a:font script="Telu" typeface="Gautami"/>
+        <a:font script="Taml" typeface="Latha"/>
+        <a:font script="Syrc" typeface="Estrangelo Edessa"/>
+        <a:font script="Orya" typeface="Kalinga"/>
+        <a:font script="Mlym" typeface="Kartika"/>
+        <a:font script="Laoo" typeface="DokChampa"/>
+        <a:font script="Sinh" typeface="Iskoola Pota"/>
+        <a:font script="Mong" typeface="Mongolian Baiti"/>
+        <a:font script="Viet" typeface="Times New Roman"/>
+        <a:font script="Uigh" typeface="Microsoft Uighur"/>
+        <a:font script="Geor" typeface="Sylfaen"/>
+        <a:font script="Armn" typeface="Arial"/>
+        <a:font script="Bugi" typeface="Leelawadee UI"/>
+        <a:font script="Bopo" typeface="Microsoft JhengHei"/>
+        <a:font script="Java" typeface="Javanese Text"/>
+        <a:font script="Lisu" typeface="Segoe UI"/>
+        <a:font script="Mymr" typeface="Myanmar Text"/>
+        <a:font script="Nkoo" typeface="Ebrima"/>
+        <a:font script="Olck" typeface="Nirmala UI"/>
+        <a:font script="Osma" typeface="Ebrima"/>
+        <a:font script="Phag" typeface="Phagspa"/>
+        <a:font script="Syrn" typeface="Estrangelo Edessa"/>
+        <a:font script="Syrj" typeface="Estrangelo Edessa"/>
+        <a:font script="Syre" typeface="Estrangelo Edessa"/>
+        <a:font script="Sora" typeface="Nirmala UI"/>
+        <a:font script="Tale" typeface="Microsoft Tai Le"/>
+        <a:font script="Talu" typeface="Microsoft New Tai Lue"/>
+        <a:font script="Tfng" typeface="Ebrima"/>
+      </a:majorFont>
+      <a:minorFont>
+        <a:latin typeface="Calibri" panose="020F0502020204030204"/>
+        <a:ea typeface=""/>
+        <a:cs typeface=""/>
+        <a:font script="Jpan" typeface="游ゴシック"/>
+        <a:font script="Hang" typeface="맑은 고딕"/>
+        <a:font script="Hans" typeface="等线"/>
+        <a:font script="Hant" typeface="新細明體"/>
+        <a:font script="Arab" typeface="Arial"/>
+        <a:font script="Hebr" typeface="Arial"/>
+        <a:font script="Thai" typeface="Cordia New"/>
+        <a:font script="Ethi" typeface="Nyala"/>
+        <a:font script="Beng" typeface="Vrinda"/>
+        <a:font script="Gujr" typeface="Shruti"/>
+        <a:font script="Khmr" typeface="DaunPenh"/>
+        <a:font script="Knda" typeface="Tunga"/>
+        <a:font script="Guru" typeface="Raavi"/>
+        <a:font script="Cans" typeface="Euphemia"/>
+        <a:font script="Cher" typeface="Plantagenet Cherokee"/>
+        <a:font script="Yiii" typeface="Microsoft Yi Baiti"/>
+        <a:font script="Tibt" typeface="Microsoft Himalaya"/>
+        <a:font script="Thaa" typeface="MV Boli"/>
+        <a:font script="Deva" typeface="Mangal"/>
+        <a:font script="Telu" typeface="Gautami"/>
+        <a:font script="Taml" typeface="Latha"/>
+        <a:font script="Syrc" typeface="Estrangelo Edessa"/>
+        <a:font script="Orya" typeface="Kalinga"/>
+        <a:font script="Mlym" typeface="Kartika"/>
+        <a:font script="Laoo" typeface="DokChampa"/>
+        <a:font script="Sinh" typeface="Iskoola Pota"/>
+        <a:font script="Mong" typeface="Mongolian Baiti"/>
+        <a:font script="Viet" typeface="Arial"/>
+        <a:font script="Uigh" typeface="Microsoft Uighur"/>
+        <a:font script="Geor" typeface="Sylfaen"/>
+        <a:font script="Armn" typeface="Arial"/>
+        <a:font script="Bugi" typeface="Leelawadee UI"/>
+        <a:font script="Bopo" typeface="Microsoft JhengHei"/>
+        <a:font script="Java" typeface="Javanese Text"/>
+        <a:font script="Lisu" typeface="Segoe UI"/>
+        <a:font script="Mymr" typeface="Myanmar Text"/>
+        <a:font script="Nkoo" typeface="Ebrima"/>
+        <a:font script="Olck" typeface="Nirmala UI"/>
+        <a:font script="Osma" typeface="Ebrima"/>
+        <a:font script="Phag" typeface="Phagspa"/>
+        <a:font script="Syrn" typeface="Estrangelo Edessa"/>
+        <a:font script="Syrj" typeface="Estrangelo Edessa"/>
+        <a:font script="Syre" typeface="Estrangelo Edessa"/>
+        <a:font script="Sora" typeface="Nirmala UI"/>
+        <a:font script="Tale" typeface="Microsoft Tai Le"/>
+        <a:font script="Talu" typeface="Microsoft New Tai Lue"/>
+        <a:font script="Tfng" typeface="Ebrima"/>
+      </a:minorFont>
+    </a:fontScheme>
+    <a:fmtScheme name="Office">
+      <a:fillStyleLst>
+        <a:solidFill>
+          <a:schemeClr val="phClr"/>
+        </a:solidFill>
+        <a:gradFill rotWithShape="1">
+          <a:gsLst>
+            <a:gs pos="0">
+              <a:schemeClr val="phClr">
+                <a:lumMod val="110000"/>
+                <a:satMod val="105000"/>
+                <a:tint val="67000"/>
+              </a:schemeClr>
+            </a:gs>
+            <a:gs pos="50000">
+              <a:schemeClr val="phClr">
+                <a:lumMod val="105000"/>
+                <a:satMod val="103000"/>
+                <a:tint val="73000"/>
+              </a:schemeClr>
+            </a:gs>
+            <a:gs pos="100000">
+              <a:schemeClr val="phClr">
+                <a:lumMod val="105000"/>
+                <a:satMod val="109000"/>
+                <a:tint val="81000"/>
+              </a:schemeClr>
+            </a:gs>
+          </a:gsLst>
+          <a:lin ang="5400000" scaled="0"/>
+        </a:gradFill>
+        <a:gradFill rotWithShape="1">
+          <a:gsLst>
+            <a:gs pos="0">
+              <a:schemeClr val="phClr">
+                <a:satMod val="103000"/>
+                <a:lumMod val="102000"/>
+                <a:tint val="94000"/>
+              </a:schemeClr>
+            </a:gs>
+            <a:gs pos="50000">
+              <a:schemeClr val="phClr">
+                <a:satMod val="110000"/>
+                <a:lumMod val="100000"/>
+                <a:shade val="100000"/>
+              </a:schemeClr>
+            </a:gs>
+            <a:gs pos="100000">
+              <a:schemeClr val="phClr">
+                <a:lumMod val="99000"/>
+                <a:satMod val="120000"/>
+                <a:shade val="78000"/>
+              </a:schemeClr>
+            </a:gs>
+          </a:gsLst>
+          <a:lin ang="5400000" scaled="0"/>
+        </a:gradFill>
+      </a:fillStyleLst>
+      <a:lnStyleLst>
+        <a:ln w="6350" cap="flat" cmpd="sng" algn="ctr">
+          <a:solidFill>
+            <a:schemeClr val="phClr"/>
+          </a:solidFill>
+          <a:prstDash val="solid"/>
+          <a:miter lim="800000"/>
+        </a:ln>
+        <a:ln w="12700" cap="flat" cmpd="sng" algn="ctr">
+          <a:solidFill>
+            <a:schemeClr val="phClr"/>
+          </a:solidFill>
+          <a:prstDash val="solid"/>
+          <a:miter lim="800000"/>
+        </a:ln>
+        <a:ln w="19050" cap="flat" cmpd="sng" algn="ctr">
+          <a:solidFill>
+            <a:schemeClr val="phClr"/>
+          </a:solidFill>
+          <a:prstDash val="solid"/>
+          <a:miter lim="800000"/>
+        </a:ln>
+      </a:lnStyleLst>
+      <a:effectStyleLst>
+        <a:effectStyle>
+          <a:effectLst/>
+        </a:effectStyle>
+        <a:effectStyle>
+          <a:effectLst/>
+        </a:effectStyle>
+        <a:effectStyle>
+          <a:effectLst>
+            <a:outerShdw blurRad="57150" dist="19050" dir="5400000" algn="ctr" rotWithShape="0">
+              <a:srgbClr val="000000">
+                <a:alpha val="63000"/>
+              </a:srgbClr>
+            </a:outerShdw>
+          </a:effectLst>
+        </a:effectStyle>
+      </a:effectStyleLst>
+      <a:bgFillStyleLst>
+        <a:solidFill>
+          <a:schemeClr val="phClr"/>
+        </a:solidFill>
+        <a:solidFill>
+          <a:schemeClr val="phClr">
+            <a:tint val="95000"/>
+            <a:satMod val="170000"/>
+          </a:schemeClr>
+        </a:solidFill>
+        <a:gradFill rotWithShape="1">
+          <a:gsLst>
+            <a:gs pos="0">
+              <a:schemeClr val="phClr">
+                <a:tint val="93000"/>
+                <a:satMod val="150000"/>
+                <a:shade val="98000"/>
+                <a:lumMod val="102000"/>
+              </a:schemeClr>
+            </a:gs>
+            <a:gs pos="50000">
+              <a:schemeClr val="phClr">
+                <a:tint val="98000"/>
+                <a:satMod val="130000"/>
+                <a:shade val="90000"/>
+                <a:lumMod val="103000"/>
+              </a:schemeClr>
+            </a:gs>
+            <a:gs pos="100000">
+              <a:schemeClr val="phClr">
+                <a:shade val="63000"/>
+                <a:satMod val="120000"/>
+              </a:schemeClr>
+            </a:gs>
+          </a:gsLst>
+          <a:lin ang="5400000" scaled="0"/>
+        </a:gradFill>
+      </a:bgFillStyleLst>
+    </a:fmtScheme>
+  </a:themeElements>
+  <a:objectDefaults/>
+  <a:extraClrSchemeLst/>
+  <a:extLst>
+    <a:ext uri="{05A4C25C-085E-4340-85A3-A5531E510DB2}">
+      <thm15:themeFamily xmlns:thm15="http://schemas.microsoft.com/office/thememl/2012/main" name="Office Theme" id="{62F939B6-93AF-4DB8-9C6B-D6C7DFDC589F}" vid="{4A3C46E8-61CC-4603-A589-7422A47A8E4A}"/>
+    </a:ext>
+  </a:extLst>
+</a:theme>
 </file>
</xml_diff>

<commit_message>
record all part 1 podcast and presentation
</commit_message>
<xml_diff>
--- a/Presentations/01 - Introduction/01 - What is Vue.js.pptx
+++ b/Presentations/01 - Introduction/01 - What is Vue.js.pptx
@@ -5,12 +5,13 @@
     <p:sldMasterId id="2147483648" r:id="rId1"/>
   </p:sldMasterIdLst>
   <p:notesMasterIdLst>
-    <p:notesMasterId r:id="rId5"/>
+    <p:notesMasterId r:id="rId6"/>
   </p:notesMasterIdLst>
   <p:sldIdLst>
-    <p:sldId id="256" r:id="rId2"/>
-    <p:sldId id="258" r:id="rId3"/>
-    <p:sldId id="259" r:id="rId4"/>
+    <p:sldId id="260" r:id="rId2"/>
+    <p:sldId id="256" r:id="rId3"/>
+    <p:sldId id="258" r:id="rId4"/>
+    <p:sldId id="259" r:id="rId5"/>
   </p:sldIdLst>
   <p:sldSz cx="12192000" cy="6858000"/>
   <p:notesSz cx="6858000" cy="9144000"/>
@@ -199,7 +200,7 @@
           <a:p>
             <a:fld id="{0C79E95C-CCDF-4035-B6E4-E5E4DED86327}" type="datetimeFigureOut">
               <a:rPr lang="fa-IR" smtClean="0"/>
-              <a:t>07/02/1441</a:t>
+              <a:t>09/02/1441</a:t>
             </a:fld>
             <a:endParaRPr lang="fa-IR"/>
           </a:p>
@@ -532,7 +533,7 @@
           <a:p>
             <a:fld id="{5E31C02D-7412-4DF3-9CE2-51B70D2BC3B4}" type="slidenum">
               <a:rPr lang="fa-IR" smtClean="0"/>
-              <a:t>1</a:t>
+              <a:t>2</a:t>
             </a:fld>
             <a:endParaRPr lang="fa-IR"/>
           </a:p>
@@ -698,7 +699,7 @@
           <a:p>
             <a:fld id="{51C3B6AB-4F42-441D-BDE8-4C7181B99EA9}" type="datetimeFigureOut">
               <a:rPr lang="en-US" smtClean="0"/>
-              <a:t>10/6/2019</a:t>
+              <a:t>10/8/2019</a:t>
             </a:fld>
             <a:endParaRPr lang="en-US"/>
           </a:p>
@@ -786,7 +787,7 @@
         </p:blipFill>
         <p:spPr>
           <a:xfrm flipH="1">
-            <a:off x="11431946" y="6107308"/>
+            <a:off x="11340000" y="6048000"/>
             <a:ext cx="674028" cy="674028"/>
           </a:xfrm>
           <a:prstGeom prst="rect">
@@ -932,7 +933,7 @@
           <a:p>
             <a:fld id="{51C3B6AB-4F42-441D-BDE8-4C7181B99EA9}" type="datetimeFigureOut">
               <a:rPr lang="en-US" smtClean="0"/>
-              <a:t>10/6/2019</a:t>
+              <a:t>10/8/2019</a:t>
             </a:fld>
             <a:endParaRPr lang="en-US"/>
           </a:p>
@@ -1140,7 +1141,7 @@
           <a:p>
             <a:fld id="{51C3B6AB-4F42-441D-BDE8-4C7181B99EA9}" type="datetimeFigureOut">
               <a:rPr lang="en-US" smtClean="0"/>
-              <a:t>10/6/2019</a:t>
+              <a:t>10/8/2019</a:t>
             </a:fld>
             <a:endParaRPr lang="en-US"/>
           </a:p>
@@ -1338,7 +1339,7 @@
           <a:p>
             <a:fld id="{51C3B6AB-4F42-441D-BDE8-4C7181B99EA9}" type="datetimeFigureOut">
               <a:rPr lang="en-US" smtClean="0"/>
-              <a:t>10/6/2019</a:t>
+              <a:t>10/8/2019</a:t>
             </a:fld>
             <a:endParaRPr lang="en-US"/>
           </a:p>
@@ -1613,7 +1614,7 @@
           <a:p>
             <a:fld id="{51C3B6AB-4F42-441D-BDE8-4C7181B99EA9}" type="datetimeFigureOut">
               <a:rPr lang="en-US" smtClean="0"/>
-              <a:t>10/6/2019</a:t>
+              <a:t>10/8/2019</a:t>
             </a:fld>
             <a:endParaRPr lang="en-US"/>
           </a:p>
@@ -1878,7 +1879,7 @@
           <a:p>
             <a:fld id="{51C3B6AB-4F42-441D-BDE8-4C7181B99EA9}" type="datetimeFigureOut">
               <a:rPr lang="en-US" smtClean="0"/>
-              <a:t>10/6/2019</a:t>
+              <a:t>10/8/2019</a:t>
             </a:fld>
             <a:endParaRPr lang="en-US"/>
           </a:p>
@@ -2290,7 +2291,7 @@
           <a:p>
             <a:fld id="{51C3B6AB-4F42-441D-BDE8-4C7181B99EA9}" type="datetimeFigureOut">
               <a:rPr lang="en-US" smtClean="0"/>
-              <a:t>10/6/2019</a:t>
+              <a:t>10/8/2019</a:t>
             </a:fld>
             <a:endParaRPr lang="en-US"/>
           </a:p>
@@ -2431,7 +2432,7 @@
           <a:p>
             <a:fld id="{51C3B6AB-4F42-441D-BDE8-4C7181B99EA9}" type="datetimeFigureOut">
               <a:rPr lang="en-US" smtClean="0"/>
-              <a:t>10/6/2019</a:t>
+              <a:t>10/8/2019</a:t>
             </a:fld>
             <a:endParaRPr lang="en-US"/>
           </a:p>
@@ -2544,7 +2545,7 @@
           <a:p>
             <a:fld id="{51C3B6AB-4F42-441D-BDE8-4C7181B99EA9}" type="datetimeFigureOut">
               <a:rPr lang="en-US" smtClean="0"/>
-              <a:t>10/6/2019</a:t>
+              <a:t>10/8/2019</a:t>
             </a:fld>
             <a:endParaRPr lang="en-US"/>
           </a:p>
@@ -2855,7 +2856,7 @@
           <a:p>
             <a:fld id="{51C3B6AB-4F42-441D-BDE8-4C7181B99EA9}" type="datetimeFigureOut">
               <a:rPr lang="en-US" smtClean="0"/>
-              <a:t>10/6/2019</a:t>
+              <a:t>10/8/2019</a:t>
             </a:fld>
             <a:endParaRPr lang="en-US"/>
           </a:p>
@@ -3143,7 +3144,7 @@
           <a:p>
             <a:fld id="{51C3B6AB-4F42-441D-BDE8-4C7181B99EA9}" type="datetimeFigureOut">
               <a:rPr lang="en-US" smtClean="0"/>
-              <a:t>10/6/2019</a:t>
+              <a:t>10/8/2019</a:t>
             </a:fld>
             <a:endParaRPr lang="en-US"/>
           </a:p>
@@ -3384,7 +3385,7 @@
           <a:p>
             <a:fld id="{51C3B6AB-4F42-441D-BDE8-4C7181B99EA9}" type="datetimeFigureOut">
               <a:rPr lang="en-US" smtClean="0"/>
-              <a:t>10/6/2019</a:t>
+              <a:t>10/8/2019</a:t>
             </a:fld>
             <a:endParaRPr lang="en-US"/>
           </a:p>
@@ -3787,6 +3788,20 @@
 <file path=ppt/slides/slide1.xml><?xml version="1.0" encoding="utf-8"?>
 <p:sld xmlns:a="http://schemas.openxmlformats.org/drawingml/2006/main" xmlns:r="http://schemas.openxmlformats.org/officeDocument/2006/relationships" xmlns:p="http://schemas.openxmlformats.org/presentationml/2006/main">
   <p:cSld>
+    <p:bg>
+      <p:bgPr>
+        <a:blipFill dpi="0" rotWithShape="1">
+          <a:blip r:embed="rId2">
+            <a:lum/>
+          </a:blip>
+          <a:srcRect/>
+          <a:stretch>
+            <a:fillRect/>
+          </a:stretch>
+        </a:blipFill>
+        <a:effectLst/>
+      </p:bgPr>
+    </p:bg>
     <p:spTree>
       <p:nvGrpSpPr>
         <p:cNvPr id="1" name=""/>
@@ -3801,6 +3816,94 @@
           <a:chExt cx="0" cy="0"/>
         </a:xfrm>
       </p:grpSpPr>
+      <p:pic>
+        <p:nvPicPr>
+          <p:cNvPr id="6" name="Picture 5">
+            <a:extLst>
+              <a:ext uri="{FF2B5EF4-FFF2-40B4-BE49-F238E27FC236}">
+                <a16:creationId xmlns:a16="http://schemas.microsoft.com/office/drawing/2014/main" id="{BCB353D5-72D2-45C5-9FC1-A60645BC4892}"/>
+              </a:ext>
+            </a:extLst>
+          </p:cNvPr>
+          <p:cNvPicPr>
+            <a:picLocks noChangeAspect="1"/>
+          </p:cNvPicPr>
+          <p:nvPr/>
+        </p:nvPicPr>
+        <p:blipFill>
+          <a:blip r:embed="rId3">
+            <a:extLst>
+              <a:ext uri="{28A0092B-C50C-407E-A947-70E740481C1C}">
+                <a14:useLocalDpi xmlns:a14="http://schemas.microsoft.com/office/drawing/2010/main" val="0"/>
+              </a:ext>
+            </a:extLst>
+          </a:blip>
+          <a:stretch>
+            <a:fillRect/>
+          </a:stretch>
+        </p:blipFill>
+        <p:spPr>
+          <a:xfrm>
+            <a:off x="3138292" y="408662"/>
+            <a:ext cx="5715000" cy="5715000"/>
+          </a:xfrm>
+          <a:prstGeom prst="rect">
+            <a:avLst/>
+          </a:prstGeom>
+          <a:ln>
+            <a:noFill/>
+          </a:ln>
+          <a:effectLst>
+            <a:outerShdw blurRad="292100" dist="139700" dir="2700000" algn="tl" rotWithShape="0">
+              <a:srgbClr val="333333">
+                <a:alpha val="65000"/>
+              </a:srgbClr>
+            </a:outerShdw>
+          </a:effectLst>
+        </p:spPr>
+      </p:pic>
+    </p:spTree>
+    <p:extLst>
+      <p:ext uri="{BB962C8B-B14F-4D97-AF65-F5344CB8AC3E}">
+        <p14:creationId xmlns:p14="http://schemas.microsoft.com/office/powerpoint/2010/main" val="375747951"/>
+      </p:ext>
+    </p:extLst>
+  </p:cSld>
+  <p:clrMapOvr>
+    <a:masterClrMapping/>
+  </p:clrMapOvr>
+  <mc:AlternateContent xmlns:mc="http://schemas.openxmlformats.org/markup-compatibility/2006">
+    <mc:Choice xmlns:p14="http://schemas.microsoft.com/office/powerpoint/2010/main" Requires="p14">
+      <p:transition spd="slow" p14:dur="1600">
+        <p:blinds dir="vert"/>
+      </p:transition>
+    </mc:Choice>
+    <mc:Fallback>
+      <p:transition spd="slow">
+        <p:blinds dir="vert"/>
+      </p:transition>
+    </mc:Fallback>
+  </mc:AlternateContent>
+</p:sld>
+</file>
+
+<file path=ppt/slides/slide2.xml><?xml version="1.0" encoding="utf-8"?>
+<p:sld xmlns:a="http://schemas.openxmlformats.org/drawingml/2006/main" xmlns:r="http://schemas.openxmlformats.org/officeDocument/2006/relationships" xmlns:p="http://schemas.openxmlformats.org/presentationml/2006/main">
+  <p:cSld>
+    <p:spTree>
+      <p:nvGrpSpPr>
+        <p:cNvPr id="1" name=""/>
+        <p:cNvGrpSpPr/>
+        <p:nvPr/>
+      </p:nvGrpSpPr>
+      <p:grpSpPr>
+        <a:xfrm>
+          <a:off x="0" y="0"/>
+          <a:ext cx="0" cy="0"/>
+          <a:chOff x="0" y="0"/>
+          <a:chExt cx="0" cy="0"/>
+        </a:xfrm>
+      </p:grpSpPr>
       <p:sp>
         <p:nvSpPr>
           <p:cNvPr id="7" name="Rectangle 6">
@@ -3991,10 +4094,10 @@
       </p:sp>
       <p:pic>
         <p:nvPicPr>
-          <p:cNvPr id="6" name="Picture 5">
-            <a:extLst>
-              <a:ext uri="{FF2B5EF4-FFF2-40B4-BE49-F238E27FC236}">
-                <a16:creationId xmlns:a16="http://schemas.microsoft.com/office/drawing/2014/main" id="{E68E1D6D-5499-4933-998E-9EED1ED3E755}"/>
+          <p:cNvPr id="15" name="Picture 14">
+            <a:extLst>
+              <a:ext uri="{FF2B5EF4-FFF2-40B4-BE49-F238E27FC236}">
+                <a16:creationId xmlns:a16="http://schemas.microsoft.com/office/drawing/2014/main" id="{7E747217-A670-4A2A-9D93-821356854050}"/>
               </a:ext>
             </a:extLst>
           </p:cNvPr>
@@ -4017,8 +4120,83 @@
         </p:blipFill>
         <p:spPr>
           <a:xfrm>
-            <a:off x="3299563" y="628910"/>
-            <a:ext cx="5600178" cy="5600178"/>
+            <a:off x="4082454" y="911841"/>
+            <a:ext cx="4052141" cy="4052141"/>
+          </a:xfrm>
+          <a:prstGeom prst="rect">
+            <a:avLst/>
+          </a:prstGeom>
+        </p:spPr>
+      </p:pic>
+      <p:sp>
+        <p:nvSpPr>
+          <p:cNvPr id="16" name="Rectangle 15">
+            <a:extLst>
+              <a:ext uri="{FF2B5EF4-FFF2-40B4-BE49-F238E27FC236}">
+                <a16:creationId xmlns:a16="http://schemas.microsoft.com/office/drawing/2014/main" id="{AC155869-DA1D-4620-BF54-146072766A8E}"/>
+              </a:ext>
+            </a:extLst>
+          </p:cNvPr>
+          <p:cNvSpPr/>
+          <p:nvPr/>
+        </p:nvSpPr>
+        <p:spPr>
+          <a:xfrm>
+            <a:off x="4217591" y="5249994"/>
+            <a:ext cx="3781869" cy="707886"/>
+          </a:xfrm>
+          <a:prstGeom prst="rect">
+            <a:avLst/>
+          </a:prstGeom>
+        </p:spPr>
+        <p:txBody>
+          <a:bodyPr wrap="none">
+            <a:spAutoFit/>
+          </a:bodyPr>
+          <a:lstStyle/>
+          <a:p>
+            <a:r>
+              <a:rPr lang="en-US" sz="4000" b="1">
+                <a:solidFill>
+                  <a:srgbClr val="35495E"/>
+                </a:solidFill>
+              </a:rPr>
+              <a:t>Vue Introduction</a:t>
+            </a:r>
+            <a:endParaRPr lang="fa-IR" sz="4000"/>
+          </a:p>
+        </p:txBody>
+      </p:sp>
+      <p:pic>
+        <p:nvPicPr>
+          <p:cNvPr id="6" name="Picture 5">
+            <a:extLst>
+              <a:ext uri="{FF2B5EF4-FFF2-40B4-BE49-F238E27FC236}">
+                <a16:creationId xmlns:a16="http://schemas.microsoft.com/office/drawing/2014/main" id="{E68E1D6D-5499-4933-998E-9EED1ED3E755}"/>
+              </a:ext>
+            </a:extLst>
+          </p:cNvPr>
+          <p:cNvPicPr>
+            <a:picLocks noChangeAspect="1"/>
+          </p:cNvPicPr>
+          <p:nvPr/>
+        </p:nvPicPr>
+        <p:blipFill>
+          <a:blip r:embed="rId5">
+            <a:extLst>
+              <a:ext uri="{28A0092B-C50C-407E-A947-70E740481C1C}">
+                <a14:useLocalDpi xmlns:a14="http://schemas.microsoft.com/office/drawing/2010/main" val="0"/>
+              </a:ext>
+            </a:extLst>
+          </a:blip>
+          <a:stretch>
+            <a:fillRect/>
+          </a:stretch>
+        </p:blipFill>
+        <p:spPr>
+          <a:xfrm>
+            <a:off x="4707371" y="2301972"/>
+            <a:ext cx="2804021" cy="2804021"/>
           </a:xfrm>
           <a:prstGeom prst="rect">
             <a:avLst/>
@@ -4040,7 +4218,7 @@
           <p:nvPr/>
         </p:nvPicPr>
         <p:blipFill>
-          <a:blip r:embed="rId5">
+          <a:blip r:embed="rId6">
             <a:extLst>
               <a:ext uri="{28A0092B-C50C-407E-A947-70E740481C1C}">
                 <a14:useLocalDpi xmlns:a14="http://schemas.microsoft.com/office/drawing/2010/main" val="0"/>
@@ -4053,8 +4231,8 @@
         </p:blipFill>
         <p:spPr>
           <a:xfrm>
-            <a:off x="4004187" y="902359"/>
-            <a:ext cx="4208678" cy="4876800"/>
+            <a:off x="9250451" y="2443982"/>
+            <a:ext cx="2174760" cy="2520000"/>
           </a:xfrm>
           <a:prstGeom prst="rect">
             <a:avLst/>
@@ -4076,7 +4254,7 @@
           <p:nvPr/>
         </p:nvPicPr>
         <p:blipFill>
-          <a:blip r:embed="rId6">
+          <a:blip r:embed="rId7">
             <a:extLst>
               <a:ext uri="{28A0092B-C50C-407E-A947-70E740481C1C}">
                 <a14:useLocalDpi xmlns:a14="http://schemas.microsoft.com/office/drawing/2010/main" val="0"/>
@@ -4089,44 +4267,8 @@
         </p:blipFill>
         <p:spPr>
           <a:xfrm>
-            <a:off x="4114743" y="1324427"/>
-            <a:ext cx="3962514" cy="4209143"/>
-          </a:xfrm>
-          <a:prstGeom prst="rect">
-            <a:avLst/>
-          </a:prstGeom>
-        </p:spPr>
-      </p:pic>
-      <p:pic>
-        <p:nvPicPr>
-          <p:cNvPr id="15" name="Picture 14">
-            <a:extLst>
-              <a:ext uri="{FF2B5EF4-FFF2-40B4-BE49-F238E27FC236}">
-                <a16:creationId xmlns:a16="http://schemas.microsoft.com/office/drawing/2014/main" id="{7E747217-A670-4A2A-9D93-821356854050}"/>
-              </a:ext>
-            </a:extLst>
-          </p:cNvPr>
-          <p:cNvPicPr>
-            <a:picLocks noChangeAspect="1"/>
-          </p:cNvPicPr>
-          <p:nvPr/>
-        </p:nvPicPr>
-        <p:blipFill>
-          <a:blip r:embed="rId7">
-            <a:extLst>
-              <a:ext uri="{28A0092B-C50C-407E-A947-70E740481C1C}">
-                <a14:useLocalDpi xmlns:a14="http://schemas.microsoft.com/office/drawing/2010/main" val="0"/>
-              </a:ext>
-            </a:extLst>
-          </a:blip>
-          <a:stretch>
-            <a:fillRect/>
-          </a:stretch>
-        </p:blipFill>
-        <p:spPr>
-          <a:xfrm>
-            <a:off x="3753859" y="132652"/>
-            <a:ext cx="4709334" cy="4709334"/>
+            <a:off x="595968" y="2443982"/>
+            <a:ext cx="2372345" cy="2520000"/>
           </a:xfrm>
           <a:prstGeom prst="rect">
             <a:avLst/>
@@ -4274,78 +4416,40 @@
       </p:sp>
       <p:sp>
         <p:nvSpPr>
-          <p:cNvPr id="16" name="Rectangle 15">
-            <a:extLst>
-              <a:ext uri="{FF2B5EF4-FFF2-40B4-BE49-F238E27FC236}">
-                <a16:creationId xmlns:a16="http://schemas.microsoft.com/office/drawing/2014/main" id="{AC155869-DA1D-4620-BF54-146072766A8E}"/>
-              </a:ext>
-            </a:extLst>
-          </p:cNvPr>
-          <p:cNvSpPr/>
+          <p:cNvPr id="17" name="Rectangle 16">
+            <a:extLst>
+              <a:ext uri="{FF2B5EF4-FFF2-40B4-BE49-F238E27FC236}">
+                <a16:creationId xmlns:a16="http://schemas.microsoft.com/office/drawing/2014/main" id="{AC4EC242-03AA-429D-A72A-FD5007F0B56F}"/>
+              </a:ext>
+            </a:extLst>
+          </p:cNvPr>
+          <p:cNvSpPr>
+            <a:spLocks/>
+          </p:cNvSpPr>
           <p:nvPr/>
         </p:nvSpPr>
         <p:spPr>
           <a:xfrm>
-            <a:off x="4217591" y="4924318"/>
-            <a:ext cx="3781869" cy="707886"/>
+            <a:off x="4386000" y="2510837"/>
+            <a:ext cx="3420000" cy="1836000"/>
           </a:xfrm>
           <a:prstGeom prst="rect">
             <a:avLst/>
           </a:prstGeom>
+          <a:blipFill dpi="0" rotWithShape="0">
+            <a:blip r:embed="rId8"/>
+            <a:srcRect/>
+            <a:stretch>
+              <a:fillRect/>
+            </a:stretch>
+          </a:blipFill>
         </p:spPr>
         <p:txBody>
-          <a:bodyPr wrap="none">
+          <a:bodyPr wrap="square">
             <a:spAutoFit/>
           </a:bodyPr>
           <a:lstStyle/>
           <a:p>
-            <a:r>
-              <a:rPr lang="en-US" sz="4000" b="1">
-                <a:solidFill>
-                  <a:srgbClr val="35495E"/>
-                </a:solidFill>
-              </a:rPr>
-              <a:t>Vue Introduction</a:t>
-            </a:r>
-            <a:endParaRPr lang="fa-IR" sz="4000"/>
-          </a:p>
-        </p:txBody>
-      </p:sp>
-      <p:sp>
-        <p:nvSpPr>
-          <p:cNvPr id="17" name="Rectangle 16">
-            <a:extLst>
-              <a:ext uri="{FF2B5EF4-FFF2-40B4-BE49-F238E27FC236}">
-                <a16:creationId xmlns:a16="http://schemas.microsoft.com/office/drawing/2014/main" id="{AC4EC242-03AA-429D-A72A-FD5007F0B56F}"/>
-              </a:ext>
-            </a:extLst>
-          </p:cNvPr>
-          <p:cNvSpPr/>
-          <p:nvPr/>
-        </p:nvSpPr>
-        <p:spPr>
-          <a:xfrm>
-            <a:off x="3689978" y="3075055"/>
-            <a:ext cx="4837093" cy="707886"/>
-          </a:xfrm>
-          <a:prstGeom prst="rect">
-            <a:avLst/>
-          </a:prstGeom>
-        </p:spPr>
-        <p:txBody>
-          <a:bodyPr wrap="none">
-            <a:spAutoFit/>
-          </a:bodyPr>
-          <a:lstStyle/>
-          <a:p>
-            <a:r>
-              <a:rPr lang="en-US" sz="4000" b="1">
-                <a:solidFill>
-                  <a:srgbClr val="35495E"/>
-                </a:solidFill>
-              </a:rPr>
-              <a:t>JavaScript Framework</a:t>
-            </a:r>
             <a:endParaRPr lang="fa-IR" sz="4000"/>
           </a:p>
         </p:txBody>
@@ -4360,18 +4464,6 @@
   <p:clrMapOvr>
     <a:masterClrMapping/>
   </p:clrMapOvr>
-  <mc:AlternateContent xmlns:mc="http://schemas.openxmlformats.org/markup-compatibility/2006">
-    <mc:Choice xmlns:p159="http://schemas.microsoft.com/office/powerpoint/2015/09/main" Requires="p159">
-      <p:transition xmlns:p14="http://schemas.microsoft.com/office/powerpoint/2010/main" spd="slow" p14:dur="2000">
-        <p159:morph option="byObject"/>
-      </p:transition>
-    </mc:Choice>
-    <mc:Fallback>
-      <p:transition spd="slow">
-        <p:fade/>
-      </p:transition>
-    </mc:Fallback>
-  </mc:AlternateContent>
   <p:timing>
     <p:tnLst>
       <p:par>
@@ -4384,6 +4476,9 @@
                     <p:cTn id="3" fill="hold">
                       <p:stCondLst>
                         <p:cond delay="indefinite"/>
+                        <p:cond evt="onBegin" delay="0">
+                          <p:tn val="2"/>
+                        </p:cond>
                       </p:stCondLst>
                       <p:childTnLst>
                         <p:par>
@@ -4393,7 +4488,7 @@
                             </p:stCondLst>
                             <p:childTnLst>
                               <p:par>
-                                <p:cTn id="5" presetID="42" presetClass="entr" presetSubtype="0" fill="hold" nodeType="clickEffect">
+                                <p:cTn id="5" presetID="42" presetClass="entr" presetSubtype="0" fill="hold" nodeType="withEffect">
                                   <p:stCondLst>
                                     <p:cond delay="0"/>
                                   </p:stCondLst>
@@ -4737,7 +4832,7 @@
                                     </p:set>
                                     <p:animEffect transition="in" filter="fade">
                                       <p:cBhvr>
-                                        <p:cTn id="34" dur="500"/>
+                                        <p:cTn id="34" dur="1000"/>
                                         <p:tgtEl>
                                           <p:spTgt spid="11"/>
                                         </p:tgtEl>
@@ -4765,14 +4860,120 @@
                             </p:stCondLst>
                             <p:childTnLst>
                               <p:par>
-                                <p:cTn id="37" presetID="10" presetClass="exit" presetSubtype="0" fill="hold" nodeType="clickEffect">
+                                <p:cTn id="37" presetID="10" presetClass="entr" presetSubtype="0" fill="hold" nodeType="clickEffect">
+                                  <p:stCondLst>
+                                    <p:cond delay="0"/>
+                                  </p:stCondLst>
+                                  <p:childTnLst>
+                                    <p:set>
+                                      <p:cBhvr>
+                                        <p:cTn id="38" dur="1" fill="hold">
+                                          <p:stCondLst>
+                                            <p:cond delay="0"/>
+                                          </p:stCondLst>
+                                        </p:cTn>
+                                        <p:tgtEl>
+                                          <p:spTgt spid="13"/>
+                                        </p:tgtEl>
+                                        <p:attrNameLst>
+                                          <p:attrName>style.visibility</p:attrName>
+                                        </p:attrNameLst>
+                                      </p:cBhvr>
+                                      <p:to>
+                                        <p:strVal val="visible"/>
+                                      </p:to>
+                                    </p:set>
+                                    <p:animEffect transition="in" filter="fade">
+                                      <p:cBhvr>
+                                        <p:cTn id="39" dur="1000"/>
+                                        <p:tgtEl>
+                                          <p:spTgt spid="13"/>
+                                        </p:tgtEl>
+                                      </p:cBhvr>
+                                    </p:animEffect>
+                                  </p:childTnLst>
+                                </p:cTn>
+                              </p:par>
+                            </p:childTnLst>
+                          </p:cTn>
+                        </p:par>
+                      </p:childTnLst>
+                    </p:cTn>
+                  </p:par>
+                  <p:par>
+                    <p:cTn id="40" fill="hold">
+                      <p:stCondLst>
+                        <p:cond delay="indefinite"/>
+                      </p:stCondLst>
+                      <p:childTnLst>
+                        <p:par>
+                          <p:cTn id="41" fill="hold">
+                            <p:stCondLst>
+                              <p:cond delay="0"/>
+                            </p:stCondLst>
+                            <p:childTnLst>
+                              <p:par>
+                                <p:cTn id="42" presetID="10" presetClass="entr" presetSubtype="0" fill="hold" nodeType="clickEffect">
+                                  <p:stCondLst>
+                                    <p:cond delay="0"/>
+                                  </p:stCondLst>
+                                  <p:childTnLst>
+                                    <p:set>
+                                      <p:cBhvr>
+                                        <p:cTn id="43" dur="1" fill="hold">
+                                          <p:stCondLst>
+                                            <p:cond delay="0"/>
+                                          </p:stCondLst>
+                                        </p:cTn>
+                                        <p:tgtEl>
+                                          <p:spTgt spid="6"/>
+                                        </p:tgtEl>
+                                        <p:attrNameLst>
+                                          <p:attrName>style.visibility</p:attrName>
+                                        </p:attrNameLst>
+                                      </p:cBhvr>
+                                      <p:to>
+                                        <p:strVal val="visible"/>
+                                      </p:to>
+                                    </p:set>
+                                    <p:animEffect transition="in" filter="fade">
+                                      <p:cBhvr>
+                                        <p:cTn id="44" dur="1000"/>
+                                        <p:tgtEl>
+                                          <p:spTgt spid="6"/>
+                                        </p:tgtEl>
+                                      </p:cBhvr>
+                                    </p:animEffect>
+                                  </p:childTnLst>
+                                </p:cTn>
+                              </p:par>
+                            </p:childTnLst>
+                          </p:cTn>
+                        </p:par>
+                      </p:childTnLst>
+                    </p:cTn>
+                  </p:par>
+                  <p:par>
+                    <p:cTn id="45" fill="hold">
+                      <p:stCondLst>
+                        <p:cond delay="indefinite"/>
+                      </p:stCondLst>
+                      <p:childTnLst>
+                        <p:par>
+                          <p:cTn id="46" fill="hold">
+                            <p:stCondLst>
+                              <p:cond delay="0"/>
+                            </p:stCondLst>
+                            <p:childTnLst>
+                              <p:par>
+                                <p:cTn id="47" presetID="10" presetClass="exit" presetSubtype="0" fill="hold" nodeType="clickEffect">
                                   <p:stCondLst>
                                     <p:cond delay="0"/>
                                   </p:stCondLst>
                                   <p:childTnLst>
                                     <p:animEffect transition="out" filter="fade">
                                       <p:cBhvr>
-                                        <p:cTn id="38" dur="500"/>
+                                        <p:cTn id="48" dur="500"/>
                                         <p:tgtEl>
                                           <p:spTgt spid="11"/>
                                         </p:tgtEl>
@@ -4780,7 +4981,7 @@
                                     </p:animEffect>
                                     <p:set>
                                       <p:cBhvr>
-                                        <p:cTn id="39" dur="1" fill="hold">
+                                        <p:cTn id="49" dur="1" fill="hold">
                                           <p:stCondLst>
                                             <p:cond delay="499"/>
                                           </p:stCondLst>
@@ -4799,77 +5000,15 @@
                                   </p:childTnLst>
                                 </p:cTn>
                               </p:par>
-                            </p:childTnLst>
-                          </p:cTn>
-                        </p:par>
-                        <p:par>
-                          <p:cTn id="40" fill="hold">
-                            <p:stCondLst>
-                              <p:cond delay="500"/>
-                            </p:stCondLst>
-                            <p:childTnLst>
                               <p:par>
-                                <p:cTn id="41" presetID="10" presetClass="entr" presetSubtype="0" fill="hold" nodeType="afterEffect">
-                                  <p:stCondLst>
-                                    <p:cond delay="0"/>
-                                  </p:stCondLst>
-                                  <p:childTnLst>
-                                    <p:set>
-                                      <p:cBhvr>
-                                        <p:cTn id="42" dur="1" fill="hold">
-                                          <p:stCondLst>
-                                            <p:cond delay="0"/>
-                                          </p:stCondLst>
-                                        </p:cTn>
-                                        <p:tgtEl>
-                                          <p:spTgt spid="13"/>
-                                        </p:tgtEl>
-                                        <p:attrNameLst>
-                                          <p:attrName>style.visibility</p:attrName>
-                                        </p:attrNameLst>
-                                      </p:cBhvr>
-                                      <p:to>
-                                        <p:strVal val="visible"/>
-                                      </p:to>
-                                    </p:set>
-                                    <p:animEffect transition="in" filter="fade">
-                                      <p:cBhvr>
-                                        <p:cTn id="43" dur="500"/>
-                                        <p:tgtEl>
-                                          <p:spTgt spid="13"/>
-                                        </p:tgtEl>
-                                      </p:cBhvr>
-                                    </p:animEffect>
-                                  </p:childTnLst>
-                                </p:cTn>
-                              </p:par>
-                            </p:childTnLst>
-                          </p:cTn>
-                        </p:par>
-                      </p:childTnLst>
-                    </p:cTn>
-                  </p:par>
-                  <p:par>
-                    <p:cTn id="44" fill="hold">
-                      <p:stCondLst>
-                        <p:cond delay="indefinite"/>
-                      </p:stCondLst>
-                      <p:childTnLst>
-                        <p:par>
-                          <p:cTn id="45" fill="hold">
-                            <p:stCondLst>
-                              <p:cond delay="0"/>
-                            </p:stCondLst>
-                            <p:childTnLst>
-                              <p:par>
-                                <p:cTn id="46" presetID="10" presetClass="exit" presetSubtype="0" fill="hold" nodeType="clickEffect">
+                                <p:cTn id="50" presetID="10" presetClass="exit" presetSubtype="0" fill="hold" nodeType="withEffect">
                                   <p:stCondLst>
                                     <p:cond delay="0"/>
                                   </p:stCondLst>
                                   <p:childTnLst>
                                     <p:animEffect transition="out" filter="fade">
                                       <p:cBhvr>
-                                        <p:cTn id="47" dur="500"/>
+                                        <p:cTn id="51" dur="500"/>
                                         <p:tgtEl>
                                           <p:spTgt spid="13"/>
                                         </p:tgtEl>
@@ -4877,7 +5016,7 @@
                                     </p:animEffect>
                                     <p:set>
                                       <p:cBhvr>
-                                        <p:cTn id="48" dur="1" fill="hold">
+                                        <p:cTn id="52" dur="1" fill="hold">
                                           <p:stCondLst>
                                             <p:cond delay="499"/>
                                           </p:stCondLst>
@@ -4900,91 +5039,38 @@
                           </p:cTn>
                         </p:par>
                         <p:par>
-                          <p:cTn id="49" fill="hold">
+                          <p:cTn id="53" fill="hold">
                             <p:stCondLst>
                               <p:cond delay="500"/>
                             </p:stCondLst>
                             <p:childTnLst>
                               <p:par>
-                                <p:cTn id="50" presetID="10" presetClass="entr" presetSubtype="0" fill="hold" nodeType="afterEffect">
-                                  <p:stCondLst>
-                                    <p:cond delay="0"/>
-                                  </p:stCondLst>
-                                  <p:childTnLst>
-                                    <p:set>
-                                      <p:cBhvr>
-                                        <p:cTn id="51" dur="1" fill="hold">
-                                          <p:stCondLst>
-                                            <p:cond delay="0"/>
-                                          </p:stCondLst>
-                                        </p:cTn>
-                                        <p:tgtEl>
-                                          <p:spTgt spid="6"/>
-                                        </p:tgtEl>
-                                        <p:attrNameLst>
-                                          <p:attrName>style.visibility</p:attrName>
-                                        </p:attrNameLst>
-                                      </p:cBhvr>
-                                      <p:to>
-                                        <p:strVal val="visible"/>
-                                      </p:to>
-                                    </p:set>
-                                    <p:animEffect transition="in" filter="fade">
-                                      <p:cBhvr>
-                                        <p:cTn id="52" dur="2000"/>
-                                        <p:tgtEl>
-                                          <p:spTgt spid="6"/>
-                                        </p:tgtEl>
-                                      </p:cBhvr>
-                                    </p:animEffect>
-                                  </p:childTnLst>
-                                </p:cTn>
-                              </p:par>
-                            </p:childTnLst>
-                          </p:cTn>
-                        </p:par>
-                      </p:childTnLst>
-                    </p:cTn>
-                  </p:par>
-                  <p:par>
-                    <p:cTn id="53" fill="hold">
-                      <p:stCondLst>
-                        <p:cond delay="indefinite"/>
-                      </p:stCondLst>
-                      <p:childTnLst>
-                        <p:par>
-                          <p:cTn id="54" fill="hold">
-                            <p:stCondLst>
-                              <p:cond delay="0"/>
-                            </p:stCondLst>
-                            <p:childTnLst>
-                              <p:par>
-                                <p:cTn id="55" presetID="6" presetClass="emph" presetSubtype="0" fill="hold" nodeType="clickEffect">
+                                <p:cTn id="54" presetID="6" presetClass="emph" presetSubtype="0" fill="hold" nodeType="afterEffect">
                                   <p:stCondLst>
                                     <p:cond delay="0"/>
                                   </p:stCondLst>
                                   <p:childTnLst>
                                     <p:animScale>
                                       <p:cBhvr>
-                                        <p:cTn id="56" dur="1000" fill="hold"/>
+                                        <p:cTn id="55" dur="1000" fill="hold"/>
                                         <p:tgtEl>
                                           <p:spTgt spid="6"/>
                                         </p:tgtEl>
                                       </p:cBhvr>
-                                      <p:by x="10000" y="10000"/>
+                                      <p:by x="24000" y="24000"/>
                                     </p:animScale>
                                   </p:childTnLst>
                                 </p:cTn>
                               </p:par>
                               <p:par>
-                                <p:cTn id="57" presetID="42" presetClass="path" presetSubtype="0" accel="50000" decel="50000" fill="hold" nodeType="withEffect">
+                                <p:cTn id="56" presetID="42" presetClass="path" presetSubtype="0" accel="50000" decel="50000" fill="hold" nodeType="withEffect">
                                   <p:stCondLst>
                                     <p:cond delay="0"/>
                                   </p:stCondLst>
                                   <p:childTnLst>
-                                    <p:animMotion origin="layout" path="M -4.16667E-7 0.0037 L 0.46484 0.44074 " pathEditMode="relative" rAng="0" ptsTypes="AA">
+                                    <p:animMotion origin="layout" path="M -1.66667E-6 -0.01852 L 0.45664 0.39027 " pathEditMode="relative" rAng="0" ptsTypes="AA">
                                       <p:cBhvr>
-                                        <p:cTn id="58" dur="2000" fill="hold"/>
+                                        <p:cTn id="57" dur="2000" fill="hold"/>
                                         <p:tgtEl>
                                           <p:spTgt spid="6"/>
                                         </p:tgtEl>
@@ -4993,7 +5079,7 @@
                                           <p:attrName>ppt_y</p:attrName>
                                         </p:attrNameLst>
                                       </p:cBhvr>
-                                      <p:rCtr x="23242" y="21852"/>
+                                      <p:rCtr x="22826" y="20440"/>
                                     </p:animMotion>
                                   </p:childTnLst>
                                 </p:cTn>
@@ -5002,20 +5088,20 @@
                           </p:cTn>
                         </p:par>
                         <p:par>
-                          <p:cTn id="59" fill="hold">
+                          <p:cTn id="58" fill="hold">
                             <p:stCondLst>
-                              <p:cond delay="2000"/>
+                              <p:cond delay="2500"/>
                             </p:stCondLst>
                             <p:childTnLst>
                               <p:par>
-                                <p:cTn id="60" presetID="10" presetClass="entr" presetSubtype="0" fill="hold" grpId="0" nodeType="afterEffect">
+                                <p:cTn id="59" presetID="10" presetClass="entr" presetSubtype="0" fill="hold" grpId="0" nodeType="afterEffect">
                                   <p:stCondLst>
                                     <p:cond delay="0"/>
                                   </p:stCondLst>
                                   <p:childTnLst>
                                     <p:set>
                                       <p:cBhvr>
-                                        <p:cTn id="61" dur="1" fill="hold">
+                                        <p:cTn id="60" dur="1" fill="hold">
                                           <p:stCondLst>
                                             <p:cond delay="0"/>
                                           </p:stCondLst>
@@ -5033,7 +5119,7 @@
                                     </p:set>
                                     <p:animEffect transition="in" filter="fade">
                                       <p:cBhvr>
-                                        <p:cTn id="62" dur="500"/>
+                                        <p:cTn id="61" dur="500"/>
                                         <p:tgtEl>
                                           <p:spTgt spid="2"/>
                                         </p:tgtEl>
@@ -5043,14 +5129,14 @@
                                 </p:cTn>
                               </p:par>
                               <p:par>
-                                <p:cTn id="63" presetID="10" presetClass="entr" presetSubtype="0" fill="hold" grpId="0" nodeType="withEffect">
+                                <p:cTn id="62" presetID="10" presetClass="entr" presetSubtype="0" fill="hold" grpId="0" nodeType="withEffect">
                                   <p:stCondLst>
                                     <p:cond delay="0"/>
                                   </p:stCondLst>
                                   <p:childTnLst>
                                     <p:set>
                                       <p:cBhvr>
-                                        <p:cTn id="64" dur="1" fill="hold">
+                                        <p:cTn id="63" dur="1" fill="hold">
                                           <p:stCondLst>
                                             <p:cond delay="0"/>
                                           </p:stCondLst>
@@ -5068,7 +5154,7 @@
                                     </p:set>
                                     <p:animEffect transition="in" filter="fade">
                                       <p:cBhvr>
-                                        <p:cTn id="65" dur="500"/>
+                                        <p:cTn id="64" dur="500"/>
                                         <p:tgtEl>
                                           <p:spTgt spid="4"/>
                                         </p:tgtEl>
@@ -5078,14 +5164,14 @@
                                 </p:cTn>
                               </p:par>
                               <p:par>
-                                <p:cTn id="66" presetID="9" presetClass="entr" presetSubtype="0" fill="hold" grpId="0" nodeType="withEffect">
+                                <p:cTn id="65" presetID="9" presetClass="entr" presetSubtype="0" fill="hold" grpId="0" nodeType="withEffect">
                                   <p:stCondLst>
                                     <p:cond delay="0"/>
                                   </p:stCondLst>
                                   <p:childTnLst>
                                     <p:set>
                                       <p:cBhvr>
-                                        <p:cTn id="67" dur="1" fill="hold">
+                                        <p:cTn id="66" dur="1" fill="hold">
                                           <p:stCondLst>
                                             <p:cond delay="0"/>
                                           </p:stCondLst>
@@ -5103,7 +5189,7 @@
                                     </p:set>
                                     <p:animEffect transition="in" filter="dissolve">
                                       <p:cBhvr>
-                                        <p:cTn id="68" dur="500"/>
+                                        <p:cTn id="67" dur="500"/>
                                         <p:tgtEl>
                                           <p:spTgt spid="8"/>
                                         </p:tgtEl>
@@ -5119,26 +5205,26 @@
                     </p:cTn>
                   </p:par>
                   <p:par>
-                    <p:cTn id="69" fill="hold">
+                    <p:cTn id="68" fill="hold">
                       <p:stCondLst>
                         <p:cond delay="indefinite"/>
                       </p:stCondLst>
                       <p:childTnLst>
                         <p:par>
-                          <p:cTn id="70" fill="hold">
+                          <p:cTn id="69" fill="hold">
                             <p:stCondLst>
                               <p:cond delay="0"/>
                             </p:stCondLst>
                             <p:childTnLst>
                               <p:par>
-                                <p:cTn id="71" presetID="9" presetClass="entr" presetSubtype="0" fill="hold" nodeType="clickEffect">
+                                <p:cTn id="70" presetID="9" presetClass="entr" presetSubtype="0" fill="hold" nodeType="clickEffect">
                                   <p:stCondLst>
                                     <p:cond delay="0"/>
                                   </p:stCondLst>
                                   <p:childTnLst>
                                     <p:set>
                                       <p:cBhvr>
-                                        <p:cTn id="72" dur="1" fill="hold">
+                                        <p:cTn id="71" dur="1" fill="hold">
                                           <p:stCondLst>
                                             <p:cond delay="0"/>
                                           </p:stCondLst>
@@ -5160,7 +5246,7 @@
                                     </p:set>
                                     <p:animEffect transition="in" filter="dissolve">
                                       <p:cBhvr>
-                                        <p:cTn id="73" dur="500"/>
+                                        <p:cTn id="72" dur="500"/>
                                         <p:tgtEl>
                                           <p:spTgt spid="7">
                                             <p:txEl>
@@ -5180,26 +5266,26 @@
                     </p:cTn>
                   </p:par>
                   <p:par>
-                    <p:cTn id="74" fill="hold">
+                    <p:cTn id="73" fill="hold">
                       <p:stCondLst>
                         <p:cond delay="indefinite"/>
                       </p:stCondLst>
                       <p:childTnLst>
                         <p:par>
-                          <p:cTn id="75" fill="hold">
+                          <p:cTn id="74" fill="hold">
                             <p:stCondLst>
                               <p:cond delay="0"/>
                             </p:stCondLst>
                             <p:childTnLst>
                               <p:par>
-                                <p:cTn id="76" presetID="9" presetClass="entr" presetSubtype="0" fill="hold" nodeType="clickEffect">
+                                <p:cTn id="75" presetID="9" presetClass="entr" presetSubtype="0" fill="hold" nodeType="clickEffect">
                                   <p:stCondLst>
                                     <p:cond delay="0"/>
                                   </p:stCondLst>
                                   <p:childTnLst>
                                     <p:set>
                                       <p:cBhvr>
-                                        <p:cTn id="77" dur="1" fill="hold">
+                                        <p:cTn id="76" dur="1" fill="hold">
                                           <p:stCondLst>
                                             <p:cond delay="0"/>
                                           </p:stCondLst>
@@ -5221,7 +5307,7 @@
                                     </p:set>
                                     <p:animEffect transition="in" filter="dissolve">
                                       <p:cBhvr>
-                                        <p:cTn id="78" dur="500"/>
+                                        <p:cTn id="77" dur="500"/>
                                         <p:tgtEl>
                                           <p:spTgt spid="7">
                                             <p:txEl>
@@ -5241,26 +5327,26 @@
                     </p:cTn>
                   </p:par>
                   <p:par>
-                    <p:cTn id="79" fill="hold">
+                    <p:cTn id="78" fill="hold">
                       <p:stCondLst>
                         <p:cond delay="indefinite"/>
                       </p:stCondLst>
                       <p:childTnLst>
                         <p:par>
-                          <p:cTn id="80" fill="hold">
+                          <p:cTn id="79" fill="hold">
                             <p:stCondLst>
                               <p:cond delay="0"/>
                             </p:stCondLst>
                             <p:childTnLst>
                               <p:par>
-                                <p:cTn id="81" presetID="9" presetClass="entr" presetSubtype="0" fill="hold" nodeType="clickEffect">
+                                <p:cTn id="80" presetID="9" presetClass="entr" presetSubtype="0" fill="hold" nodeType="clickEffect">
                                   <p:stCondLst>
                                     <p:cond delay="0"/>
                                   </p:stCondLst>
                                   <p:childTnLst>
                                     <p:set>
                                       <p:cBhvr>
-                                        <p:cTn id="82" dur="1" fill="hold">
+                                        <p:cTn id="81" dur="1" fill="hold">
                                           <p:stCondLst>
                                             <p:cond delay="0"/>
                                           </p:stCondLst>
@@ -5282,7 +5368,7 @@
                                     </p:set>
                                     <p:animEffect transition="in" filter="dissolve">
                                       <p:cBhvr>
-                                        <p:cTn id="83" dur="500"/>
+                                        <p:cTn id="82" dur="500"/>
                                         <p:tgtEl>
                                           <p:spTgt spid="7">
                                             <p:txEl>
@@ -5302,26 +5388,26 @@
                     </p:cTn>
                   </p:par>
                   <p:par>
-                    <p:cTn id="84" fill="hold">
+                    <p:cTn id="83" fill="hold">
                       <p:stCondLst>
                         <p:cond delay="indefinite"/>
                       </p:stCondLst>
                       <p:childTnLst>
                         <p:par>
-                          <p:cTn id="85" fill="hold">
+                          <p:cTn id="84" fill="hold">
                             <p:stCondLst>
                               <p:cond delay="0"/>
                             </p:stCondLst>
                             <p:childTnLst>
                               <p:par>
-                                <p:cTn id="86" presetID="9" presetClass="entr" presetSubtype="0" fill="hold" nodeType="clickEffect">
+                                <p:cTn id="85" presetID="9" presetClass="entr" presetSubtype="0" fill="hold" nodeType="clickEffect">
                                   <p:stCondLst>
                                     <p:cond delay="0"/>
                                   </p:stCondLst>
                                   <p:childTnLst>
                                     <p:set>
                                       <p:cBhvr>
-                                        <p:cTn id="87" dur="1" fill="hold">
+                                        <p:cTn id="86" dur="1" fill="hold">
                                           <p:stCondLst>
                                             <p:cond delay="0"/>
                                           </p:stCondLst>
@@ -5343,7 +5429,7 @@
                                     </p:set>
                                     <p:animEffect transition="in" filter="dissolve">
                                       <p:cBhvr>
-                                        <p:cTn id="88" dur="500"/>
+                                        <p:cTn id="87" dur="500"/>
                                         <p:tgtEl>
                                           <p:spTgt spid="7">
                                             <p:txEl>
@@ -5363,26 +5449,26 @@
                     </p:cTn>
                   </p:par>
                   <p:par>
-                    <p:cTn id="89" fill="hold">
+                    <p:cTn id="88" fill="hold">
                       <p:stCondLst>
                         <p:cond delay="indefinite"/>
                       </p:stCondLst>
                       <p:childTnLst>
                         <p:par>
-                          <p:cTn id="90" fill="hold">
+                          <p:cTn id="89" fill="hold">
                             <p:stCondLst>
                               <p:cond delay="0"/>
                             </p:stCondLst>
                             <p:childTnLst>
                               <p:par>
-                                <p:cTn id="91" presetID="9" presetClass="entr" presetSubtype="0" fill="hold" nodeType="clickEffect">
+                                <p:cTn id="90" presetID="9" presetClass="entr" presetSubtype="0" fill="hold" nodeType="clickEffect">
                                   <p:stCondLst>
                                     <p:cond delay="0"/>
                                   </p:stCondLst>
                                   <p:childTnLst>
                                     <p:set>
                                       <p:cBhvr>
-                                        <p:cTn id="92" dur="1" fill="hold">
+                                        <p:cTn id="91" dur="1" fill="hold">
                                           <p:stCondLst>
                                             <p:cond delay="0"/>
                                           </p:stCondLst>
@@ -5404,7 +5490,7 @@
                                     </p:set>
                                     <p:animEffect transition="in" filter="dissolve">
                                       <p:cBhvr>
-                                        <p:cTn id="93" dur="500"/>
+                                        <p:cTn id="92" dur="500"/>
                                         <p:tgtEl>
                                           <p:spTgt spid="7">
                                             <p:txEl>
@@ -5445,19 +5531,19 @@
       </p:par>
     </p:tnLst>
     <p:bldLst>
+      <p:bldP spid="16" grpId="0"/>
+      <p:bldP spid="16" grpId="1"/>
       <p:bldP spid="2" grpId="0" animBg="1"/>
       <p:bldP spid="4" grpId="0" animBg="1"/>
       <p:bldP spid="8" grpId="0"/>
-      <p:bldP spid="16" grpId="0"/>
-      <p:bldP spid="16" grpId="1"/>
-      <p:bldP spid="17" grpId="0"/>
-      <p:bldP spid="17" grpId="1"/>
+      <p:bldP spid="17" grpId="0" animBg="1"/>
+      <p:bldP spid="17" grpId="1" animBg="1"/>
     </p:bldLst>
   </p:timing>
 </p:sld>
 </file>
 
-<file path=ppt/slides/slide2.xml><?xml version="1.0" encoding="utf-8"?>
+<file path=ppt/slides/slide3.xml><?xml version="1.0" encoding="utf-8"?>
 <p:sld xmlns:a="http://schemas.openxmlformats.org/drawingml/2006/main" xmlns:r="http://schemas.openxmlformats.org/officeDocument/2006/relationships" xmlns:p="http://schemas.openxmlformats.org/presentationml/2006/main">
   <p:cSld>
     <p:spTree>
@@ -5810,13 +5896,13 @@
   <p:clrMapOvr>
     <a:masterClrMapping/>
   </p:clrMapOvr>
-  <mc:AlternateContent xmlns:mc="http://schemas.openxmlformats.org/markup-compatibility/2006">
-    <mc:Choice xmlns:p14="http://schemas.microsoft.com/office/powerpoint/2010/main" Requires="p14">
+  <mc:AlternateContent xmlns:mc="http://schemas.openxmlformats.org/markup-compatibility/2006" xmlns:p14="http://schemas.microsoft.com/office/powerpoint/2010/main">
+    <mc:Choice Requires="p14">
       <p:transition spd="med" p14:dur="700">
         <p:fade/>
       </p:transition>
     </mc:Choice>
-    <mc:Fallback>
+    <mc:Fallback xmlns="">
       <p:transition spd="med">
         <p:fade/>
       </p:transition>
@@ -6526,7 +6612,7 @@
 </p:sld>
 </file>
 
-<file path=ppt/slides/slide3.xml><?xml version="1.0" encoding="utf-8"?>
+<file path=ppt/slides/slide4.xml><?xml version="1.0" encoding="utf-8"?>
 <p:sld xmlns:a="http://schemas.openxmlformats.org/drawingml/2006/main" xmlns:r="http://schemas.openxmlformats.org/officeDocument/2006/relationships" xmlns:p="http://schemas.openxmlformats.org/presentationml/2006/main">
   <p:cSld>
     <p:spTree>
@@ -6732,13 +6818,13 @@
   <p:clrMapOvr>
     <a:masterClrMapping/>
   </p:clrMapOvr>
-  <mc:AlternateContent xmlns:mc="http://schemas.openxmlformats.org/markup-compatibility/2006">
-    <mc:Choice xmlns:p14="http://schemas.microsoft.com/office/powerpoint/2010/main" Requires="p14">
+  <mc:AlternateContent xmlns:mc="http://schemas.openxmlformats.org/markup-compatibility/2006" xmlns:p14="http://schemas.microsoft.com/office/powerpoint/2010/main">
+    <mc:Choice Requires="p14">
       <p:transition spd="med" p14:dur="700">
         <p:fade/>
       </p:transition>
     </mc:Choice>
-    <mc:Fallback>
+    <mc:Fallback xmlns="">
       <p:transition spd="med">
         <p:fade/>
       </p:transition>

</xml_diff>